<commit_message>
update presentation.pptx, report.md and 202.docx" update presentation.pptx, report.md and 202.docx" update report.md and 202.docx"
</commit_message>
<xml_diff>
--- a/year1-term2/SS/ct1/presentation.pptx
+++ b/year1-term2/SS/ct1/presentation.pptx
@@ -18171,15 +18171,6 @@
 </file>
 
 <file path=customXml/item2.xml><?xml version="1.0" encoding="utf-8"?>
-<?mso-contentType ?>
-<FormTemplates xmlns="http://schemas.microsoft.com/sharepoint/v3/contenttype/forms">
-  <Display>DocumentLibraryForm</Display>
-  <Edit>DocumentLibraryForm</Edit>
-  <New>DocumentLibraryForm</New>
-</FormTemplates>
-</file>
-
-<file path=customXml/item3.xml><?xml version="1.0" encoding="utf-8"?>
 <ct:contentTypeSchema xmlns:ct="http://schemas.microsoft.com/office/2006/metadata/contentType" xmlns:ma="http://schemas.microsoft.com/office/2006/metadata/properties/metaAttributes" ct:_="" ma:_="" ma:contentTypeName="Document" ma:contentTypeID="0x01010079F111ED35F8CC479449609E8A0923A6" ma:contentTypeVersion="21" ma:contentTypeDescription="Create a new document." ma:contentTypeScope="" ma:versionID="64dfb1555687e0874b4304b796b5b0c7">
   <xsd:schema xmlns:xsd="http://www.w3.org/2001/XMLSchema" xmlns:xs="http://www.w3.org/2001/XMLSchema" xmlns:p="http://schemas.microsoft.com/office/2006/metadata/properties" xmlns:ns1="http://schemas.microsoft.com/sharepoint/v3" xmlns:ns2="71af3243-3dd4-4a8d-8c0d-dd76da1f02a5" xmlns:ns3="16c05727-aa75-4e4a-9b5f-8a80a1165891" xmlns:ns4="230e9df3-be65-4c73-a93b-d1236ebd677e" targetNamespace="http://schemas.microsoft.com/office/2006/metadata/properties" ma:root="true" ma:fieldsID="e6e4c555b5e194d05b7203de9c4567b3" ns1:_="" ns2:_="" ns3:_="" ns4:_="">
     <xsd:import namespace="http://schemas.microsoft.com/sharepoint/v3"/>
@@ -18461,6 +18452,15 @@
 </ct:contentTypeSchema>
 </file>
 
+<file path=customXml/item3.xml><?xml version="1.0" encoding="utf-8"?>
+<?mso-contentType ?>
+<FormTemplates xmlns="http://schemas.microsoft.com/sharepoint/v3/contenttype/forms">
+  <Display>DocumentLibraryForm</Display>
+  <Edit>DocumentLibraryForm</Edit>
+  <New>DocumentLibraryForm</New>
+</FormTemplates>
+</file>
+
 <file path=customXml/itemProps1.xml><?xml version="1.0" encoding="utf-8"?>
 <ds:datastoreItem xmlns:ds="http://schemas.openxmlformats.org/officeDocument/2006/customXml" ds:itemID="{4D5BAB77-79E1-4739-AA51-10C9079186D6}">
   <ds:schemaRefs>
@@ -18474,14 +18474,6 @@
 </file>
 
 <file path=customXml/itemProps2.xml><?xml version="1.0" encoding="utf-8"?>
-<ds:datastoreItem xmlns:ds="http://schemas.openxmlformats.org/officeDocument/2006/customXml" ds:itemID="{85334180-0405-413B-834A-44FA9E05ADB7}">
-  <ds:schemaRefs>
-    <ds:schemaRef ds:uri="http://schemas.microsoft.com/sharepoint/v3/contenttype/forms"/>
-  </ds:schemaRefs>
-</ds:datastoreItem>
-</file>
-
-<file path=customXml/itemProps3.xml><?xml version="1.0" encoding="utf-8"?>
 <ds:datastoreItem xmlns:ds="http://schemas.openxmlformats.org/officeDocument/2006/customXml" ds:itemID="{4A615295-94F6-4CE2-A1B1-6B7E1DAA5AD6}">
   <ds:schemaRefs>
     <ds:schemaRef ds:uri="http://schemas.microsoft.com/office/2006/metadata/contentType"/>
@@ -18502,6 +18494,14 @@
 </ds:datastoreItem>
 </file>
 
+<file path=customXml/itemProps3.xml><?xml version="1.0" encoding="utf-8"?>
+<ds:datastoreItem xmlns:ds="http://schemas.openxmlformats.org/officeDocument/2006/customXml" ds:itemID="{85334180-0405-413B-834A-44FA9E05ADB7}">
+  <ds:schemaRefs>
+    <ds:schemaRef ds:uri="http://schemas.microsoft.com/sharepoint/v3/contenttype/forms"/>
+  </ds:schemaRefs>
+</ds:datastoreItem>
+</file>
+
 <file path=docMetadata/LabelInfo.xml><?xml version="1.0" encoding="utf-8"?>
 <clbl:labelList xmlns:clbl="http://schemas.microsoft.com/office/2020/mipLabelMetadata">
   <clbl:label id="{f42aa342-8706-4288-bd11-ebb85995028c}" enabled="1" method="Standard" siteId="{72f988bf-86f1-41af-91ab-2d7cd011db47}" removed="0"/>

</xml_diff>

<commit_message>
update presentation.pptx and 202.docx"
</commit_message>
<xml_diff>
--- a/year1-term2/SS/ct1/presentation.pptx
+++ b/year1-term2/SS/ct1/presentation.pptx
@@ -746,7 +746,7 @@
           <a:lstStyle/>
           <a:p>
             <a:pPr rtl="0"/>
-            <a:endParaRPr lang="uk-UA"/>
+            <a:endParaRPr lang="uk-UA" dirty="0"/>
           </a:p>
         </p:txBody>
       </p:sp>
@@ -831,7 +831,80 @@
           <a:bodyPr/>
           <a:lstStyle/>
           <a:p>
-            <a:endParaRPr lang="uk-UA"/>
+            <a:pPr marL="0" marR="0" lvl="0" indent="0" algn="l" defTabSz="914400" rtl="0" eaLnBrk="1" fontAlgn="auto" latinLnBrk="0" hangingPunct="1">
+              <a:lnSpc>
+                <a:spcPct val="100000"/>
+              </a:lnSpc>
+              <a:spcBef>
+                <a:spcPts val="0"/>
+              </a:spcBef>
+              <a:spcAft>
+                <a:spcPts val="0"/>
+              </a:spcAft>
+              <a:buClrTx/>
+              <a:buSzTx/>
+              <a:buFontTx/>
+              <a:buNone/>
+              <a:tabLst/>
+              <a:defRPr/>
+            </a:pPr>
+            <a:r>
+              <a:rPr lang="uk-UA" b="0" dirty="0">
+                <a:solidFill>
+                  <a:srgbClr val="FFE66D"/>
+                </a:solidFill>
+                <a:effectLst/>
+                <a:latin typeface="Cascadia Code" panose="020B0609020000020004" pitchFamily="49" charset="0"/>
+              </a:rPr>
+              <a:t>Управління пам'яттю: </a:t>
+            </a:r>
+            <a:r>
+              <a:rPr lang="en-US" b="0" dirty="0">
+                <a:solidFill>
+                  <a:srgbClr val="FFE66D"/>
+                </a:solidFill>
+                <a:effectLst/>
+                <a:latin typeface="Cascadia Code" panose="020B0609020000020004" pitchFamily="49" charset="0"/>
+              </a:rPr>
+              <a:t>Swift </a:t>
+            </a:r>
+            <a:r>
+              <a:rPr lang="uk-UA" b="0" dirty="0">
+                <a:solidFill>
+                  <a:srgbClr val="FFE66D"/>
+                </a:solidFill>
+                <a:effectLst/>
+                <a:latin typeface="Cascadia Code" panose="020B0609020000020004" pitchFamily="49" charset="0"/>
+              </a:rPr>
+              <a:t>використовує автоматичний підрахунок посилань (</a:t>
+            </a:r>
+            <a:r>
+              <a:rPr lang="en-US" b="0" dirty="0">
+                <a:solidFill>
+                  <a:srgbClr val="FFE66D"/>
+                </a:solidFill>
+                <a:effectLst/>
+                <a:latin typeface="Cascadia Code" panose="020B0609020000020004" pitchFamily="49" charset="0"/>
+              </a:rPr>
+              <a:t>ARC) </a:t>
+            </a:r>
+            <a:r>
+              <a:rPr lang="uk-UA" b="0" dirty="0">
+                <a:solidFill>
+                  <a:srgbClr val="FFE66D"/>
+                </a:solidFill>
+                <a:effectLst/>
+                <a:latin typeface="Cascadia Code" panose="020B0609020000020004" pitchFamily="49" charset="0"/>
+              </a:rPr>
+              <a:t>для керування пам'яттю, який автоматично звільняє пам'ять, коли вона більше не використовується. Це допомагає розробникам писати більш ефективний код і зменшує ризик витоку пам'яті.</a:t>
+            </a:r>
+            <a:endParaRPr lang="uk-UA" b="0" dirty="0">
+              <a:solidFill>
+                <a:srgbClr val="D5CED9"/>
+              </a:solidFill>
+              <a:effectLst/>
+              <a:latin typeface="Cascadia Code" panose="020B0609020000020004" pitchFamily="49" charset="0"/>
+            </a:endParaRPr>
           </a:p>
         </p:txBody>
       </p:sp>
@@ -916,7 +989,60 @@
           <a:bodyPr/>
           <a:lstStyle/>
           <a:p>
-            <a:endParaRPr lang="uk-UA"/>
+            <a:pPr marL="0" marR="0" lvl="0" indent="0" algn="l" defTabSz="914400" rtl="0" eaLnBrk="1" fontAlgn="auto" latinLnBrk="0" hangingPunct="1">
+              <a:lnSpc>
+                <a:spcPct val="100000"/>
+              </a:lnSpc>
+              <a:spcBef>
+                <a:spcPts val="0"/>
+              </a:spcBef>
+              <a:spcAft>
+                <a:spcPts val="0"/>
+              </a:spcAft>
+              <a:buClrTx/>
+              <a:buSzTx/>
+              <a:buFontTx/>
+              <a:buNone/>
+              <a:tabLst/>
+              <a:defRPr/>
+            </a:pPr>
+            <a:r>
+              <a:rPr lang="uk-UA" b="0" dirty="0">
+                <a:solidFill>
+                  <a:srgbClr val="FFE66D"/>
+                </a:solidFill>
+                <a:effectLst/>
+                <a:latin typeface="Cascadia Code" panose="020B0609020000020004" pitchFamily="49" charset="0"/>
+              </a:rPr>
+              <a:t>Функціональне програмування: </a:t>
+            </a:r>
+            <a:r>
+              <a:rPr lang="en-US" b="0" dirty="0">
+                <a:solidFill>
+                  <a:srgbClr val="FFE66D"/>
+                </a:solidFill>
+                <a:effectLst/>
+                <a:latin typeface="Cascadia Code" panose="020B0609020000020004" pitchFamily="49" charset="0"/>
+              </a:rPr>
+              <a:t>Swift </a:t>
+            </a:r>
+            <a:r>
+              <a:rPr lang="uk-UA" b="0" dirty="0">
+                <a:solidFill>
+                  <a:srgbClr val="FFE66D"/>
+                </a:solidFill>
+                <a:effectLst/>
+                <a:latin typeface="Cascadia Code" panose="020B0609020000020004" pitchFamily="49" charset="0"/>
+              </a:rPr>
+              <a:t>підтримує такі концепції функціонального програмування, як замикання, відображення, фільтрування та скорочення, які дозволяють розробникам писати більш стислий та зрозумілий код. Це полегшує написання складних додатків і зменшує кількість коду, який потрібно створити.</a:t>
+            </a:r>
+            <a:endParaRPr lang="uk-UA" b="0" dirty="0">
+              <a:solidFill>
+                <a:srgbClr val="D5CED9"/>
+              </a:solidFill>
+              <a:effectLst/>
+              <a:latin typeface="Cascadia Code" panose="020B0609020000020004" pitchFamily="49" charset="0"/>
+            </a:endParaRPr>
           </a:p>
         </p:txBody>
       </p:sp>
@@ -1001,7 +1127,113 @@
           <a:bodyPr/>
           <a:lstStyle/>
           <a:p>
-            <a:endParaRPr lang="uk-UA"/>
+            <a:pPr marL="0" marR="0" lvl="0" indent="0" algn="l" defTabSz="914400" rtl="0" eaLnBrk="1" fontAlgn="auto" latinLnBrk="0" hangingPunct="1">
+              <a:lnSpc>
+                <a:spcPct val="100000"/>
+              </a:lnSpc>
+              <a:spcBef>
+                <a:spcPts val="0"/>
+              </a:spcBef>
+              <a:spcAft>
+                <a:spcPts val="0"/>
+              </a:spcAft>
+              <a:buClrTx/>
+              <a:buSzTx/>
+              <a:buFontTx/>
+              <a:buNone/>
+              <a:tabLst/>
+              <a:defRPr/>
+            </a:pPr>
+            <a:r>
+              <a:rPr lang="uk-UA" b="0" dirty="0">
+                <a:solidFill>
+                  <a:srgbClr val="D5CED9"/>
+                </a:solidFill>
+                <a:effectLst/>
+                <a:latin typeface="Cascadia Code" panose="020B0609020000020004" pitchFamily="49" charset="0"/>
+              </a:rPr>
+              <a:t>Отже, </a:t>
+            </a:r>
+            <a:r>
+              <a:rPr lang="en-US" b="0" dirty="0">
+                <a:solidFill>
+                  <a:srgbClr val="D5CED9"/>
+                </a:solidFill>
+                <a:effectLst/>
+                <a:latin typeface="Cascadia Code" panose="020B0609020000020004" pitchFamily="49" charset="0"/>
+              </a:rPr>
+              <a:t>Swift - </a:t>
+            </a:r>
+            <a:r>
+              <a:rPr lang="uk-UA" b="0" dirty="0">
+                <a:solidFill>
+                  <a:srgbClr val="D5CED9"/>
+                </a:solidFill>
+                <a:effectLst/>
+                <a:latin typeface="Cascadia Code" panose="020B0609020000020004" pitchFamily="49" charset="0"/>
+              </a:rPr>
+              <a:t>це потужна та інтуїтивно зрозуміла мова програмування, яка стала незамінним інструментом для розробників, що створюють додатки для платформ </a:t>
+            </a:r>
+            <a:r>
+              <a:rPr lang="en-US" b="0" dirty="0">
+                <a:solidFill>
+                  <a:srgbClr val="D5CED9"/>
+                </a:solidFill>
+                <a:effectLst/>
+                <a:latin typeface="Cascadia Code" panose="020B0609020000020004" pitchFamily="49" charset="0"/>
+              </a:rPr>
+              <a:t>Apple. </a:t>
+            </a:r>
+            <a:r>
+              <a:rPr lang="uk-UA" b="0" dirty="0">
+                <a:solidFill>
+                  <a:srgbClr val="D5CED9"/>
+                </a:solidFill>
+                <a:effectLst/>
+                <a:latin typeface="Cascadia Code" panose="020B0609020000020004" pitchFamily="49" charset="0"/>
+              </a:rPr>
+              <a:t>Безпека, швидкість, простота використання, сумісність з </a:t>
+            </a:r>
+            <a:r>
+              <a:rPr lang="en-US" b="0" dirty="0">
+                <a:solidFill>
+                  <a:srgbClr val="D5CED9"/>
+                </a:solidFill>
+                <a:effectLst/>
+                <a:latin typeface="Cascadia Code" panose="020B0609020000020004" pitchFamily="49" charset="0"/>
+              </a:rPr>
+              <a:t>Objective-C </a:t>
+            </a:r>
+            <a:r>
+              <a:rPr lang="uk-UA" b="0" dirty="0">
+                <a:solidFill>
+                  <a:srgbClr val="D5CED9"/>
+                </a:solidFill>
+                <a:effectLst/>
+                <a:latin typeface="Cascadia Code" panose="020B0609020000020004" pitchFamily="49" charset="0"/>
+              </a:rPr>
+              <a:t>та підтримка функціональних концепцій програмування роблять її популярним вибором серед розробників. Очікується, що завдяки відкритому коду та зростаючій спільноті розробників </a:t>
+            </a:r>
+            <a:r>
+              <a:rPr lang="en-US" b="0" dirty="0">
+                <a:solidFill>
+                  <a:srgbClr val="D5CED9"/>
+                </a:solidFill>
+                <a:effectLst/>
+                <a:latin typeface="Cascadia Code" panose="020B0609020000020004" pitchFamily="49" charset="0"/>
+              </a:rPr>
+              <a:t>Swift </a:t>
+            </a:r>
+            <a:r>
+              <a:rPr lang="uk-UA" b="0" dirty="0">
+                <a:solidFill>
+                  <a:srgbClr val="D5CED9"/>
+                </a:solidFill>
+                <a:effectLst/>
+                <a:latin typeface="Cascadia Code" panose="020B0609020000020004" pitchFamily="49" charset="0"/>
+              </a:rPr>
+              <a:t>продовжуватиме розвиватися та вдосконалюватися, що зробить його ще більш універсальним та потужним інструментом у майбутньому.</a:t>
+            </a:r>
           </a:p>
         </p:txBody>
       </p:sp>
@@ -1256,7 +1488,176 @@
           <a:bodyPr/>
           <a:lstStyle/>
           <a:p>
-            <a:endParaRPr lang="uk-UA"/>
+            <a:r>
+              <a:rPr lang="en-US" b="0" dirty="0">
+                <a:solidFill>
+                  <a:srgbClr val="D5CED9"/>
+                </a:solidFill>
+                <a:effectLst/>
+                <a:latin typeface="Cascadia Code" panose="020B0609020000020004" pitchFamily="49" charset="0"/>
+              </a:rPr>
+              <a:t>Swift - </a:t>
+            </a:r>
+            <a:r>
+              <a:rPr lang="uk-UA" b="0" dirty="0">
+                <a:solidFill>
+                  <a:srgbClr val="D5CED9"/>
+                </a:solidFill>
+                <a:effectLst/>
+                <a:latin typeface="Cascadia Code" panose="020B0609020000020004" pitchFamily="49" charset="0"/>
+              </a:rPr>
+              <a:t>це потужна та легка у використанні мова програмування, розроблена компанією </a:t>
+            </a:r>
+            <a:r>
+              <a:rPr lang="en-US" b="0" dirty="0">
+                <a:solidFill>
+                  <a:srgbClr val="D5CED9"/>
+                </a:solidFill>
+                <a:effectLst/>
+                <a:latin typeface="Cascadia Code" panose="020B0609020000020004" pitchFamily="49" charset="0"/>
+              </a:rPr>
+              <a:t>Apple Inc. </a:t>
+            </a:r>
+            <a:r>
+              <a:rPr lang="uk-UA" b="0" dirty="0">
+                <a:solidFill>
+                  <a:srgbClr val="D5CED9"/>
+                </a:solidFill>
+                <a:effectLst/>
+                <a:latin typeface="Cascadia Code" panose="020B0609020000020004" pitchFamily="49" charset="0"/>
+              </a:rPr>
+              <a:t>для створення додатків для платформ </a:t>
+            </a:r>
+            <a:r>
+              <a:rPr lang="en-US" b="0" dirty="0">
+                <a:solidFill>
+                  <a:srgbClr val="D5CED9"/>
+                </a:solidFill>
+                <a:effectLst/>
+                <a:latin typeface="Cascadia Code" panose="020B0609020000020004" pitchFamily="49" charset="0"/>
+              </a:rPr>
+              <a:t>iOS, macOS, </a:t>
+            </a:r>
+            <a:r>
+              <a:rPr lang="en-US" b="0" dirty="0" err="1">
+                <a:solidFill>
+                  <a:srgbClr val="D5CED9"/>
+                </a:solidFill>
+                <a:effectLst/>
+                <a:latin typeface="Cascadia Code" panose="020B0609020000020004" pitchFamily="49" charset="0"/>
+              </a:rPr>
+              <a:t>watchOS</a:t>
+            </a:r>
+            <a:r>
+              <a:rPr lang="en-US" b="0" dirty="0">
+                <a:solidFill>
+                  <a:srgbClr val="D5CED9"/>
+                </a:solidFill>
+                <a:effectLst/>
+                <a:latin typeface="Cascadia Code" panose="020B0609020000020004" pitchFamily="49" charset="0"/>
+              </a:rPr>
+              <a:t> </a:t>
+            </a:r>
+            <a:r>
+              <a:rPr lang="uk-UA" b="0" dirty="0">
+                <a:solidFill>
+                  <a:srgbClr val="D5CED9"/>
+                </a:solidFill>
+                <a:effectLst/>
+                <a:latin typeface="Cascadia Code" panose="020B0609020000020004" pitchFamily="49" charset="0"/>
+              </a:rPr>
+              <a:t>та </a:t>
+            </a:r>
+            <a:r>
+              <a:rPr lang="en-US" b="0" dirty="0" err="1">
+                <a:solidFill>
+                  <a:srgbClr val="D5CED9"/>
+                </a:solidFill>
+                <a:effectLst/>
+                <a:latin typeface="Cascadia Code" panose="020B0609020000020004" pitchFamily="49" charset="0"/>
+              </a:rPr>
+              <a:t>tvOS</a:t>
+            </a:r>
+            <a:r>
+              <a:rPr lang="en-US" b="0" dirty="0">
+                <a:solidFill>
+                  <a:srgbClr val="D5CED9"/>
+                </a:solidFill>
+                <a:effectLst/>
+                <a:latin typeface="Cascadia Code" panose="020B0609020000020004" pitchFamily="49" charset="0"/>
+              </a:rPr>
+              <a:t>. </a:t>
+            </a:r>
+            <a:r>
+              <a:rPr lang="uk-UA" b="0" dirty="0">
+                <a:solidFill>
+                  <a:srgbClr val="D5CED9"/>
+                </a:solidFill>
+                <a:effectLst/>
+                <a:latin typeface="Cascadia Code" panose="020B0609020000020004" pitchFamily="49" charset="0"/>
+              </a:rPr>
+              <a:t>Вперше вона була представлена у 2014 році як заміна </a:t>
+            </a:r>
+            <a:r>
+              <a:rPr lang="en-US" b="0" dirty="0">
+                <a:solidFill>
+                  <a:srgbClr val="D5CED9"/>
+                </a:solidFill>
+                <a:effectLst/>
+                <a:latin typeface="Cascadia Code" panose="020B0609020000020004" pitchFamily="49" charset="0"/>
+              </a:rPr>
+              <a:t>Objective-C, </a:t>
+            </a:r>
+            <a:r>
+              <a:rPr lang="uk-UA" b="0" dirty="0">
+                <a:solidFill>
+                  <a:srgbClr val="D5CED9"/>
+                </a:solidFill>
+                <a:effectLst/>
+                <a:latin typeface="Cascadia Code" panose="020B0609020000020004" pitchFamily="49" charset="0"/>
+              </a:rPr>
+              <a:t>яка була основною мовою програмування для платформ </a:t>
+            </a:r>
+            <a:r>
+              <a:rPr lang="en-US" b="0" dirty="0">
+                <a:solidFill>
+                  <a:srgbClr val="D5CED9"/>
+                </a:solidFill>
+                <a:effectLst/>
+                <a:latin typeface="Cascadia Code" panose="020B0609020000020004" pitchFamily="49" charset="0"/>
+              </a:rPr>
+              <a:t>Apple. </a:t>
+            </a:r>
+            <a:r>
+              <a:rPr lang="uk-UA" b="0" dirty="0">
+                <a:solidFill>
+                  <a:srgbClr val="D5CED9"/>
+                </a:solidFill>
+                <a:effectLst/>
+                <a:latin typeface="Cascadia Code" panose="020B0609020000020004" pitchFamily="49" charset="0"/>
+              </a:rPr>
+              <a:t>У цій доповіді ми обговоримо особливості мови програмування </a:t>
+            </a:r>
+            <a:r>
+              <a:rPr lang="en-US" b="0" dirty="0">
+                <a:solidFill>
+                  <a:srgbClr val="D5CED9"/>
+                </a:solidFill>
+                <a:effectLst/>
+                <a:latin typeface="Cascadia Code" panose="020B0609020000020004" pitchFamily="49" charset="0"/>
+              </a:rPr>
+              <a:t>Swift, </a:t>
+            </a:r>
+            <a:r>
+              <a:rPr lang="uk-UA" b="0" dirty="0">
+                <a:solidFill>
+                  <a:srgbClr val="D5CED9"/>
+                </a:solidFill>
+                <a:effectLst/>
+                <a:latin typeface="Cascadia Code" panose="020B0609020000020004" pitchFamily="49" charset="0"/>
+              </a:rPr>
+              <a:t>які роблять її популярним вибором серед розробників.</a:t>
+            </a:r>
           </a:p>
         </p:txBody>
       </p:sp>
@@ -1341,7 +1742,80 @@
           <a:bodyPr/>
           <a:lstStyle/>
           <a:p>
-            <a:endParaRPr lang="uk-UA"/>
+            <a:pPr marL="0" marR="0" lvl="0" indent="0" algn="l" defTabSz="914400" rtl="0" eaLnBrk="1" fontAlgn="auto" latinLnBrk="0" hangingPunct="1">
+              <a:lnSpc>
+                <a:spcPct val="100000"/>
+              </a:lnSpc>
+              <a:spcBef>
+                <a:spcPts val="0"/>
+              </a:spcBef>
+              <a:spcAft>
+                <a:spcPts val="0"/>
+              </a:spcAft>
+              <a:buClrTx/>
+              <a:buSzTx/>
+              <a:buFontTx/>
+              <a:buNone/>
+              <a:tabLst/>
+              <a:defRPr/>
+            </a:pPr>
+            <a:r>
+              <a:rPr lang="uk-UA" b="0" dirty="0">
+                <a:solidFill>
+                  <a:srgbClr val="FFE66D"/>
+                </a:solidFill>
+                <a:effectLst/>
+                <a:latin typeface="Cascadia Code" panose="020B0609020000020004" pitchFamily="49" charset="0"/>
+              </a:rPr>
+              <a:t>Легкість у вивченні: </a:t>
+            </a:r>
+            <a:r>
+              <a:rPr lang="en-US" b="0" dirty="0">
+                <a:solidFill>
+                  <a:srgbClr val="FFE66D"/>
+                </a:solidFill>
+                <a:effectLst/>
+                <a:latin typeface="Cascadia Code" panose="020B0609020000020004" pitchFamily="49" charset="0"/>
+              </a:rPr>
+              <a:t>Swift - </a:t>
+            </a:r>
+            <a:r>
+              <a:rPr lang="uk-UA" b="0" dirty="0">
+                <a:solidFill>
+                  <a:srgbClr val="FFE66D"/>
+                </a:solidFill>
+                <a:effectLst/>
+                <a:latin typeface="Cascadia Code" panose="020B0609020000020004" pitchFamily="49" charset="0"/>
+              </a:rPr>
+              <a:t>це проста у вивченні мова програмування, яка розроблена таким чином, щоб бути більш доступною, ніж її попередник </a:t>
+            </a:r>
+            <a:r>
+              <a:rPr lang="en-US" b="0" dirty="0">
+                <a:solidFill>
+                  <a:srgbClr val="FFE66D"/>
+                </a:solidFill>
+                <a:effectLst/>
+                <a:latin typeface="Cascadia Code" panose="020B0609020000020004" pitchFamily="49" charset="0"/>
+              </a:rPr>
+              <a:t>Objective-C. </a:t>
+            </a:r>
+            <a:r>
+              <a:rPr lang="uk-UA" b="0" dirty="0">
+                <a:solidFill>
+                  <a:srgbClr val="FFE66D"/>
+                </a:solidFill>
+                <a:effectLst/>
+                <a:latin typeface="Cascadia Code" panose="020B0609020000020004" pitchFamily="49" charset="0"/>
+              </a:rPr>
+              <a:t>Вона має чіткий і лаконічний синтаксис, що полегшує розробникам читання та написання коду. Мова також забезпечує своєрідне ігрове середовище, де розробники можуть експериментувати та тестувати свій код у реальному часі.</a:t>
+            </a:r>
+            <a:endParaRPr lang="uk-UA" b="0" dirty="0">
+              <a:solidFill>
+                <a:srgbClr val="D5CED9"/>
+              </a:solidFill>
+              <a:effectLst/>
+              <a:latin typeface="Cascadia Code" panose="020B0609020000020004" pitchFamily="49" charset="0"/>
+            </a:endParaRPr>
           </a:p>
         </p:txBody>
       </p:sp>
@@ -1426,7 +1900,100 @@
           <a:bodyPr/>
           <a:lstStyle/>
           <a:p>
-            <a:endParaRPr lang="uk-UA"/>
+            <a:pPr marL="0" marR="0" lvl="0" indent="0" algn="l" defTabSz="914400" rtl="0" eaLnBrk="1" fontAlgn="auto" latinLnBrk="0" hangingPunct="1">
+              <a:lnSpc>
+                <a:spcPct val="100000"/>
+              </a:lnSpc>
+              <a:spcBef>
+                <a:spcPts val="0"/>
+              </a:spcBef>
+              <a:spcAft>
+                <a:spcPts val="0"/>
+              </a:spcAft>
+              <a:buClrTx/>
+              <a:buSzTx/>
+              <a:buFontTx/>
+              <a:buNone/>
+              <a:tabLst/>
+              <a:defRPr/>
+            </a:pPr>
+            <a:r>
+              <a:rPr lang="uk-UA" b="0" dirty="0">
+                <a:solidFill>
+                  <a:srgbClr val="FFE66D"/>
+                </a:solidFill>
+                <a:effectLst/>
+                <a:latin typeface="Cascadia Code" panose="020B0609020000020004" pitchFamily="49" charset="0"/>
+              </a:rPr>
+              <a:t>Інтерактивність: </a:t>
+            </a:r>
+            <a:r>
+              <a:rPr lang="en-US" b="0" dirty="0">
+                <a:solidFill>
+                  <a:srgbClr val="FFE66D"/>
+                </a:solidFill>
+                <a:effectLst/>
+                <a:latin typeface="Cascadia Code" panose="020B0609020000020004" pitchFamily="49" charset="0"/>
+              </a:rPr>
+              <a:t>Swift </a:t>
+            </a:r>
+            <a:r>
+              <a:rPr lang="uk-UA" b="0" dirty="0">
+                <a:solidFill>
+                  <a:srgbClr val="FFE66D"/>
+                </a:solidFill>
+                <a:effectLst/>
+                <a:latin typeface="Cascadia Code" panose="020B0609020000020004" pitchFamily="49" charset="0"/>
+              </a:rPr>
+              <a:t>має цикл </a:t>
+            </a:r>
+            <a:r>
+              <a:rPr lang="en-US" b="0" dirty="0">
+                <a:solidFill>
+                  <a:srgbClr val="FFE66D"/>
+                </a:solidFill>
+                <a:effectLst/>
+                <a:latin typeface="Cascadia Code" panose="020B0609020000020004" pitchFamily="49" charset="0"/>
+              </a:rPr>
+              <a:t>REPL (Read-Eval-Print Loop), </a:t>
+            </a:r>
+            <a:r>
+              <a:rPr lang="uk-UA" b="0" dirty="0">
+                <a:solidFill>
+                  <a:srgbClr val="FFE66D"/>
+                </a:solidFill>
+                <a:effectLst/>
+                <a:latin typeface="Cascadia Code" panose="020B0609020000020004" pitchFamily="49" charset="0"/>
+              </a:rPr>
+              <a:t>який дозволяє розробникам експериментувати з кодом і одразу бачити результати. Це полегшує вивчення та </a:t>
+            </a:r>
+            <a:r>
+              <a:rPr lang="uk-UA" b="0" dirty="0" err="1">
+                <a:solidFill>
+                  <a:srgbClr val="FFE66D"/>
+                </a:solidFill>
+                <a:effectLst/>
+                <a:latin typeface="Cascadia Code" panose="020B0609020000020004" pitchFamily="49" charset="0"/>
+              </a:rPr>
+              <a:t>відлагодження</a:t>
+            </a:r>
+            <a:r>
+              <a:rPr lang="uk-UA" b="0" dirty="0">
+                <a:solidFill>
+                  <a:srgbClr val="FFE66D"/>
+                </a:solidFill>
+                <a:effectLst/>
+                <a:latin typeface="Cascadia Code" panose="020B0609020000020004" pitchFamily="49" charset="0"/>
+              </a:rPr>
+              <a:t> коду.</a:t>
+            </a:r>
+            <a:endParaRPr lang="uk-UA" b="0" dirty="0">
+              <a:solidFill>
+                <a:srgbClr val="D5CED9"/>
+              </a:solidFill>
+              <a:effectLst/>
+              <a:latin typeface="Cascadia Code" panose="020B0609020000020004" pitchFamily="49" charset="0"/>
+            </a:endParaRPr>
           </a:p>
         </p:txBody>
       </p:sp>
@@ -1511,7 +2078,80 @@
           <a:bodyPr/>
           <a:lstStyle/>
           <a:p>
-            <a:endParaRPr lang="uk-UA"/>
+            <a:pPr marL="0" marR="0" lvl="0" indent="0" algn="l" defTabSz="914400" rtl="0" eaLnBrk="1" fontAlgn="auto" latinLnBrk="0" hangingPunct="1">
+              <a:lnSpc>
+                <a:spcPct val="100000"/>
+              </a:lnSpc>
+              <a:spcBef>
+                <a:spcPts val="0"/>
+              </a:spcBef>
+              <a:spcAft>
+                <a:spcPts val="0"/>
+              </a:spcAft>
+              <a:buClrTx/>
+              <a:buSzTx/>
+              <a:buFontTx/>
+              <a:buNone/>
+              <a:tabLst/>
+              <a:defRPr/>
+            </a:pPr>
+            <a:r>
+              <a:rPr lang="uk-UA" b="0" dirty="0">
+                <a:solidFill>
+                  <a:srgbClr val="FFE66D"/>
+                </a:solidFill>
+                <a:effectLst/>
+                <a:latin typeface="Cascadia Code" panose="020B0609020000020004" pitchFamily="49" charset="0"/>
+              </a:rPr>
+              <a:t>Відкритий вихідний код: </a:t>
+            </a:r>
+            <a:r>
+              <a:rPr lang="en-US" b="0" dirty="0">
+                <a:solidFill>
+                  <a:srgbClr val="FFE66D"/>
+                </a:solidFill>
+                <a:effectLst/>
+                <a:latin typeface="Cascadia Code" panose="020B0609020000020004" pitchFamily="49" charset="0"/>
+              </a:rPr>
+              <a:t>Swift - </a:t>
+            </a:r>
+            <a:r>
+              <a:rPr lang="uk-UA" b="0" dirty="0">
+                <a:solidFill>
+                  <a:srgbClr val="FFE66D"/>
+                </a:solidFill>
+                <a:effectLst/>
+                <a:latin typeface="Cascadia Code" panose="020B0609020000020004" pitchFamily="49" charset="0"/>
+              </a:rPr>
+              <a:t>це мова програмування з відкритим вихідним кодом, що означає, що розробники можуть долучатися до розвитку мови та використовувати код у своїх </a:t>
+            </a:r>
+            <a:r>
+              <a:rPr lang="uk-UA" b="0" dirty="0" err="1">
+                <a:solidFill>
+                  <a:srgbClr val="FFE66D"/>
+                </a:solidFill>
+                <a:effectLst/>
+                <a:latin typeface="Cascadia Code" panose="020B0609020000020004" pitchFamily="49" charset="0"/>
+              </a:rPr>
+              <a:t>проєктах</a:t>
+            </a:r>
+            <a:r>
+              <a:rPr lang="uk-UA" b="0" dirty="0">
+                <a:solidFill>
+                  <a:srgbClr val="FFE66D"/>
+                </a:solidFill>
+                <a:effectLst/>
+                <a:latin typeface="Cascadia Code" panose="020B0609020000020004" pitchFamily="49" charset="0"/>
+              </a:rPr>
+              <a:t>. Це призвело до створення великої спільноти розробників, які постійно вдосконалюють мову та додають до неї нові функції.</a:t>
+            </a:r>
+            <a:endParaRPr lang="uk-UA" b="0" dirty="0">
+              <a:solidFill>
+                <a:srgbClr val="D5CED9"/>
+              </a:solidFill>
+              <a:effectLst/>
+              <a:latin typeface="Cascadia Code" panose="020B0609020000020004" pitchFamily="49" charset="0"/>
+            </a:endParaRPr>
           </a:p>
         </p:txBody>
       </p:sp>
@@ -1596,7 +2236,80 @@
           <a:bodyPr/>
           <a:lstStyle/>
           <a:p>
-            <a:endParaRPr lang="uk-UA"/>
+            <a:pPr marL="0" marR="0" lvl="0" indent="0" algn="l" defTabSz="914400" rtl="0" eaLnBrk="1" fontAlgn="auto" latinLnBrk="0" hangingPunct="1">
+              <a:lnSpc>
+                <a:spcPct val="100000"/>
+              </a:lnSpc>
+              <a:spcBef>
+                <a:spcPts val="0"/>
+              </a:spcBef>
+              <a:spcAft>
+                <a:spcPts val="0"/>
+              </a:spcAft>
+              <a:buClrTx/>
+              <a:buSzTx/>
+              <a:buFontTx/>
+              <a:buNone/>
+              <a:tabLst/>
+              <a:defRPr/>
+            </a:pPr>
+            <a:r>
+              <a:rPr lang="uk-UA" b="0" dirty="0">
+                <a:solidFill>
+                  <a:srgbClr val="FFE66D"/>
+                </a:solidFill>
+                <a:effectLst/>
+                <a:latin typeface="Cascadia Code" panose="020B0609020000020004" pitchFamily="49" charset="0"/>
+              </a:rPr>
+              <a:t>Безпечна та швидка: </a:t>
+            </a:r>
+            <a:r>
+              <a:rPr lang="en-US" b="0" dirty="0">
+                <a:solidFill>
+                  <a:srgbClr val="FFE66D"/>
+                </a:solidFill>
+                <a:effectLst/>
+                <a:latin typeface="Cascadia Code" panose="020B0609020000020004" pitchFamily="49" charset="0"/>
+              </a:rPr>
+              <a:t>Swift - </a:t>
+            </a:r>
+            <a:r>
+              <a:rPr lang="uk-UA" b="0" dirty="0">
+                <a:solidFill>
+                  <a:srgbClr val="FFE66D"/>
+                </a:solidFill>
+                <a:effectLst/>
+                <a:latin typeface="Cascadia Code" panose="020B0609020000020004" pitchFamily="49" charset="0"/>
+              </a:rPr>
+              <a:t>це безпечна та швидка мова програмування, яка забезпечує надійність коду, усуваючи типові помилки при розробці. Вона використовує сучасні концепції програмування, такі як </a:t>
+            </a:r>
+            <a:r>
+              <a:rPr lang="uk-UA" b="0" dirty="0" err="1">
+                <a:solidFill>
+                  <a:srgbClr val="FFE66D"/>
+                </a:solidFill>
+                <a:effectLst/>
+                <a:latin typeface="Cascadia Code" panose="020B0609020000020004" pitchFamily="49" charset="0"/>
+              </a:rPr>
+              <a:t>опціональні</a:t>
+            </a:r>
+            <a:r>
+              <a:rPr lang="uk-UA" b="0" dirty="0">
+                <a:solidFill>
+                  <a:srgbClr val="FFE66D"/>
+                </a:solidFill>
+                <a:effectLst/>
+                <a:latin typeface="Cascadia Code" panose="020B0609020000020004" pitchFamily="49" charset="0"/>
+              </a:rPr>
+              <a:t> змінні, інтерференція типів та обробка помилок, завдяки яким код стає безпечнішим та ефективнішим.</a:t>
+            </a:r>
+            <a:endParaRPr lang="uk-UA" b="0" dirty="0">
+              <a:solidFill>
+                <a:srgbClr val="D5CED9"/>
+              </a:solidFill>
+              <a:effectLst/>
+              <a:latin typeface="Cascadia Code" panose="020B0609020000020004" pitchFamily="49" charset="0"/>
+            </a:endParaRPr>
           </a:p>
         </p:txBody>
       </p:sp>
@@ -1681,7 +2394,60 @@
           <a:bodyPr/>
           <a:lstStyle/>
           <a:p>
-            <a:endParaRPr lang="uk-UA"/>
+            <a:pPr marL="0" marR="0" lvl="0" indent="0" algn="l" defTabSz="914400" rtl="0" eaLnBrk="1" fontAlgn="auto" latinLnBrk="0" hangingPunct="1">
+              <a:lnSpc>
+                <a:spcPct val="100000"/>
+              </a:lnSpc>
+              <a:spcBef>
+                <a:spcPts val="0"/>
+              </a:spcBef>
+              <a:spcAft>
+                <a:spcPts val="0"/>
+              </a:spcAft>
+              <a:buClrTx/>
+              <a:buSzTx/>
+              <a:buFontTx/>
+              <a:buNone/>
+              <a:tabLst/>
+              <a:defRPr/>
+            </a:pPr>
+            <a:r>
+              <a:rPr lang="uk-UA" b="0" dirty="0">
+                <a:solidFill>
+                  <a:srgbClr val="FFE66D"/>
+                </a:solidFill>
+                <a:effectLst/>
+                <a:latin typeface="Cascadia Code" panose="020B0609020000020004" pitchFamily="49" charset="0"/>
+              </a:rPr>
+              <a:t>Багатозадачність: </a:t>
+            </a:r>
+            <a:r>
+              <a:rPr lang="en-US" b="0" dirty="0">
+                <a:solidFill>
+                  <a:srgbClr val="FFE66D"/>
+                </a:solidFill>
+                <a:effectLst/>
+                <a:latin typeface="Cascadia Code" panose="020B0609020000020004" pitchFamily="49" charset="0"/>
+              </a:rPr>
+              <a:t>Swift </a:t>
+            </a:r>
+            <a:r>
+              <a:rPr lang="uk-UA" b="0" dirty="0">
+                <a:solidFill>
+                  <a:srgbClr val="FFE66D"/>
+                </a:solidFill>
+                <a:effectLst/>
+                <a:latin typeface="Cascadia Code" panose="020B0609020000020004" pitchFamily="49" charset="0"/>
+              </a:rPr>
+              <a:t>має вбудовану підтримку багатозадачності, що дозволяє розробникам писати код, який може виконувати кілька завдань одночасно. Це може зробити код більш ефективним та гнучким.</a:t>
+            </a:r>
+            <a:endParaRPr lang="uk-UA" b="0" dirty="0">
+              <a:solidFill>
+                <a:srgbClr val="D5CED9"/>
+              </a:solidFill>
+              <a:effectLst/>
+              <a:latin typeface="Cascadia Code" panose="020B0609020000020004" pitchFamily="49" charset="0"/>
+            </a:endParaRPr>
           </a:p>
         </p:txBody>
       </p:sp>
@@ -1766,7 +2532,130 @@
           <a:bodyPr/>
           <a:lstStyle/>
           <a:p>
-            <a:endParaRPr lang="uk-UA"/>
+            <a:pPr marL="0" marR="0" lvl="0" indent="0" algn="l" defTabSz="914400" rtl="0" eaLnBrk="1" fontAlgn="auto" latinLnBrk="0" hangingPunct="1">
+              <a:lnSpc>
+                <a:spcPct val="100000"/>
+              </a:lnSpc>
+              <a:spcBef>
+                <a:spcPts val="0"/>
+              </a:spcBef>
+              <a:spcAft>
+                <a:spcPts val="0"/>
+              </a:spcAft>
+              <a:buClrTx/>
+              <a:buSzTx/>
+              <a:buFontTx/>
+              <a:buNone/>
+              <a:tabLst/>
+              <a:defRPr/>
+            </a:pPr>
+            <a:r>
+              <a:rPr lang="uk-UA" b="0" dirty="0" err="1">
+                <a:solidFill>
+                  <a:srgbClr val="FFE66D"/>
+                </a:solidFill>
+                <a:effectLst/>
+                <a:latin typeface="Cascadia Code" panose="020B0609020000020004" pitchFamily="49" charset="0"/>
+              </a:rPr>
+              <a:t>Інтероперабельність</a:t>
+            </a:r>
+            <a:r>
+              <a:rPr lang="uk-UA" b="0" dirty="0">
+                <a:solidFill>
+                  <a:srgbClr val="FFE66D"/>
+                </a:solidFill>
+                <a:effectLst/>
+                <a:latin typeface="Cascadia Code" panose="020B0609020000020004" pitchFamily="49" charset="0"/>
+              </a:rPr>
+              <a:t>: </a:t>
+            </a:r>
+            <a:r>
+              <a:rPr lang="en-US" b="0" dirty="0">
+                <a:solidFill>
+                  <a:srgbClr val="FFE66D"/>
+                </a:solidFill>
+                <a:effectLst/>
+                <a:latin typeface="Cascadia Code" panose="020B0609020000020004" pitchFamily="49" charset="0"/>
+              </a:rPr>
+              <a:t>Swift </a:t>
+            </a:r>
+            <a:r>
+              <a:rPr lang="uk-UA" b="0" dirty="0">
+                <a:solidFill>
+                  <a:srgbClr val="FFE66D"/>
+                </a:solidFill>
+                <a:effectLst/>
+                <a:latin typeface="Cascadia Code" panose="020B0609020000020004" pitchFamily="49" charset="0"/>
+              </a:rPr>
+              <a:t>розроблена з урахуванням сумісності з </a:t>
+            </a:r>
+            <a:r>
+              <a:rPr lang="en-US" b="0" dirty="0">
+                <a:solidFill>
+                  <a:srgbClr val="FFE66D"/>
+                </a:solidFill>
+                <a:effectLst/>
+                <a:latin typeface="Cascadia Code" panose="020B0609020000020004" pitchFamily="49" charset="0"/>
+              </a:rPr>
+              <a:t>Objective-C, </a:t>
+            </a:r>
+            <a:r>
+              <a:rPr lang="uk-UA" b="0" dirty="0">
+                <a:solidFill>
+                  <a:srgbClr val="FFE66D"/>
+                </a:solidFill>
+                <a:effectLst/>
+                <a:latin typeface="Cascadia Code" panose="020B0609020000020004" pitchFamily="49" charset="0"/>
+              </a:rPr>
+              <a:t>а це означає, що розробники можуть використовувати обидві мови у своїх проектах. Це полегшує міграцію з </a:t>
+            </a:r>
+            <a:r>
+              <a:rPr lang="en-US" b="0" dirty="0">
+                <a:solidFill>
+                  <a:srgbClr val="FFE66D"/>
+                </a:solidFill>
+                <a:effectLst/>
+                <a:latin typeface="Cascadia Code" panose="020B0609020000020004" pitchFamily="49" charset="0"/>
+              </a:rPr>
+              <a:t>Objective-C </a:t>
+            </a:r>
+            <a:r>
+              <a:rPr lang="uk-UA" b="0" dirty="0">
+                <a:solidFill>
+                  <a:srgbClr val="FFE66D"/>
+                </a:solidFill>
+                <a:effectLst/>
+                <a:latin typeface="Cascadia Code" panose="020B0609020000020004" pitchFamily="49" charset="0"/>
+              </a:rPr>
+              <a:t>на </a:t>
+            </a:r>
+            <a:r>
+              <a:rPr lang="en-US" b="0" dirty="0">
+                <a:solidFill>
+                  <a:srgbClr val="FFE66D"/>
+                </a:solidFill>
+                <a:effectLst/>
+                <a:latin typeface="Cascadia Code" panose="020B0609020000020004" pitchFamily="49" charset="0"/>
+              </a:rPr>
+              <a:t>Swift </a:t>
+            </a:r>
+            <a:r>
+              <a:rPr lang="uk-UA" b="0" dirty="0">
+                <a:solidFill>
+                  <a:srgbClr val="FFE66D"/>
+                </a:solidFill>
+                <a:effectLst/>
+                <a:latin typeface="Cascadia Code" panose="020B0609020000020004" pitchFamily="49" charset="0"/>
+              </a:rPr>
+              <a:t>і навпаки без необхідності переписувати всю кодову базу.</a:t>
+            </a:r>
+            <a:endParaRPr lang="uk-UA" b="0" dirty="0">
+              <a:solidFill>
+                <a:srgbClr val="D5CED9"/>
+              </a:solidFill>
+              <a:effectLst/>
+              <a:latin typeface="Cascadia Code" panose="020B0609020000020004" pitchFamily="49" charset="0"/>
+            </a:endParaRPr>
           </a:p>
         </p:txBody>
       </p:sp>
@@ -2798,6 +3687,9 @@
   <p:clrMapOvr>
     <a:masterClrMapping/>
   </p:clrMapOvr>
+  <p:transition>
+    <p:push dir="u"/>
+  </p:transition>
 </p:sldLayout>
 </file>
 
@@ -3357,6 +4249,9 @@
   <p:clrMapOvr>
     <a:masterClrMapping/>
   </p:clrMapOvr>
+  <p:transition>
+    <p:push dir="u"/>
+  </p:transition>
 </p:sldLayout>
 </file>
 
@@ -4569,6 +5464,9 @@
   <p:clrMapOvr>
     <a:masterClrMapping/>
   </p:clrMapOvr>
+  <p:transition>
+    <p:push dir="u"/>
+  </p:transition>
 </p:sldLayout>
 </file>
 
@@ -5981,6 +6879,9 @@
   <p:clrMapOvr>
     <a:masterClrMapping/>
   </p:clrMapOvr>
+  <p:transition>
+    <p:push dir="u"/>
+  </p:transition>
 </p:sldLayout>
 </file>
 
@@ -6711,6 +7612,9 @@
   <p:clrMapOvr>
     <a:masterClrMapping/>
   </p:clrMapOvr>
+  <p:transition>
+    <p:push dir="u"/>
+  </p:transition>
 </p:sldLayout>
 </file>
 
@@ -7623,6 +8527,9 @@
   <p:clrMapOvr>
     <a:masterClrMapping/>
   </p:clrMapOvr>
+  <p:transition>
+    <p:push dir="u"/>
+  </p:transition>
 </p:sldLayout>
 </file>
 
@@ -8355,6 +9262,9 @@
   <p:clrMapOvr>
     <a:masterClrMapping/>
   </p:clrMapOvr>
+  <p:transition>
+    <p:push dir="u"/>
+  </p:transition>
 </p:sldLayout>
 </file>
 
@@ -9100,6 +10010,9 @@
   <p:clrMapOvr>
     <a:masterClrMapping/>
   </p:clrMapOvr>
+  <p:transition>
+    <p:push dir="u"/>
+  </p:transition>
 </p:sldLayout>
 </file>
 
@@ -9633,6 +10546,9 @@
   <p:clrMapOvr>
     <a:masterClrMapping/>
   </p:clrMapOvr>
+  <p:transition>
+    <p:push dir="u"/>
+  </p:transition>
 </p:sldLayout>
 </file>
 
@@ -10247,6 +11163,9 @@
   <p:clrMapOvr>
     <a:masterClrMapping/>
   </p:clrMapOvr>
+  <p:transition>
+    <p:push dir="u"/>
+  </p:transition>
 </p:sldLayout>
 </file>
 
@@ -10719,6 +11638,9 @@
   <p:clrMapOvr>
     <a:masterClrMapping/>
   </p:clrMapOvr>
+  <p:transition>
+    <p:push dir="u"/>
+  </p:transition>
 </p:sldLayout>
 </file>
 
@@ -12449,6 +13371,9 @@
   <p:clrMapOvr>
     <a:masterClrMapping/>
   </p:clrMapOvr>
+  <p:transition>
+    <p:push dir="u"/>
+  </p:transition>
 </p:sldLayout>
 </file>
 
@@ -13886,6 +14811,9 @@
   <p:clrMapOvr>
     <a:masterClrMapping/>
   </p:clrMapOvr>
+  <p:transition>
+    <p:push dir="u"/>
+  </p:transition>
 </p:sldLayout>
 </file>
 
@@ -14200,6 +15128,9 @@
     <p:sldLayoutId id="2147483665" r:id="rId12"/>
     <p:sldLayoutId id="2147483666" r:id="rId13"/>
   </p:sldLayoutIdLst>
+  <p:transition>
+    <p:push dir="u"/>
+  </p:transition>
   <p:hf hdr="0"/>
   <p:txStyles>
     <p:titleStyle>
@@ -14685,6 +15616,242 @@
   <p:clrMapOvr>
     <a:masterClrMapping/>
   </p:clrMapOvr>
+  <p:transition spd="slow">
+    <p:push/>
+  </p:transition>
+  <p:timing>
+    <p:tnLst>
+      <p:par>
+        <p:cTn id="1" dur="indefinite" restart="never" nodeType="tmRoot">
+          <p:childTnLst>
+            <p:seq concurrent="1" nextAc="seek">
+              <p:cTn id="2" dur="indefinite" nodeType="mainSeq">
+                <p:childTnLst>
+                  <p:par>
+                    <p:cTn id="3" fill="hold">
+                      <p:stCondLst>
+                        <p:cond delay="indefinite"/>
+                        <p:cond evt="onBegin" delay="0">
+                          <p:tn val="2"/>
+                        </p:cond>
+                      </p:stCondLst>
+                      <p:childTnLst>
+                        <p:par>
+                          <p:cTn id="4" fill="hold">
+                            <p:stCondLst>
+                              <p:cond delay="0"/>
+                            </p:stCondLst>
+                            <p:childTnLst>
+                              <p:par>
+                                <p:cTn id="5" presetID="42" presetClass="entr" presetSubtype="0" fill="hold" grpId="0" nodeType="withEffect">
+                                  <p:stCondLst>
+                                    <p:cond delay="0"/>
+                                  </p:stCondLst>
+                                  <p:childTnLst>
+                                    <p:set>
+                                      <p:cBhvr>
+                                        <p:cTn id="6" dur="1" fill="hold">
+                                          <p:stCondLst>
+                                            <p:cond delay="0"/>
+                                          </p:stCondLst>
+                                        </p:cTn>
+                                        <p:tgtEl>
+                                          <p:spTgt spid="2"/>
+                                        </p:tgtEl>
+                                        <p:attrNameLst>
+                                          <p:attrName>style.visibility</p:attrName>
+                                        </p:attrNameLst>
+                                      </p:cBhvr>
+                                      <p:to>
+                                        <p:strVal val="visible"/>
+                                      </p:to>
+                                    </p:set>
+                                    <p:animEffect transition="in" filter="fade">
+                                      <p:cBhvr>
+                                        <p:cTn id="7" dur="500"/>
+                                        <p:tgtEl>
+                                          <p:spTgt spid="2"/>
+                                        </p:tgtEl>
+                                      </p:cBhvr>
+                                    </p:animEffect>
+                                    <p:anim calcmode="lin" valueType="num">
+                                      <p:cBhvr>
+                                        <p:cTn id="8" dur="500" fill="hold"/>
+                                        <p:tgtEl>
+                                          <p:spTgt spid="2"/>
+                                        </p:tgtEl>
+                                        <p:attrNameLst>
+                                          <p:attrName>ppt_x</p:attrName>
+                                        </p:attrNameLst>
+                                      </p:cBhvr>
+                                      <p:tavLst>
+                                        <p:tav tm="0">
+                                          <p:val>
+                                            <p:strVal val="#ppt_x"/>
+                                          </p:val>
+                                        </p:tav>
+                                        <p:tav tm="100000">
+                                          <p:val>
+                                            <p:strVal val="#ppt_x"/>
+                                          </p:val>
+                                        </p:tav>
+                                      </p:tavLst>
+                                    </p:anim>
+                                    <p:anim calcmode="lin" valueType="num">
+                                      <p:cBhvr>
+                                        <p:cTn id="9" dur="500" fill="hold"/>
+                                        <p:tgtEl>
+                                          <p:spTgt spid="2"/>
+                                        </p:tgtEl>
+                                        <p:attrNameLst>
+                                          <p:attrName>ppt_y</p:attrName>
+                                        </p:attrNameLst>
+                                      </p:cBhvr>
+                                      <p:tavLst>
+                                        <p:tav tm="0">
+                                          <p:val>
+                                            <p:strVal val="#ppt_y+.1"/>
+                                          </p:val>
+                                        </p:tav>
+                                        <p:tav tm="100000">
+                                          <p:val>
+                                            <p:strVal val="#ppt_y"/>
+                                          </p:val>
+                                        </p:tav>
+                                      </p:tavLst>
+                                    </p:anim>
+                                  </p:childTnLst>
+                                </p:cTn>
+                              </p:par>
+                              <p:par>
+                                <p:cTn id="10" presetID="42" presetClass="entr" presetSubtype="0" fill="hold" grpId="0" nodeType="withEffect">
+                                  <p:stCondLst>
+                                    <p:cond delay="0"/>
+                                  </p:stCondLst>
+                                  <p:childTnLst>
+                                    <p:set>
+                                      <p:cBhvr>
+                                        <p:cTn id="11" dur="1" fill="hold">
+                                          <p:stCondLst>
+                                            <p:cond delay="0"/>
+                                          </p:stCondLst>
+                                        </p:cTn>
+                                        <p:tgtEl>
+                                          <p:spTgt spid="3">
+                                            <p:txEl>
+                                              <p:pRg st="0" end="0"/>
+                                            </p:txEl>
+                                          </p:spTgt>
+                                        </p:tgtEl>
+                                        <p:attrNameLst>
+                                          <p:attrName>style.visibility</p:attrName>
+                                        </p:attrNameLst>
+                                      </p:cBhvr>
+                                      <p:to>
+                                        <p:strVal val="visible"/>
+                                      </p:to>
+                                    </p:set>
+                                    <p:animEffect transition="in" filter="fade">
+                                      <p:cBhvr>
+                                        <p:cTn id="12" dur="500"/>
+                                        <p:tgtEl>
+                                          <p:spTgt spid="3">
+                                            <p:txEl>
+                                              <p:pRg st="0" end="0"/>
+                                            </p:txEl>
+                                          </p:spTgt>
+                                        </p:tgtEl>
+                                      </p:cBhvr>
+                                    </p:animEffect>
+                                    <p:anim calcmode="lin" valueType="num">
+                                      <p:cBhvr>
+                                        <p:cTn id="13" dur="500" fill="hold"/>
+                                        <p:tgtEl>
+                                          <p:spTgt spid="3">
+                                            <p:txEl>
+                                              <p:pRg st="0" end="0"/>
+                                            </p:txEl>
+                                          </p:spTgt>
+                                        </p:tgtEl>
+                                        <p:attrNameLst>
+                                          <p:attrName>ppt_x</p:attrName>
+                                        </p:attrNameLst>
+                                      </p:cBhvr>
+                                      <p:tavLst>
+                                        <p:tav tm="0">
+                                          <p:val>
+                                            <p:strVal val="#ppt_x"/>
+                                          </p:val>
+                                        </p:tav>
+                                        <p:tav tm="100000">
+                                          <p:val>
+                                            <p:strVal val="#ppt_x"/>
+                                          </p:val>
+                                        </p:tav>
+                                      </p:tavLst>
+                                    </p:anim>
+                                    <p:anim calcmode="lin" valueType="num">
+                                      <p:cBhvr>
+                                        <p:cTn id="14" dur="500" fill="hold"/>
+                                        <p:tgtEl>
+                                          <p:spTgt spid="3">
+                                            <p:txEl>
+                                              <p:pRg st="0" end="0"/>
+                                            </p:txEl>
+                                          </p:spTgt>
+                                        </p:tgtEl>
+                                        <p:attrNameLst>
+                                          <p:attrName>ppt_y</p:attrName>
+                                        </p:attrNameLst>
+                                      </p:cBhvr>
+                                      <p:tavLst>
+                                        <p:tav tm="0">
+                                          <p:val>
+                                            <p:strVal val="#ppt_y+.1"/>
+                                          </p:val>
+                                        </p:tav>
+                                        <p:tav tm="100000">
+                                          <p:val>
+                                            <p:strVal val="#ppt_y"/>
+                                          </p:val>
+                                        </p:tav>
+                                      </p:tavLst>
+                                    </p:anim>
+                                  </p:childTnLst>
+                                </p:cTn>
+                              </p:par>
+                            </p:childTnLst>
+                          </p:cTn>
+                        </p:par>
+                      </p:childTnLst>
+                    </p:cTn>
+                  </p:par>
+                </p:childTnLst>
+              </p:cTn>
+              <p:prevCondLst>
+                <p:cond evt="onPrev" delay="0">
+                  <p:tgtEl>
+                    <p:sldTgt/>
+                  </p:tgtEl>
+                </p:cond>
+              </p:prevCondLst>
+              <p:nextCondLst>
+                <p:cond evt="onNext" delay="0">
+                  <p:tgtEl>
+                    <p:sldTgt/>
+                  </p:tgtEl>
+                </p:cond>
+              </p:nextCondLst>
+            </p:seq>
+          </p:childTnLst>
+        </p:cTn>
+      </p:par>
+    </p:tnLst>
+    <p:bldLst>
+      <p:bldP spid="2" grpId="0"/>
+      <p:bldP spid="3" grpId="0" build="p"/>
+    </p:bldLst>
+  </p:timing>
 </p:sld>
 </file>
 
@@ -14924,6 +16091,9 @@
   <p:clrMapOvr>
     <a:masterClrMapping/>
   </p:clrMapOvr>
+  <p:transition>
+    <p:push dir="u"/>
+  </p:transition>
 </p:sld>
 </file>
 
@@ -15156,6 +16326,9 @@
   <p:clrMapOvr>
     <a:masterClrMapping/>
   </p:clrMapOvr>
+  <p:transition>
+    <p:push dir="u"/>
+  </p:transition>
 </p:sld>
 </file>
 
@@ -15224,6 +16397,9 @@
   <p:clrMapOvr>
     <a:masterClrMapping/>
   </p:clrMapOvr>
+  <p:transition>
+    <p:push dir="u"/>
+  </p:transition>
 </p:sld>
 </file>
 
@@ -15292,6 +16468,9 @@
   <p:clrMapOvr>
     <a:masterClrMapping/>
   </p:clrMapOvr>
+  <p:transition>
+    <p:push dir="u"/>
+  </p:transition>
 </p:sld>
 </file>
 
@@ -15594,6 +16773,9 @@
   <p:clrMapOvr>
     <a:masterClrMapping/>
   </p:clrMapOvr>
+  <p:transition>
+    <p:push dir="u"/>
+  </p:transition>
 </p:sld>
 </file>
 
@@ -15861,6 +17043,9 @@
   <p:clrMapOvr>
     <a:masterClrMapping/>
   </p:clrMapOvr>
+  <p:transition>
+    <p:push dir="u"/>
+  </p:transition>
 </p:sld>
 </file>
 
@@ -16106,6 +17291,9 @@
   <p:clrMapOvr>
     <a:masterClrMapping/>
   </p:clrMapOvr>
+  <p:transition>
+    <p:push dir="u"/>
+  </p:transition>
 </p:sld>
 </file>
 
@@ -16356,6 +17544,9 @@
   <p:clrMapOvr>
     <a:masterClrMapping/>
   </p:clrMapOvr>
+  <p:transition>
+    <p:push dir="u"/>
+  </p:transition>
 </p:sld>
 </file>
 
@@ -16609,6 +17800,9 @@
   <p:clrMapOvr>
     <a:masterClrMapping/>
   </p:clrMapOvr>
+  <p:transition>
+    <p:push dir="u"/>
+  </p:transition>
 </p:sld>
 </file>
 
@@ -16852,6 +18046,9 @@
   <p:clrMapOvr>
     <a:masterClrMapping/>
   </p:clrMapOvr>
+  <p:transition>
+    <p:push dir="u"/>
+  </p:transition>
 </p:sld>
 </file>
 
@@ -17095,6 +18292,9 @@
   <p:clrMapOvr>
     <a:masterClrMapping/>
   </p:clrMapOvr>
+  <p:transition>
+    <p:push dir="u"/>
+  </p:transition>
 </p:sld>
 </file>
 
@@ -17357,6 +18557,9 @@
   <p:clrMapOvr>
     <a:masterClrMapping/>
   </p:clrMapOvr>
+  <p:transition>
+    <p:push dir="u"/>
+  </p:transition>
 </p:sld>
 </file>
 
@@ -18171,6 +19374,15 @@
 </file>
 
 <file path=customXml/item2.xml><?xml version="1.0" encoding="utf-8"?>
+<?mso-contentType ?>
+<FormTemplates xmlns="http://schemas.microsoft.com/sharepoint/v3/contenttype/forms">
+  <Display>DocumentLibraryForm</Display>
+  <Edit>DocumentLibraryForm</Edit>
+  <New>DocumentLibraryForm</New>
+</FormTemplates>
+</file>
+
+<file path=customXml/item3.xml><?xml version="1.0" encoding="utf-8"?>
 <ct:contentTypeSchema xmlns:ct="http://schemas.microsoft.com/office/2006/metadata/contentType" xmlns:ma="http://schemas.microsoft.com/office/2006/metadata/properties/metaAttributes" ct:_="" ma:_="" ma:contentTypeName="Document" ma:contentTypeID="0x01010079F111ED35F8CC479449609E8A0923A6" ma:contentTypeVersion="21" ma:contentTypeDescription="Create a new document." ma:contentTypeScope="" ma:versionID="64dfb1555687e0874b4304b796b5b0c7">
   <xsd:schema xmlns:xsd="http://www.w3.org/2001/XMLSchema" xmlns:xs="http://www.w3.org/2001/XMLSchema" xmlns:p="http://schemas.microsoft.com/office/2006/metadata/properties" xmlns:ns1="http://schemas.microsoft.com/sharepoint/v3" xmlns:ns2="71af3243-3dd4-4a8d-8c0d-dd76da1f02a5" xmlns:ns3="16c05727-aa75-4e4a-9b5f-8a80a1165891" xmlns:ns4="230e9df3-be65-4c73-a93b-d1236ebd677e" targetNamespace="http://schemas.microsoft.com/office/2006/metadata/properties" ma:root="true" ma:fieldsID="e6e4c555b5e194d05b7203de9c4567b3" ns1:_="" ns2:_="" ns3:_="" ns4:_="">
     <xsd:import namespace="http://schemas.microsoft.com/sharepoint/v3"/>
@@ -18452,15 +19664,6 @@
 </ct:contentTypeSchema>
 </file>
 
-<file path=customXml/item3.xml><?xml version="1.0" encoding="utf-8"?>
-<?mso-contentType ?>
-<FormTemplates xmlns="http://schemas.microsoft.com/sharepoint/v3/contenttype/forms">
-  <Display>DocumentLibraryForm</Display>
-  <Edit>DocumentLibraryForm</Edit>
-  <New>DocumentLibraryForm</New>
-</FormTemplates>
-</file>
-
 <file path=customXml/itemProps1.xml><?xml version="1.0" encoding="utf-8"?>
 <ds:datastoreItem xmlns:ds="http://schemas.openxmlformats.org/officeDocument/2006/customXml" ds:itemID="{4D5BAB77-79E1-4739-AA51-10C9079186D6}">
   <ds:schemaRefs>
@@ -18474,6 +19677,14 @@
 </file>
 
 <file path=customXml/itemProps2.xml><?xml version="1.0" encoding="utf-8"?>
+<ds:datastoreItem xmlns:ds="http://schemas.openxmlformats.org/officeDocument/2006/customXml" ds:itemID="{85334180-0405-413B-834A-44FA9E05ADB7}">
+  <ds:schemaRefs>
+    <ds:schemaRef ds:uri="http://schemas.microsoft.com/sharepoint/v3/contenttype/forms"/>
+  </ds:schemaRefs>
+</ds:datastoreItem>
+</file>
+
+<file path=customXml/itemProps3.xml><?xml version="1.0" encoding="utf-8"?>
 <ds:datastoreItem xmlns:ds="http://schemas.openxmlformats.org/officeDocument/2006/customXml" ds:itemID="{4A615295-94F6-4CE2-A1B1-6B7E1DAA5AD6}">
   <ds:schemaRefs>
     <ds:schemaRef ds:uri="http://schemas.microsoft.com/office/2006/metadata/contentType"/>
@@ -18494,14 +19705,6 @@
 </ds:datastoreItem>
 </file>
 
-<file path=customXml/itemProps3.xml><?xml version="1.0" encoding="utf-8"?>
-<ds:datastoreItem xmlns:ds="http://schemas.openxmlformats.org/officeDocument/2006/customXml" ds:itemID="{85334180-0405-413B-834A-44FA9E05ADB7}">
-  <ds:schemaRefs>
-    <ds:schemaRef ds:uri="http://schemas.microsoft.com/sharepoint/v3/contenttype/forms"/>
-  </ds:schemaRefs>
-</ds:datastoreItem>
-</file>
-
 <file path=docMetadata/LabelInfo.xml><?xml version="1.0" encoding="utf-8"?>
 <clbl:labelList xmlns:clbl="http://schemas.microsoft.com/office/2020/mipLabelMetadata">
   <clbl:label id="{f42aa342-8706-4288-bd11-ebb85995028c}" enabled="1" method="Standard" siteId="{72f988bf-86f1-41af-91ab-2d7cd011db47}" removed="0"/>

</xml_diff>

<commit_message>
Wednesday, April 19, 2023, 7:01:01 PM Eastern European Summer Time
</commit_message>
<xml_diff>
--- a/year1-term2/SS/ct1/presentation.pptx
+++ b/year1-term2/SS/ct1/presentation.pptx
@@ -248,7 +248,7 @@
             <a:pPr rtl="0"/>
             <a:fld id="{32E7F8A8-D86C-42F1-9B11-EA147C604B36}" type="datetime1">
               <a:rPr lang="uk-UA" smtClean="0"/>
-              <a:t>16.04.2023</a:t>
+              <a:t>19.04.2023</a:t>
             </a:fld>
             <a:endParaRPr lang="uk-UA"/>
           </a:p>
@@ -430,7 +430,7 @@
             <a:pPr rtl="0"/>
             <a:fld id="{4D18E05A-B548-4CC6-A371-C61575643AD7}" type="datetime1">
               <a:rPr lang="uk-UA" noProof="0" smtClean="0"/>
-              <a:t>16.04.2023</a:t>
+              <a:t>19.04.2023</a:t>
             </a:fld>
             <a:endParaRPr lang="uk-UA" noProof="0"/>
           </a:p>
@@ -4118,7 +4118,7 @@
               <a:rPr lang="uk-UA" noProof="0" smtClean="0">
                 <a:latin typeface="Arial" panose="020B0604020202020204" pitchFamily="34" charset="0"/>
               </a:rPr>
-              <a:t>16.04.2023</a:t>
+              <a:t>19.04.2023</a:t>
             </a:fld>
             <a:endParaRPr lang="uk-UA" noProof="0">
               <a:latin typeface="Arial" panose="020B0604020202020204" pitchFamily="34" charset="0"/>
@@ -5033,7 +5033,7 @@
               <a:rPr lang="uk-UA" noProof="0" smtClean="0">
                 <a:latin typeface="Arial" panose="020B0604020202020204" pitchFamily="34" charset="0"/>
               </a:rPr>
-              <a:t>16.04.2023</a:t>
+              <a:t>19.04.2023</a:t>
             </a:fld>
             <a:endParaRPr lang="uk-UA" noProof="0">
               <a:latin typeface="Arial" panose="020B0604020202020204" pitchFamily="34" charset="0"/>
@@ -6248,7 +6248,7 @@
               <a:rPr lang="uk-UA" noProof="0" smtClean="0">
                 <a:latin typeface="Arial" panose="020B0604020202020204" pitchFamily="34" charset="0"/>
               </a:rPr>
-              <a:t>16.04.2023</a:t>
+              <a:t>19.04.2023</a:t>
             </a:fld>
             <a:endParaRPr lang="uk-UA" noProof="0">
               <a:latin typeface="Arial" panose="020B0604020202020204" pitchFamily="34" charset="0"/>
@@ -8396,7 +8396,7 @@
               <a:rPr lang="uk-UA" noProof="0" smtClean="0">
                 <a:latin typeface="Arial" panose="020B0604020202020204" pitchFamily="34" charset="0"/>
               </a:rPr>
-              <a:t>16.04.2023</a:t>
+              <a:t>19.04.2023</a:t>
             </a:fld>
             <a:endParaRPr lang="uk-UA" noProof="0">
               <a:latin typeface="Arial" panose="020B0604020202020204" pitchFamily="34" charset="0"/>
@@ -9142,7 +9142,7 @@
               <a:rPr lang="uk-UA" noProof="0" smtClean="0">
                 <a:latin typeface="Arial" panose="020B0604020202020204" pitchFamily="34" charset="0"/>
               </a:rPr>
-              <a:t>16.04.2023</a:t>
+              <a:t>19.04.2023</a:t>
             </a:fld>
             <a:endParaRPr lang="uk-UA" noProof="0">
               <a:latin typeface="Arial" panose="020B0604020202020204" pitchFamily="34" charset="0"/>
@@ -10415,7 +10415,7 @@
               <a:rPr lang="uk-UA" noProof="0" smtClean="0">
                 <a:latin typeface="Arial" panose="020B0604020202020204" pitchFamily="34" charset="0"/>
               </a:rPr>
-              <a:t>16.04.2023</a:t>
+              <a:t>19.04.2023</a:t>
             </a:fld>
             <a:endParaRPr lang="uk-UA" noProof="0">
               <a:latin typeface="Arial" panose="020B0604020202020204" pitchFamily="34" charset="0"/>
@@ -11032,7 +11032,7 @@
               <a:rPr lang="uk-UA" noProof="0" smtClean="0">
                 <a:latin typeface="Arial" panose="020B0604020202020204" pitchFamily="34" charset="0"/>
               </a:rPr>
-              <a:t>16.04.2023</a:t>
+              <a:t>19.04.2023</a:t>
             </a:fld>
             <a:endParaRPr lang="uk-UA" noProof="0">
               <a:latin typeface="Arial" panose="020B0604020202020204" pitchFamily="34" charset="0"/>
@@ -11523,7 +11523,7 @@
               <a:rPr lang="uk-UA" noProof="0" smtClean="0">
                 <a:latin typeface="Arial" panose="020B0604020202020204" pitchFamily="34" charset="0"/>
               </a:rPr>
-              <a:t>16.04.2023</a:t>
+              <a:t>19.04.2023</a:t>
             </a:fld>
             <a:endParaRPr lang="uk-UA" noProof="0">
               <a:latin typeface="Arial" panose="020B0604020202020204" pitchFamily="34" charset="0"/>
@@ -12403,7 +12403,7 @@
               <a:rPr lang="uk-UA" noProof="0" smtClean="0">
                 <a:latin typeface="Arial" panose="020B0604020202020204" pitchFamily="34" charset="0"/>
               </a:rPr>
-              <a:t>16.04.2023</a:t>
+              <a:t>19.04.2023</a:t>
             </a:fld>
             <a:endParaRPr lang="uk-UA" noProof="0">
               <a:latin typeface="Arial" panose="020B0604020202020204" pitchFamily="34" charset="0"/>
@@ -14696,7 +14696,7 @@
               <a:rPr lang="uk-UA" noProof="0" smtClean="0">
                 <a:latin typeface="Arial" panose="020B0604020202020204" pitchFamily="34" charset="0"/>
               </a:rPr>
-              <a:t>16.04.2023</a:t>
+              <a:t>19.04.2023</a:t>
             </a:fld>
             <a:endParaRPr lang="uk-UA" noProof="0">
               <a:latin typeface="Arial" panose="020B0604020202020204" pitchFamily="34" charset="0"/>
@@ -14981,7 +14981,7 @@
                 <a:latin typeface="Arial" panose="020B0604020202020204" pitchFamily="34" charset="0"/>
                 <a:cs typeface="Arial" panose="020B0604020202020204" pitchFamily="34" charset="0"/>
               </a:rPr>
-              <a:t>16.04.2023</a:t>
+              <a:t>19.04.2023</a:t>
             </a:fld>
             <a:endParaRPr lang="uk-UA" noProof="0">
               <a:latin typeface="Arial" panose="020B0604020202020204" pitchFamily="34" charset="0"/>
@@ -16029,7 +16029,7 @@
             <a:pPr rtl="0"/>
             <a:fld id="{2B3FECCB-B4D4-4C4B-87FB-97861EE1F201}" type="datetime1">
               <a:rPr lang="uk-UA" smtClean="0"/>
-              <a:t>16.04.2023</a:t>
+              <a:t>19.04.2023</a:t>
             </a:fld>
             <a:endParaRPr lang="uk-UA"/>
           </a:p>
@@ -16264,7 +16264,7 @@
             <a:pPr rtl="0"/>
             <a:fld id="{2B3FECCB-B4D4-4C4B-87FB-97861EE1F201}" type="datetime1">
               <a:rPr lang="uk-UA" smtClean="0"/>
-              <a:t>16.04.2023</a:t>
+              <a:t>19.04.2023</a:t>
             </a:fld>
             <a:endParaRPr lang="uk-UA"/>
           </a:p>
@@ -16757,7 +16757,7 @@
             <a:pPr rtl="0"/>
             <a:fld id="{3B858B8C-D206-4863-8601-4D8E5135AABC}" type="datetime1">
               <a:rPr lang="uk-UA" smtClean="0"/>
-              <a:t>16.04.2023</a:t>
+              <a:t>19.04.2023</a:t>
             </a:fld>
             <a:endParaRPr lang="uk-UA"/>
           </a:p>
@@ -17027,7 +17027,7 @@
             <a:pPr rtl="0"/>
             <a:fld id="{2B3FECCB-B4D4-4C4B-87FB-97861EE1F201}" type="datetime1">
               <a:rPr lang="uk-UA" smtClean="0"/>
-              <a:t>16.04.2023</a:t>
+              <a:t>19.04.2023</a:t>
             </a:fld>
             <a:endParaRPr lang="uk-UA"/>
           </a:p>
@@ -17275,7 +17275,7 @@
             <a:pPr rtl="0"/>
             <a:fld id="{2B3FECCB-B4D4-4C4B-87FB-97861EE1F201}" type="datetime1">
               <a:rPr lang="uk-UA" smtClean="0"/>
-              <a:t>16.04.2023</a:t>
+              <a:t>19.04.2023</a:t>
             </a:fld>
             <a:endParaRPr lang="uk-UA"/>
           </a:p>
@@ -17528,7 +17528,7 @@
             <a:pPr rtl="0"/>
             <a:fld id="{2B3FECCB-B4D4-4C4B-87FB-97861EE1F201}" type="datetime1">
               <a:rPr lang="uk-UA" smtClean="0"/>
-              <a:t>16.04.2023</a:t>
+              <a:t>19.04.2023</a:t>
             </a:fld>
             <a:endParaRPr lang="uk-UA"/>
           </a:p>
@@ -17784,7 +17784,7 @@
             <a:pPr rtl="0"/>
             <a:fld id="{2B3FECCB-B4D4-4C4B-87FB-97861EE1F201}" type="datetime1">
               <a:rPr lang="uk-UA" smtClean="0"/>
-              <a:t>16.04.2023</a:t>
+              <a:t>19.04.2023</a:t>
             </a:fld>
             <a:endParaRPr lang="uk-UA"/>
           </a:p>
@@ -18030,7 +18030,7 @@
             <a:pPr rtl="0"/>
             <a:fld id="{2B3FECCB-B4D4-4C4B-87FB-97861EE1F201}" type="datetime1">
               <a:rPr lang="uk-UA" smtClean="0"/>
-              <a:t>16.04.2023</a:t>
+              <a:t>19.04.2023</a:t>
             </a:fld>
             <a:endParaRPr lang="uk-UA"/>
           </a:p>
@@ -18276,7 +18276,7 @@
             <a:pPr rtl="0"/>
             <a:fld id="{2B3FECCB-B4D4-4C4B-87FB-97861EE1F201}" type="datetime1">
               <a:rPr lang="uk-UA" smtClean="0"/>
-              <a:t>16.04.2023</a:t>
+              <a:t>19.04.2023</a:t>
             </a:fld>
             <a:endParaRPr lang="uk-UA"/>
           </a:p>
@@ -18536,7 +18536,7 @@
             <a:pPr rtl="0"/>
             <a:fld id="{2B3FECCB-B4D4-4C4B-87FB-97861EE1F201}" type="datetime1">
               <a:rPr lang="uk-UA" smtClean="0"/>
-              <a:t>16.04.2023</a:t>
+              <a:t>19.04.2023</a:t>
             </a:fld>
             <a:endParaRPr lang="uk-UA"/>
           </a:p>
@@ -19405,6 +19405,15 @@
 </file>
 
 <file path=customXml/item2.xml><?xml version="1.0" encoding="utf-8"?>
+<?mso-contentType ?>
+<FormTemplates xmlns="http://schemas.microsoft.com/sharepoint/v3/contenttype/forms">
+  <Display>DocumentLibraryForm</Display>
+  <Edit>DocumentLibraryForm</Edit>
+  <New>DocumentLibraryForm</New>
+</FormTemplates>
+</file>
+
+<file path=customXml/item3.xml><?xml version="1.0" encoding="utf-8"?>
 <ct:contentTypeSchema xmlns:ct="http://schemas.microsoft.com/office/2006/metadata/contentType" xmlns:ma="http://schemas.microsoft.com/office/2006/metadata/properties/metaAttributes" ct:_="" ma:_="" ma:contentTypeName="Document" ma:contentTypeID="0x01010079F111ED35F8CC479449609E8A0923A6" ma:contentTypeVersion="21" ma:contentTypeDescription="Create a new document." ma:contentTypeScope="" ma:versionID="64dfb1555687e0874b4304b796b5b0c7">
   <xsd:schema xmlns:xsd="http://www.w3.org/2001/XMLSchema" xmlns:xs="http://www.w3.org/2001/XMLSchema" xmlns:p="http://schemas.microsoft.com/office/2006/metadata/properties" xmlns:ns1="http://schemas.microsoft.com/sharepoint/v3" xmlns:ns2="71af3243-3dd4-4a8d-8c0d-dd76da1f02a5" xmlns:ns3="16c05727-aa75-4e4a-9b5f-8a80a1165891" xmlns:ns4="230e9df3-be65-4c73-a93b-d1236ebd677e" targetNamespace="http://schemas.microsoft.com/office/2006/metadata/properties" ma:root="true" ma:fieldsID="e6e4c555b5e194d05b7203de9c4567b3" ns1:_="" ns2:_="" ns3:_="" ns4:_="">
     <xsd:import namespace="http://schemas.microsoft.com/sharepoint/v3"/>
@@ -19686,15 +19695,6 @@
 </ct:contentTypeSchema>
 </file>
 
-<file path=customXml/item3.xml><?xml version="1.0" encoding="utf-8"?>
-<?mso-contentType ?>
-<FormTemplates xmlns="http://schemas.microsoft.com/sharepoint/v3/contenttype/forms">
-  <Display>DocumentLibraryForm</Display>
-  <Edit>DocumentLibraryForm</Edit>
-  <New>DocumentLibraryForm</New>
-</FormTemplates>
-</file>
-
 <file path=customXml/itemProps1.xml><?xml version="1.0" encoding="utf-8"?>
 <ds:datastoreItem xmlns:ds="http://schemas.openxmlformats.org/officeDocument/2006/customXml" ds:itemID="{4D5BAB77-79E1-4739-AA51-10C9079186D6}">
   <ds:schemaRefs>
@@ -19708,6 +19708,14 @@
 </file>
 
 <file path=customXml/itemProps2.xml><?xml version="1.0" encoding="utf-8"?>
+<ds:datastoreItem xmlns:ds="http://schemas.openxmlformats.org/officeDocument/2006/customXml" ds:itemID="{85334180-0405-413B-834A-44FA9E05ADB7}">
+  <ds:schemaRefs>
+    <ds:schemaRef ds:uri="http://schemas.microsoft.com/sharepoint/v3/contenttype/forms"/>
+  </ds:schemaRefs>
+</ds:datastoreItem>
+</file>
+
+<file path=customXml/itemProps3.xml><?xml version="1.0" encoding="utf-8"?>
 <ds:datastoreItem xmlns:ds="http://schemas.openxmlformats.org/officeDocument/2006/customXml" ds:itemID="{4A615295-94F6-4CE2-A1B1-6B7E1DAA5AD6}">
   <ds:schemaRefs>
     <ds:schemaRef ds:uri="http://schemas.microsoft.com/office/2006/metadata/contentType"/>
@@ -19728,14 +19736,6 @@
 </ds:datastoreItem>
 </file>
 
-<file path=customXml/itemProps3.xml><?xml version="1.0" encoding="utf-8"?>
-<ds:datastoreItem xmlns:ds="http://schemas.openxmlformats.org/officeDocument/2006/customXml" ds:itemID="{85334180-0405-413B-834A-44FA9E05ADB7}">
-  <ds:schemaRefs>
-    <ds:schemaRef ds:uri="http://schemas.microsoft.com/sharepoint/v3/contenttype/forms"/>
-  </ds:schemaRefs>
-</ds:datastoreItem>
-</file>
-
 <file path=docMetadata/LabelInfo.xml><?xml version="1.0" encoding="utf-8"?>
 <clbl:labelList xmlns:clbl="http://schemas.microsoft.com/office/2020/mipLabelMetadata">
   <clbl:label id="{f42aa342-8706-4288-bd11-ebb85995028c}" enabled="1" method="Standard" siteId="{72f988bf-86f1-41af-91ab-2d7cd011db47}" removed="0"/>

</xml_diff>

<commit_message>
Thursday, April 20, 2023, 1:20:51 AM Eastern European Summer Time
</commit_message>
<xml_diff>
--- a/year1-term2/SS/ct1/presentation.pptx
+++ b/year1-term2/SS/ct1/presentation.pptx
@@ -5,10 +5,10 @@
     <p:sldMasterId id="2147483648" r:id="rId4"/>
   </p:sldMasterIdLst>
   <p:notesMasterIdLst>
-    <p:notesMasterId r:id="rId18"/>
+    <p:notesMasterId r:id="rId20"/>
   </p:notesMasterIdLst>
   <p:handoutMasterIdLst>
-    <p:handoutMasterId r:id="rId19"/>
+    <p:handoutMasterId r:id="rId21"/>
   </p:handoutMasterIdLst>
   <p:sldIdLst>
     <p:sldId id="256" r:id="rId5"/>
@@ -22,8 +22,10 @@
     <p:sldId id="281" r:id="rId13"/>
     <p:sldId id="282" r:id="rId14"/>
     <p:sldId id="283" r:id="rId15"/>
-    <p:sldId id="259" r:id="rId16"/>
-    <p:sldId id="275" r:id="rId17"/>
+    <p:sldId id="284" r:id="rId16"/>
+    <p:sldId id="285" r:id="rId17"/>
+    <p:sldId id="259" r:id="rId18"/>
+    <p:sldId id="275" r:id="rId19"/>
   </p:sldIdLst>
   <p:sldSz cx="12192000" cy="6858000"/>
   <p:notesSz cx="6858000" cy="9144000"/>
@@ -152,6 +154,959 @@
 </p:cmAuthorLst>
 </file>
 
+<file path=ppt/charts/chart1.xml><?xml version="1.0" encoding="utf-8"?>
+<c:chartSpace xmlns:c="http://schemas.openxmlformats.org/drawingml/2006/chart" xmlns:a="http://schemas.openxmlformats.org/drawingml/2006/main" xmlns:r="http://schemas.openxmlformats.org/officeDocument/2006/relationships" xmlns:c16r2="http://schemas.microsoft.com/office/drawing/2015/06/chart">
+  <c:date1904 val="0"/>
+  <c:lang val="uk-UA"/>
+  <c:roundedCorners val="0"/>
+  <mc:AlternateContent xmlns:mc="http://schemas.openxmlformats.org/markup-compatibility/2006">
+    <mc:Choice xmlns:c14="http://schemas.microsoft.com/office/drawing/2007/8/2/chart" Requires="c14">
+      <c14:style val="104"/>
+    </mc:Choice>
+    <mc:Fallback>
+      <c:style val="4"/>
+    </mc:Fallback>
+  </mc:AlternateContent>
+  <c:chart>
+    <c:autoTitleDeleted val="1"/>
+    <c:plotArea>
+      <c:layout/>
+      <c:barChart>
+        <c:barDir val="col"/>
+        <c:grouping val="clustered"/>
+        <c:varyColors val="0"/>
+        <c:ser>
+          <c:idx val="0"/>
+          <c:order val="0"/>
+          <c:tx>
+            <c:strRef>
+              <c:f>Аркуш1!$B$1</c:f>
+              <c:strCache>
+                <c:ptCount val="1"/>
+                <c:pt idx="0">
+                  <c:v>Speed</c:v>
+                </c:pt>
+              </c:strCache>
+            </c:strRef>
+          </c:tx>
+          <c:spPr>
+            <a:solidFill>
+              <a:schemeClr val="accent2">
+                <a:tint val="65000"/>
+              </a:schemeClr>
+            </a:solidFill>
+            <a:ln>
+              <a:noFill/>
+            </a:ln>
+            <a:effectLst/>
+          </c:spPr>
+          <c:invertIfNegative val="0"/>
+          <c:cat>
+            <c:strRef>
+              <c:f>Аркуш1!$A$2:$A$6</c:f>
+              <c:strCache>
+                <c:ptCount val="5"/>
+                <c:pt idx="0">
+                  <c:v>Go</c:v>
+                </c:pt>
+                <c:pt idx="1">
+                  <c:v>Rust</c:v>
+                </c:pt>
+                <c:pt idx="2">
+                  <c:v>C++</c:v>
+                </c:pt>
+                <c:pt idx="3">
+                  <c:v>Swift</c:v>
+                </c:pt>
+                <c:pt idx="4">
+                  <c:v>Python</c:v>
+                </c:pt>
+              </c:strCache>
+            </c:strRef>
+          </c:cat>
+          <c:val>
+            <c:numRef>
+              <c:f>Аркуш1!$B$2:$B$6</c:f>
+              <c:numCache>
+                <c:formatCode>General</c:formatCode>
+                <c:ptCount val="5"/>
+                <c:pt idx="0">
+                  <c:v>5</c:v>
+                </c:pt>
+                <c:pt idx="1">
+                  <c:v>4</c:v>
+                </c:pt>
+                <c:pt idx="2">
+                  <c:v>3</c:v>
+                </c:pt>
+                <c:pt idx="3">
+                  <c:v>2</c:v>
+                </c:pt>
+                <c:pt idx="4">
+                  <c:v>1</c:v>
+                </c:pt>
+              </c:numCache>
+            </c:numRef>
+          </c:val>
+          <c:extLst>
+            <c:ext xmlns:c16="http://schemas.microsoft.com/office/drawing/2014/chart" uri="{C3380CC4-5D6E-409C-BE32-E72D297353CC}">
+              <c16:uniqueId val="{00000000-7836-44B7-B2BA-C5256D48CA10}"/>
+            </c:ext>
+          </c:extLst>
+        </c:ser>
+        <c:ser>
+          <c:idx val="1"/>
+          <c:order val="1"/>
+          <c:tx>
+            <c:strRef>
+              <c:f>Аркуш1!$C$1</c:f>
+              <c:strCache>
+                <c:ptCount val="1"/>
+                <c:pt idx="0">
+                  <c:v>Support</c:v>
+                </c:pt>
+              </c:strCache>
+            </c:strRef>
+          </c:tx>
+          <c:spPr>
+            <a:solidFill>
+              <a:schemeClr val="accent2"/>
+            </a:solidFill>
+            <a:ln>
+              <a:noFill/>
+            </a:ln>
+            <a:effectLst/>
+          </c:spPr>
+          <c:invertIfNegative val="0"/>
+          <c:cat>
+            <c:strRef>
+              <c:f>Аркуш1!$A$2:$A$6</c:f>
+              <c:strCache>
+                <c:ptCount val="5"/>
+                <c:pt idx="0">
+                  <c:v>Go</c:v>
+                </c:pt>
+                <c:pt idx="1">
+                  <c:v>Rust</c:v>
+                </c:pt>
+                <c:pt idx="2">
+                  <c:v>C++</c:v>
+                </c:pt>
+                <c:pt idx="3">
+                  <c:v>Swift</c:v>
+                </c:pt>
+                <c:pt idx="4">
+                  <c:v>Python</c:v>
+                </c:pt>
+              </c:strCache>
+            </c:strRef>
+          </c:cat>
+          <c:val>
+            <c:numRef>
+              <c:f>Аркуш1!$C$2:$C$6</c:f>
+              <c:numCache>
+                <c:formatCode>General</c:formatCode>
+                <c:ptCount val="5"/>
+                <c:pt idx="0">
+                  <c:v>1</c:v>
+                </c:pt>
+                <c:pt idx="1">
+                  <c:v>2</c:v>
+                </c:pt>
+                <c:pt idx="2">
+                  <c:v>4</c:v>
+                </c:pt>
+                <c:pt idx="3">
+                  <c:v>3</c:v>
+                </c:pt>
+                <c:pt idx="4">
+                  <c:v>5</c:v>
+                </c:pt>
+              </c:numCache>
+            </c:numRef>
+          </c:val>
+          <c:extLst>
+            <c:ext xmlns:c16="http://schemas.microsoft.com/office/drawing/2014/chart" uri="{C3380CC4-5D6E-409C-BE32-E72D297353CC}">
+              <c16:uniqueId val="{00000001-7836-44B7-B2BA-C5256D48CA10}"/>
+            </c:ext>
+          </c:extLst>
+        </c:ser>
+        <c:ser>
+          <c:idx val="2"/>
+          <c:order val="2"/>
+          <c:tx>
+            <c:strRef>
+              <c:f>Аркуш1!$D$1</c:f>
+              <c:strCache>
+                <c:ptCount val="1"/>
+                <c:pt idx="0">
+                  <c:v>Simplicity</c:v>
+                </c:pt>
+              </c:strCache>
+            </c:strRef>
+          </c:tx>
+          <c:spPr>
+            <a:solidFill>
+              <a:schemeClr val="accent2">
+                <a:shade val="65000"/>
+              </a:schemeClr>
+            </a:solidFill>
+            <a:ln>
+              <a:noFill/>
+            </a:ln>
+            <a:effectLst/>
+          </c:spPr>
+          <c:invertIfNegative val="0"/>
+          <c:cat>
+            <c:strRef>
+              <c:f>Аркуш1!$A$2:$A$6</c:f>
+              <c:strCache>
+                <c:ptCount val="5"/>
+                <c:pt idx="0">
+                  <c:v>Go</c:v>
+                </c:pt>
+                <c:pt idx="1">
+                  <c:v>Rust</c:v>
+                </c:pt>
+                <c:pt idx="2">
+                  <c:v>C++</c:v>
+                </c:pt>
+                <c:pt idx="3">
+                  <c:v>Swift</c:v>
+                </c:pt>
+                <c:pt idx="4">
+                  <c:v>Python</c:v>
+                </c:pt>
+              </c:strCache>
+            </c:strRef>
+          </c:cat>
+          <c:val>
+            <c:numRef>
+              <c:f>Аркуш1!$D$2:$D$6</c:f>
+              <c:numCache>
+                <c:formatCode>General</c:formatCode>
+                <c:ptCount val="5"/>
+                <c:pt idx="0">
+                  <c:v>5</c:v>
+                </c:pt>
+                <c:pt idx="1">
+                  <c:v>2</c:v>
+                </c:pt>
+                <c:pt idx="2">
+                  <c:v>1</c:v>
+                </c:pt>
+                <c:pt idx="3">
+                  <c:v>4</c:v>
+                </c:pt>
+                <c:pt idx="4">
+                  <c:v>3</c:v>
+                </c:pt>
+              </c:numCache>
+            </c:numRef>
+          </c:val>
+          <c:extLst>
+            <c:ext xmlns:c16="http://schemas.microsoft.com/office/drawing/2014/chart" uri="{C3380CC4-5D6E-409C-BE32-E72D297353CC}">
+              <c16:uniqueId val="{00000002-7836-44B7-B2BA-C5256D48CA10}"/>
+            </c:ext>
+          </c:extLst>
+        </c:ser>
+        <c:dLbls>
+          <c:showLegendKey val="0"/>
+          <c:showVal val="0"/>
+          <c:showCatName val="0"/>
+          <c:showSerName val="0"/>
+          <c:showPercent val="0"/>
+          <c:showBubbleSize val="0"/>
+        </c:dLbls>
+        <c:gapWidth val="219"/>
+        <c:overlap val="-27"/>
+        <c:axId val="1621017327"/>
+        <c:axId val="1621017743"/>
+      </c:barChart>
+      <c:catAx>
+        <c:axId val="1621017327"/>
+        <c:scaling>
+          <c:orientation val="minMax"/>
+        </c:scaling>
+        <c:delete val="0"/>
+        <c:axPos val="b"/>
+        <c:numFmt formatCode="General" sourceLinked="1"/>
+        <c:majorTickMark val="none"/>
+        <c:minorTickMark val="none"/>
+        <c:tickLblPos val="nextTo"/>
+        <c:spPr>
+          <a:noFill/>
+          <a:ln w="9525" cap="flat" cmpd="sng" algn="ctr">
+            <a:solidFill>
+              <a:schemeClr val="tx1">
+                <a:lumMod val="15000"/>
+                <a:lumOff val="85000"/>
+              </a:schemeClr>
+            </a:solidFill>
+            <a:round/>
+          </a:ln>
+          <a:effectLst/>
+        </c:spPr>
+        <c:txPr>
+          <a:bodyPr rot="-60000000" spcFirstLastPara="1" vertOverflow="ellipsis" vert="horz" wrap="square" anchor="ctr" anchorCtr="1"/>
+          <a:lstStyle/>
+          <a:p>
+            <a:pPr>
+              <a:defRPr sz="1197" b="0" i="0" u="none" strike="noStrike" kern="1200" baseline="0">
+                <a:solidFill>
+                  <a:schemeClr val="bg1"/>
+                </a:solidFill>
+                <a:latin typeface="+mn-lt"/>
+                <a:ea typeface="+mn-ea"/>
+                <a:cs typeface="+mn-cs"/>
+              </a:defRPr>
+            </a:pPr>
+            <a:endParaRPr lang="uk-UA"/>
+          </a:p>
+        </c:txPr>
+        <c:crossAx val="1621017743"/>
+        <c:crosses val="autoZero"/>
+        <c:auto val="1"/>
+        <c:lblAlgn val="ctr"/>
+        <c:lblOffset val="100"/>
+        <c:noMultiLvlLbl val="0"/>
+      </c:catAx>
+      <c:valAx>
+        <c:axId val="1621017743"/>
+        <c:scaling>
+          <c:orientation val="minMax"/>
+        </c:scaling>
+        <c:delete val="0"/>
+        <c:axPos val="l"/>
+        <c:majorGridlines>
+          <c:spPr>
+            <a:ln w="9525" cap="flat" cmpd="sng" algn="ctr">
+              <a:solidFill>
+                <a:schemeClr val="tx1">
+                  <a:lumMod val="15000"/>
+                  <a:lumOff val="85000"/>
+                </a:schemeClr>
+              </a:solidFill>
+              <a:round/>
+            </a:ln>
+            <a:effectLst/>
+          </c:spPr>
+        </c:majorGridlines>
+        <c:numFmt formatCode="General" sourceLinked="1"/>
+        <c:majorTickMark val="none"/>
+        <c:minorTickMark val="none"/>
+        <c:tickLblPos val="nextTo"/>
+        <c:spPr>
+          <a:noFill/>
+          <a:ln>
+            <a:noFill/>
+          </a:ln>
+          <a:effectLst/>
+        </c:spPr>
+        <c:txPr>
+          <a:bodyPr rot="-60000000" spcFirstLastPara="1" vertOverflow="ellipsis" vert="horz" wrap="square" anchor="ctr" anchorCtr="1"/>
+          <a:lstStyle/>
+          <a:p>
+            <a:pPr>
+              <a:defRPr sz="1197" b="0" i="0" u="none" strike="noStrike" kern="1200" baseline="0">
+                <a:solidFill>
+                  <a:schemeClr val="bg1"/>
+                </a:solidFill>
+                <a:latin typeface="+mn-lt"/>
+                <a:ea typeface="+mn-ea"/>
+                <a:cs typeface="+mn-cs"/>
+              </a:defRPr>
+            </a:pPr>
+            <a:endParaRPr lang="uk-UA"/>
+          </a:p>
+        </c:txPr>
+        <c:crossAx val="1621017327"/>
+        <c:crosses val="autoZero"/>
+        <c:crossBetween val="between"/>
+      </c:valAx>
+      <c:spPr>
+        <a:noFill/>
+        <a:ln>
+          <a:noFill/>
+        </a:ln>
+        <a:effectLst/>
+      </c:spPr>
+    </c:plotArea>
+    <c:legend>
+      <c:legendPos val="b"/>
+      <c:overlay val="0"/>
+      <c:spPr>
+        <a:noFill/>
+        <a:ln>
+          <a:noFill/>
+        </a:ln>
+        <a:effectLst/>
+      </c:spPr>
+      <c:txPr>
+        <a:bodyPr rot="0" spcFirstLastPara="1" vertOverflow="ellipsis" vert="horz" wrap="square" anchor="ctr" anchorCtr="1"/>
+        <a:lstStyle/>
+        <a:p>
+          <a:pPr>
+            <a:defRPr sz="1197" b="0" i="0" u="none" strike="noStrike" kern="1200" baseline="0">
+              <a:solidFill>
+                <a:schemeClr val="bg1"/>
+              </a:solidFill>
+              <a:latin typeface="+mn-lt"/>
+              <a:ea typeface="+mn-ea"/>
+              <a:cs typeface="+mn-cs"/>
+            </a:defRPr>
+          </a:pPr>
+          <a:endParaRPr lang="uk-UA"/>
+        </a:p>
+      </c:txPr>
+    </c:legend>
+    <c:plotVisOnly val="1"/>
+    <c:dispBlanksAs val="gap"/>
+    <c:extLst>
+      <c:ext xmlns:c16r3="http://schemas.microsoft.com/office/drawing/2017/03/chart" uri="{56B9EC1D-385E-4148-901F-78D8002777C0}">
+        <c16r3:dataDisplayOptions16>
+          <c16r3:dispNaAsBlank val="1"/>
+        </c16r3:dataDisplayOptions16>
+      </c:ext>
+    </c:extLst>
+    <c:showDLblsOverMax val="0"/>
+  </c:chart>
+  <c:spPr>
+    <a:noFill/>
+    <a:ln>
+      <a:noFill/>
+    </a:ln>
+    <a:effectLst/>
+  </c:spPr>
+  <c:txPr>
+    <a:bodyPr/>
+    <a:lstStyle/>
+    <a:p>
+      <a:pPr>
+        <a:defRPr>
+          <a:solidFill>
+            <a:schemeClr val="bg1"/>
+          </a:solidFill>
+        </a:defRPr>
+      </a:pPr>
+      <a:endParaRPr lang="uk-UA"/>
+    </a:p>
+  </c:txPr>
+  <c:externalData r:id="rId3">
+    <c:autoUpdate val="0"/>
+  </c:externalData>
+</c:chartSpace>
+</file>
+
+<file path=ppt/charts/colors1.xml><?xml version="1.0" encoding="utf-8"?>
+<cs:colorStyle xmlns:cs="http://schemas.microsoft.com/office/drawing/2012/chartStyle" xmlns:a="http://schemas.openxmlformats.org/drawingml/2006/main" meth="withinLinearReversed" id="22">
+  <a:schemeClr val="accent2"/>
+</cs:colorStyle>
+</file>
+
+<file path=ppt/charts/style1.xml><?xml version="1.0" encoding="utf-8"?>
+<cs:chartStyle xmlns:cs="http://schemas.microsoft.com/office/drawing/2012/chartStyle" xmlns:a="http://schemas.openxmlformats.org/drawingml/2006/main" id="201">
+  <cs:axisTitle>
+    <cs:lnRef idx="0"/>
+    <cs:fillRef idx="0"/>
+    <cs:effectRef idx="0"/>
+    <cs:fontRef idx="minor">
+      <a:schemeClr val="tx1">
+        <a:lumMod val="65000"/>
+        <a:lumOff val="35000"/>
+      </a:schemeClr>
+    </cs:fontRef>
+    <cs:defRPr sz="1330" kern="1200"/>
+  </cs:axisTitle>
+  <cs:categoryAxis>
+    <cs:lnRef idx="0"/>
+    <cs:fillRef idx="0"/>
+    <cs:effectRef idx="0"/>
+    <cs:fontRef idx="minor">
+      <a:schemeClr val="tx1">
+        <a:lumMod val="65000"/>
+        <a:lumOff val="35000"/>
+      </a:schemeClr>
+    </cs:fontRef>
+    <cs:spPr>
+      <a:ln w="9525" cap="flat" cmpd="sng" algn="ctr">
+        <a:solidFill>
+          <a:schemeClr val="tx1">
+            <a:lumMod val="15000"/>
+            <a:lumOff val="85000"/>
+          </a:schemeClr>
+        </a:solidFill>
+        <a:round/>
+      </a:ln>
+    </cs:spPr>
+    <cs:defRPr sz="1197" kern="1200"/>
+  </cs:categoryAxis>
+  <cs:chartArea mods="allowNoFillOverride allowNoLineOverride">
+    <cs:lnRef idx="0"/>
+    <cs:fillRef idx="0"/>
+    <cs:effectRef idx="0"/>
+    <cs:fontRef idx="minor">
+      <a:schemeClr val="tx1"/>
+    </cs:fontRef>
+    <cs:spPr>
+      <a:solidFill>
+        <a:schemeClr val="bg1"/>
+      </a:solidFill>
+      <a:ln w="9525" cap="flat" cmpd="sng" algn="ctr">
+        <a:solidFill>
+          <a:schemeClr val="tx1">
+            <a:lumMod val="15000"/>
+            <a:lumOff val="85000"/>
+          </a:schemeClr>
+        </a:solidFill>
+        <a:round/>
+      </a:ln>
+    </cs:spPr>
+    <cs:defRPr sz="1330" kern="1200"/>
+  </cs:chartArea>
+  <cs:dataLabel>
+    <cs:lnRef idx="0"/>
+    <cs:fillRef idx="0"/>
+    <cs:effectRef idx="0"/>
+    <cs:fontRef idx="minor">
+      <a:schemeClr val="tx1">
+        <a:lumMod val="75000"/>
+        <a:lumOff val="25000"/>
+      </a:schemeClr>
+    </cs:fontRef>
+    <cs:defRPr sz="1197" kern="1200"/>
+  </cs:dataLabel>
+  <cs:dataLabelCallout>
+    <cs:lnRef idx="0"/>
+    <cs:fillRef idx="0"/>
+    <cs:effectRef idx="0"/>
+    <cs:fontRef idx="minor">
+      <a:schemeClr val="dk1">
+        <a:lumMod val="65000"/>
+        <a:lumOff val="35000"/>
+      </a:schemeClr>
+    </cs:fontRef>
+    <cs:spPr>
+      <a:solidFill>
+        <a:schemeClr val="lt1"/>
+      </a:solidFill>
+      <a:ln>
+        <a:solidFill>
+          <a:schemeClr val="dk1">
+            <a:lumMod val="25000"/>
+            <a:lumOff val="75000"/>
+          </a:schemeClr>
+        </a:solidFill>
+      </a:ln>
+    </cs:spPr>
+    <cs:defRPr sz="1197" kern="1200"/>
+    <cs:bodyPr rot="0" spcFirstLastPara="1" vertOverflow="clip" horzOverflow="clip" vert="horz" wrap="square" lIns="36576" tIns="18288" rIns="36576" bIns="18288" anchor="ctr" anchorCtr="1">
+      <a:spAutoFit/>
+    </cs:bodyPr>
+  </cs:dataLabelCallout>
+  <cs:dataPoint>
+    <cs:lnRef idx="0"/>
+    <cs:fillRef idx="1">
+      <cs:styleClr val="auto"/>
+    </cs:fillRef>
+    <cs:effectRef idx="0"/>
+    <cs:fontRef idx="minor">
+      <a:schemeClr val="tx1"/>
+    </cs:fontRef>
+  </cs:dataPoint>
+  <cs:dataPoint3D>
+    <cs:lnRef idx="0"/>
+    <cs:fillRef idx="1">
+      <cs:styleClr val="auto"/>
+    </cs:fillRef>
+    <cs:effectRef idx="0"/>
+    <cs:fontRef idx="minor">
+      <a:schemeClr val="tx1"/>
+    </cs:fontRef>
+  </cs:dataPoint3D>
+  <cs:dataPointLine>
+    <cs:lnRef idx="0">
+      <cs:styleClr val="auto"/>
+    </cs:lnRef>
+    <cs:fillRef idx="1"/>
+    <cs:effectRef idx="0"/>
+    <cs:fontRef idx="minor">
+      <a:schemeClr val="tx1"/>
+    </cs:fontRef>
+    <cs:spPr>
+      <a:ln w="28575" cap="rnd">
+        <a:solidFill>
+          <a:schemeClr val="phClr"/>
+        </a:solidFill>
+        <a:round/>
+      </a:ln>
+    </cs:spPr>
+  </cs:dataPointLine>
+  <cs:dataPointMarker>
+    <cs:lnRef idx="0">
+      <cs:styleClr val="auto"/>
+    </cs:lnRef>
+    <cs:fillRef idx="1">
+      <cs:styleClr val="auto"/>
+    </cs:fillRef>
+    <cs:effectRef idx="0"/>
+    <cs:fontRef idx="minor">
+      <a:schemeClr val="tx1"/>
+    </cs:fontRef>
+    <cs:spPr>
+      <a:ln w="9525">
+        <a:solidFill>
+          <a:schemeClr val="phClr"/>
+        </a:solidFill>
+      </a:ln>
+    </cs:spPr>
+  </cs:dataPointMarker>
+  <cs:dataPointMarkerLayout symbol="circle" size="5"/>
+  <cs:dataPointWireframe>
+    <cs:lnRef idx="0">
+      <cs:styleClr val="auto"/>
+    </cs:lnRef>
+    <cs:fillRef idx="1"/>
+    <cs:effectRef idx="0"/>
+    <cs:fontRef idx="minor">
+      <a:schemeClr val="tx1"/>
+    </cs:fontRef>
+    <cs:spPr>
+      <a:ln w="9525" cap="rnd">
+        <a:solidFill>
+          <a:schemeClr val="phClr"/>
+        </a:solidFill>
+        <a:round/>
+      </a:ln>
+    </cs:spPr>
+  </cs:dataPointWireframe>
+  <cs:dataTable>
+    <cs:lnRef idx="0"/>
+    <cs:fillRef idx="0"/>
+    <cs:effectRef idx="0"/>
+    <cs:fontRef idx="minor">
+      <a:schemeClr val="tx1">
+        <a:lumMod val="65000"/>
+        <a:lumOff val="35000"/>
+      </a:schemeClr>
+    </cs:fontRef>
+    <cs:spPr>
+      <a:noFill/>
+      <a:ln w="9525" cap="flat" cmpd="sng" algn="ctr">
+        <a:solidFill>
+          <a:schemeClr val="tx1">
+            <a:lumMod val="15000"/>
+            <a:lumOff val="85000"/>
+          </a:schemeClr>
+        </a:solidFill>
+        <a:round/>
+      </a:ln>
+    </cs:spPr>
+    <cs:defRPr sz="1197" kern="1200"/>
+  </cs:dataTable>
+  <cs:downBar>
+    <cs:lnRef idx="0"/>
+    <cs:fillRef idx="0"/>
+    <cs:effectRef idx="0"/>
+    <cs:fontRef idx="minor">
+      <a:schemeClr val="dk1"/>
+    </cs:fontRef>
+    <cs:spPr>
+      <a:solidFill>
+        <a:schemeClr val="dk1">
+          <a:lumMod val="65000"/>
+          <a:lumOff val="35000"/>
+        </a:schemeClr>
+      </a:solidFill>
+      <a:ln w="9525">
+        <a:solidFill>
+          <a:schemeClr val="tx1">
+            <a:lumMod val="65000"/>
+            <a:lumOff val="35000"/>
+          </a:schemeClr>
+        </a:solidFill>
+      </a:ln>
+    </cs:spPr>
+  </cs:downBar>
+  <cs:dropLine>
+    <cs:lnRef idx="0"/>
+    <cs:fillRef idx="0"/>
+    <cs:effectRef idx="0"/>
+    <cs:fontRef idx="minor">
+      <a:schemeClr val="tx1"/>
+    </cs:fontRef>
+    <cs:spPr>
+      <a:ln w="9525" cap="flat" cmpd="sng" algn="ctr">
+        <a:solidFill>
+          <a:schemeClr val="tx1">
+            <a:lumMod val="35000"/>
+            <a:lumOff val="65000"/>
+          </a:schemeClr>
+        </a:solidFill>
+        <a:round/>
+      </a:ln>
+    </cs:spPr>
+  </cs:dropLine>
+  <cs:errorBar>
+    <cs:lnRef idx="0"/>
+    <cs:fillRef idx="0"/>
+    <cs:effectRef idx="0"/>
+    <cs:fontRef idx="minor">
+      <a:schemeClr val="tx1"/>
+    </cs:fontRef>
+    <cs:spPr>
+      <a:ln w="9525" cap="flat" cmpd="sng" algn="ctr">
+        <a:solidFill>
+          <a:schemeClr val="tx1">
+            <a:lumMod val="65000"/>
+            <a:lumOff val="35000"/>
+          </a:schemeClr>
+        </a:solidFill>
+        <a:round/>
+      </a:ln>
+    </cs:spPr>
+  </cs:errorBar>
+  <cs:floor>
+    <cs:lnRef idx="0"/>
+    <cs:fillRef idx="0"/>
+    <cs:effectRef idx="0"/>
+    <cs:fontRef idx="minor">
+      <a:schemeClr val="tx1"/>
+    </cs:fontRef>
+    <cs:spPr>
+      <a:noFill/>
+      <a:ln>
+        <a:noFill/>
+      </a:ln>
+    </cs:spPr>
+  </cs:floor>
+  <cs:gridlineMajor>
+    <cs:lnRef idx="0"/>
+    <cs:fillRef idx="0"/>
+    <cs:effectRef idx="0"/>
+    <cs:fontRef idx="minor">
+      <a:schemeClr val="tx1"/>
+    </cs:fontRef>
+    <cs:spPr>
+      <a:ln w="9525" cap="flat" cmpd="sng" algn="ctr">
+        <a:solidFill>
+          <a:schemeClr val="tx1">
+            <a:lumMod val="15000"/>
+            <a:lumOff val="85000"/>
+          </a:schemeClr>
+        </a:solidFill>
+        <a:round/>
+      </a:ln>
+    </cs:spPr>
+  </cs:gridlineMajor>
+  <cs:gridlineMinor>
+    <cs:lnRef idx="0"/>
+    <cs:fillRef idx="0"/>
+    <cs:effectRef idx="0"/>
+    <cs:fontRef idx="minor">
+      <a:schemeClr val="tx1"/>
+    </cs:fontRef>
+    <cs:spPr>
+      <a:ln w="9525" cap="flat" cmpd="sng" algn="ctr">
+        <a:solidFill>
+          <a:schemeClr val="tx1">
+            <a:lumMod val="5000"/>
+            <a:lumOff val="95000"/>
+          </a:schemeClr>
+        </a:solidFill>
+        <a:round/>
+      </a:ln>
+    </cs:spPr>
+  </cs:gridlineMinor>
+  <cs:hiLoLine>
+    <cs:lnRef idx="0"/>
+    <cs:fillRef idx="0"/>
+    <cs:effectRef idx="0"/>
+    <cs:fontRef idx="minor">
+      <a:schemeClr val="tx1"/>
+    </cs:fontRef>
+    <cs:spPr>
+      <a:ln w="9525" cap="flat" cmpd="sng" algn="ctr">
+        <a:solidFill>
+          <a:schemeClr val="tx1">
+            <a:lumMod val="75000"/>
+            <a:lumOff val="25000"/>
+          </a:schemeClr>
+        </a:solidFill>
+        <a:round/>
+      </a:ln>
+    </cs:spPr>
+  </cs:hiLoLine>
+  <cs:leaderLine>
+    <cs:lnRef idx="0"/>
+    <cs:fillRef idx="0"/>
+    <cs:effectRef idx="0"/>
+    <cs:fontRef idx="minor">
+      <a:schemeClr val="tx1"/>
+    </cs:fontRef>
+    <cs:spPr>
+      <a:ln w="9525" cap="flat" cmpd="sng" algn="ctr">
+        <a:solidFill>
+          <a:schemeClr val="tx1">
+            <a:lumMod val="35000"/>
+            <a:lumOff val="65000"/>
+          </a:schemeClr>
+        </a:solidFill>
+        <a:round/>
+      </a:ln>
+    </cs:spPr>
+  </cs:leaderLine>
+  <cs:legend>
+    <cs:lnRef idx="0"/>
+    <cs:fillRef idx="0"/>
+    <cs:effectRef idx="0"/>
+    <cs:fontRef idx="minor">
+      <a:schemeClr val="tx1">
+        <a:lumMod val="65000"/>
+        <a:lumOff val="35000"/>
+      </a:schemeClr>
+    </cs:fontRef>
+    <cs:defRPr sz="1197" kern="1200"/>
+  </cs:legend>
+  <cs:plotArea mods="allowNoFillOverride allowNoLineOverride">
+    <cs:lnRef idx="0"/>
+    <cs:fillRef idx="0"/>
+    <cs:effectRef idx="0"/>
+    <cs:fontRef idx="minor">
+      <a:schemeClr val="tx1"/>
+    </cs:fontRef>
+  </cs:plotArea>
+  <cs:plotArea3D mods="allowNoFillOverride allowNoLineOverride">
+    <cs:lnRef idx="0"/>
+    <cs:fillRef idx="0"/>
+    <cs:effectRef idx="0"/>
+    <cs:fontRef idx="minor">
+      <a:schemeClr val="tx1"/>
+    </cs:fontRef>
+  </cs:plotArea3D>
+  <cs:seriesAxis>
+    <cs:lnRef idx="0"/>
+    <cs:fillRef idx="0"/>
+    <cs:effectRef idx="0"/>
+    <cs:fontRef idx="minor">
+      <a:schemeClr val="tx1">
+        <a:lumMod val="65000"/>
+        <a:lumOff val="35000"/>
+      </a:schemeClr>
+    </cs:fontRef>
+    <cs:defRPr sz="1197" kern="1200"/>
+  </cs:seriesAxis>
+  <cs:seriesLine>
+    <cs:lnRef idx="0"/>
+    <cs:fillRef idx="0"/>
+    <cs:effectRef idx="0"/>
+    <cs:fontRef idx="minor">
+      <a:schemeClr val="tx1"/>
+    </cs:fontRef>
+    <cs:spPr>
+      <a:ln w="9525" cap="flat" cmpd="sng" algn="ctr">
+        <a:solidFill>
+          <a:schemeClr val="tx1">
+            <a:lumMod val="35000"/>
+            <a:lumOff val="65000"/>
+          </a:schemeClr>
+        </a:solidFill>
+        <a:round/>
+      </a:ln>
+    </cs:spPr>
+  </cs:seriesLine>
+  <cs:title>
+    <cs:lnRef idx="0"/>
+    <cs:fillRef idx="0"/>
+    <cs:effectRef idx="0"/>
+    <cs:fontRef idx="minor">
+      <a:schemeClr val="tx1">
+        <a:lumMod val="65000"/>
+        <a:lumOff val="35000"/>
+      </a:schemeClr>
+    </cs:fontRef>
+    <cs:defRPr sz="1862" b="0" kern="1200" spc="0" baseline="0"/>
+  </cs:title>
+  <cs:trendline>
+    <cs:lnRef idx="0">
+      <cs:styleClr val="auto"/>
+    </cs:lnRef>
+    <cs:fillRef idx="0"/>
+    <cs:effectRef idx="0"/>
+    <cs:fontRef idx="minor">
+      <a:schemeClr val="tx1"/>
+    </cs:fontRef>
+    <cs:spPr>
+      <a:ln w="19050" cap="rnd">
+        <a:solidFill>
+          <a:schemeClr val="phClr"/>
+        </a:solidFill>
+        <a:prstDash val="sysDot"/>
+      </a:ln>
+    </cs:spPr>
+  </cs:trendline>
+  <cs:trendlineLabel>
+    <cs:lnRef idx="0"/>
+    <cs:fillRef idx="0"/>
+    <cs:effectRef idx="0"/>
+    <cs:fontRef idx="minor">
+      <a:schemeClr val="tx1">
+        <a:lumMod val="65000"/>
+        <a:lumOff val="35000"/>
+      </a:schemeClr>
+    </cs:fontRef>
+    <cs:defRPr sz="1197" kern="1200"/>
+  </cs:trendlineLabel>
+  <cs:upBar>
+    <cs:lnRef idx="0"/>
+    <cs:fillRef idx="0"/>
+    <cs:effectRef idx="0"/>
+    <cs:fontRef idx="minor">
+      <a:schemeClr val="dk1"/>
+    </cs:fontRef>
+    <cs:spPr>
+      <a:solidFill>
+        <a:schemeClr val="lt1"/>
+      </a:solidFill>
+      <a:ln w="9525">
+        <a:solidFill>
+          <a:schemeClr val="tx1">
+            <a:lumMod val="15000"/>
+            <a:lumOff val="85000"/>
+          </a:schemeClr>
+        </a:solidFill>
+      </a:ln>
+    </cs:spPr>
+  </cs:upBar>
+  <cs:valueAxis>
+    <cs:lnRef idx="0"/>
+    <cs:fillRef idx="0"/>
+    <cs:effectRef idx="0"/>
+    <cs:fontRef idx="minor">
+      <a:schemeClr val="tx1">
+        <a:lumMod val="65000"/>
+        <a:lumOff val="35000"/>
+      </a:schemeClr>
+    </cs:fontRef>
+    <cs:defRPr sz="1197" kern="1200"/>
+  </cs:valueAxis>
+  <cs:wall>
+    <cs:lnRef idx="0"/>
+    <cs:fillRef idx="0"/>
+    <cs:effectRef idx="0"/>
+    <cs:fontRef idx="minor">
+      <a:schemeClr val="tx1"/>
+    </cs:fontRef>
+    <cs:spPr>
+      <a:noFill/>
+      <a:ln>
+        <a:noFill/>
+      </a:ln>
+    </cs:spPr>
+  </cs:wall>
+</cs:chartStyle>
+</file>
+
 <file path=ppt/handoutMasters/handoutMaster1.xml><?xml version="1.0" encoding="utf-8"?>
 <p:handoutMaster xmlns:a="http://schemas.openxmlformats.org/drawingml/2006/main" xmlns:r="http://schemas.openxmlformats.org/officeDocument/2006/relationships" xmlns:p="http://schemas.openxmlformats.org/presentationml/2006/main">
   <p:cSld>
@@ -1014,7 +1969,7 @@
                 <a:effectLst/>
                 <a:latin typeface="Cascadia Code" panose="020B0609020000020004" pitchFamily="49" charset="0"/>
               </a:rPr>
-              <a:t>Функціональне програмування: </a:t>
+              <a:t>Управління пам'яттю: </a:t>
             </a:r>
             <a:r>
               <a:rPr lang="en-US" b="0" dirty="0">
@@ -1034,7 +1989,27 @@
                 <a:effectLst/>
                 <a:latin typeface="Cascadia Code" panose="020B0609020000020004" pitchFamily="49" charset="0"/>
               </a:rPr>
-              <a:t>підтримує такі концепції функціонального програмування, як замикання, відображення, фільтрування та скорочення, які дозволяють розробникам писати більш стислий та зрозумілий код. Це полегшує написання складних додатків і зменшує кількість коду, який потрібно створити.</a:t>
+              <a:t>використовує автоматичний підрахунок посилань (</a:t>
+            </a:r>
+            <a:r>
+              <a:rPr lang="en-US" b="0" dirty="0">
+                <a:solidFill>
+                  <a:srgbClr val="FFE66D"/>
+                </a:solidFill>
+                <a:effectLst/>
+                <a:latin typeface="Cascadia Code" panose="020B0609020000020004" pitchFamily="49" charset="0"/>
+              </a:rPr>
+              <a:t>ARC) </a:t>
+            </a:r>
+            <a:r>
+              <a:rPr lang="uk-UA" b="0" dirty="0">
+                <a:solidFill>
+                  <a:srgbClr val="FFE66D"/>
+                </a:solidFill>
+                <a:effectLst/>
+                <a:latin typeface="Cascadia Code" panose="020B0609020000020004" pitchFamily="49" charset="0"/>
+              </a:rPr>
+              <a:t>для керування пам'яттю, який автоматично звільняє пам'ять, коли вона більше не використовується. Це допомагає розробникам писати більш ефективний код і зменшує ризик витоку пам'яті.</a:t>
             </a:r>
             <a:endParaRPr lang="uk-UA" b="0" dirty="0">
               <a:solidFill>
@@ -1073,7 +2048,7 @@
     </p:spTree>
     <p:extLst>
       <p:ext uri="{BB962C8B-B14F-4D97-AF65-F5344CB8AC3E}">
-        <p14:creationId xmlns:p14="http://schemas.microsoft.com/office/powerpoint/2010/main" val="2736973545"/>
+        <p14:creationId xmlns:p14="http://schemas.microsoft.com/office/powerpoint/2010/main" val="1803136809"/>
       </p:ext>
     </p:extLst>
   </p:cSld>
@@ -1147,77 +2122,17 @@
             <a:r>
               <a:rPr lang="uk-UA" b="0" dirty="0">
                 <a:solidFill>
-                  <a:srgbClr val="D5CED9"/>
+                  <a:srgbClr val="FFE66D"/>
                 </a:solidFill>
                 <a:effectLst/>
                 <a:latin typeface="Cascadia Code" panose="020B0609020000020004" pitchFamily="49" charset="0"/>
               </a:rPr>
-              <a:t>Отже, </a:t>
+              <a:t>Управління пам'яттю: </a:t>
             </a:r>
             <a:r>
               <a:rPr lang="en-US" b="0" dirty="0">
                 <a:solidFill>
-                  <a:srgbClr val="D5CED9"/>
-                </a:solidFill>
-                <a:effectLst/>
-                <a:latin typeface="Cascadia Code" panose="020B0609020000020004" pitchFamily="49" charset="0"/>
-              </a:rPr>
-              <a:t>Swift - </a:t>
-            </a:r>
-            <a:r>
-              <a:rPr lang="uk-UA" b="0" dirty="0">
-                <a:solidFill>
-                  <a:srgbClr val="D5CED9"/>
-                </a:solidFill>
-                <a:effectLst/>
-                <a:latin typeface="Cascadia Code" panose="020B0609020000020004" pitchFamily="49" charset="0"/>
-              </a:rPr>
-              <a:t>це потужна та інтуїтивно зрозуміла мова програмування, яка стала незамінним інструментом для розробників, що створюють додатки для платформ </a:t>
-            </a:r>
-            <a:r>
-              <a:rPr lang="en-US" b="0" dirty="0">
-                <a:solidFill>
-                  <a:srgbClr val="D5CED9"/>
-                </a:solidFill>
-                <a:effectLst/>
-                <a:latin typeface="Cascadia Code" panose="020B0609020000020004" pitchFamily="49" charset="0"/>
-              </a:rPr>
-              <a:t>Apple. </a:t>
-            </a:r>
-            <a:r>
-              <a:rPr lang="uk-UA" b="0" dirty="0">
-                <a:solidFill>
-                  <a:srgbClr val="D5CED9"/>
-                </a:solidFill>
-                <a:effectLst/>
-                <a:latin typeface="Cascadia Code" panose="020B0609020000020004" pitchFamily="49" charset="0"/>
-              </a:rPr>
-              <a:t>Безпека, швидкість, простота використання, сумісність з </a:t>
-            </a:r>
-            <a:r>
-              <a:rPr lang="en-US" b="0" dirty="0">
-                <a:solidFill>
-                  <a:srgbClr val="D5CED9"/>
-                </a:solidFill>
-                <a:effectLst/>
-                <a:latin typeface="Cascadia Code" panose="020B0609020000020004" pitchFamily="49" charset="0"/>
-              </a:rPr>
-              <a:t>Objective-C </a:t>
-            </a:r>
-            <a:r>
-              <a:rPr lang="uk-UA" b="0" dirty="0">
-                <a:solidFill>
-                  <a:srgbClr val="D5CED9"/>
-                </a:solidFill>
-                <a:effectLst/>
-                <a:latin typeface="Cascadia Code" panose="020B0609020000020004" pitchFamily="49" charset="0"/>
-              </a:rPr>
-              <a:t>та підтримка функціональних концепцій програмування роблять її популярним вибором серед розробників. Очікується, що завдяки відкритому коду та зростаючій спільноті розробників </a:t>
-            </a:r>
-            <a:r>
-              <a:rPr lang="en-US" b="0" dirty="0">
-                <a:solidFill>
-                  <a:srgbClr val="D5CED9"/>
+                  <a:srgbClr val="FFE66D"/>
                 </a:solidFill>
                 <a:effectLst/>
                 <a:latin typeface="Cascadia Code" panose="020B0609020000020004" pitchFamily="49" charset="0"/>
@@ -1227,13 +2142,40 @@
             <a:r>
               <a:rPr lang="uk-UA" b="0" dirty="0">
                 <a:solidFill>
-                  <a:srgbClr val="D5CED9"/>
+                  <a:srgbClr val="FFE66D"/>
                 </a:solidFill>
                 <a:effectLst/>
                 <a:latin typeface="Cascadia Code" panose="020B0609020000020004" pitchFamily="49" charset="0"/>
               </a:rPr>
-              <a:t>продовжуватиме розвиватися та вдосконалюватися, що зробить його ще більш універсальним та потужним інструментом у майбутньому.</a:t>
-            </a:r>
+              <a:t>використовує автоматичний підрахунок посилань (</a:t>
+            </a:r>
+            <a:r>
+              <a:rPr lang="en-US" b="0" dirty="0">
+                <a:solidFill>
+                  <a:srgbClr val="FFE66D"/>
+                </a:solidFill>
+                <a:effectLst/>
+                <a:latin typeface="Cascadia Code" panose="020B0609020000020004" pitchFamily="49" charset="0"/>
+              </a:rPr>
+              <a:t>ARC) </a:t>
+            </a:r>
+            <a:r>
+              <a:rPr lang="uk-UA" b="0" dirty="0">
+                <a:solidFill>
+                  <a:srgbClr val="FFE66D"/>
+                </a:solidFill>
+                <a:effectLst/>
+                <a:latin typeface="Cascadia Code" panose="020B0609020000020004" pitchFamily="49" charset="0"/>
+              </a:rPr>
+              <a:t>для керування пам'яттю, який автоматично звільняє пам'ять, коли вона більше не використовується. Це допомагає розробникам писати більш ефективний код і зменшує ризик витоку пам'яті.</a:t>
+            </a:r>
+            <a:endParaRPr lang="uk-UA" b="0" dirty="0">
+              <a:solidFill>
+                <a:srgbClr val="D5CED9"/>
+              </a:solidFill>
+              <a:effectLst/>
+              <a:latin typeface="Cascadia Code" panose="020B0609020000020004" pitchFamily="49" charset="0"/>
+            </a:endParaRPr>
           </a:p>
         </p:txBody>
       </p:sp>
@@ -1264,7 +2206,7 @@
     </p:spTree>
     <p:extLst>
       <p:ext uri="{BB962C8B-B14F-4D97-AF65-F5344CB8AC3E}">
-        <p14:creationId xmlns:p14="http://schemas.microsoft.com/office/powerpoint/2010/main" val="3378421579"/>
+        <p14:creationId xmlns:p14="http://schemas.microsoft.com/office/powerpoint/2010/main" val="518848722"/>
       </p:ext>
     </p:extLst>
   </p:cSld>
@@ -1318,7 +2260,80 @@
           <a:bodyPr/>
           <a:lstStyle/>
           <a:p>
-            <a:endParaRPr lang="uk-UA"/>
+            <a:pPr marL="0" marR="0" lvl="0" indent="0" algn="l" defTabSz="914400" rtl="0" eaLnBrk="1" fontAlgn="auto" latinLnBrk="0" hangingPunct="1">
+              <a:lnSpc>
+                <a:spcPct val="100000"/>
+              </a:lnSpc>
+              <a:spcBef>
+                <a:spcPts val="0"/>
+              </a:spcBef>
+              <a:spcAft>
+                <a:spcPts val="0"/>
+              </a:spcAft>
+              <a:buClrTx/>
+              <a:buSzTx/>
+              <a:buFontTx/>
+              <a:buNone/>
+              <a:tabLst/>
+              <a:defRPr/>
+            </a:pPr>
+            <a:r>
+              <a:rPr lang="uk-UA" b="0" dirty="0">
+                <a:solidFill>
+                  <a:srgbClr val="FFE66D"/>
+                </a:solidFill>
+                <a:effectLst/>
+                <a:latin typeface="Cascadia Code" panose="020B0609020000020004" pitchFamily="49" charset="0"/>
+              </a:rPr>
+              <a:t>Управління пам'яттю: </a:t>
+            </a:r>
+            <a:r>
+              <a:rPr lang="en-US" b="0" dirty="0">
+                <a:solidFill>
+                  <a:srgbClr val="FFE66D"/>
+                </a:solidFill>
+                <a:effectLst/>
+                <a:latin typeface="Cascadia Code" panose="020B0609020000020004" pitchFamily="49" charset="0"/>
+              </a:rPr>
+              <a:t>Swift </a:t>
+            </a:r>
+            <a:r>
+              <a:rPr lang="uk-UA" b="0" dirty="0">
+                <a:solidFill>
+                  <a:srgbClr val="FFE66D"/>
+                </a:solidFill>
+                <a:effectLst/>
+                <a:latin typeface="Cascadia Code" panose="020B0609020000020004" pitchFamily="49" charset="0"/>
+              </a:rPr>
+              <a:t>використовує автоматичний підрахунок посилань (</a:t>
+            </a:r>
+            <a:r>
+              <a:rPr lang="en-US" b="0" dirty="0">
+                <a:solidFill>
+                  <a:srgbClr val="FFE66D"/>
+                </a:solidFill>
+                <a:effectLst/>
+                <a:latin typeface="Cascadia Code" panose="020B0609020000020004" pitchFamily="49" charset="0"/>
+              </a:rPr>
+              <a:t>ARC) </a:t>
+            </a:r>
+            <a:r>
+              <a:rPr lang="uk-UA" b="0" dirty="0">
+                <a:solidFill>
+                  <a:srgbClr val="FFE66D"/>
+                </a:solidFill>
+                <a:effectLst/>
+                <a:latin typeface="Cascadia Code" panose="020B0609020000020004" pitchFamily="49" charset="0"/>
+              </a:rPr>
+              <a:t>для керування пам'яттю, який автоматично звільняє пам'ять, коли вона більше не використовується. Це допомагає розробникам писати більш ефективний код і зменшує ризик витоку пам'яті.</a:t>
+            </a:r>
+            <a:endParaRPr lang="uk-UA" b="0" dirty="0">
+              <a:solidFill>
+                <a:srgbClr val="D5CED9"/>
+              </a:solidFill>
+              <a:effectLst/>
+              <a:latin typeface="Cascadia Code" panose="020B0609020000020004" pitchFamily="49" charset="0"/>
+            </a:endParaRPr>
           </a:p>
         </p:txBody>
       </p:sp>
@@ -1341,6 +2356,282 @@
             <a:fld id="{F97DC217-DF71-1A49-B3EA-559F1F43B0FF}" type="slidenum">
               <a:rPr lang="uk-UA" smtClean="0"/>
               <a:t>13</a:t>
+            </a:fld>
+            <a:endParaRPr lang="uk-UA"/>
+          </a:p>
+        </p:txBody>
+      </p:sp>
+    </p:spTree>
+    <p:extLst>
+      <p:ext uri="{BB962C8B-B14F-4D97-AF65-F5344CB8AC3E}">
+        <p14:creationId xmlns:p14="http://schemas.microsoft.com/office/powerpoint/2010/main" val="3774930728"/>
+      </p:ext>
+    </p:extLst>
+  </p:cSld>
+  <p:clrMapOvr>
+    <a:masterClrMapping/>
+  </p:clrMapOvr>
+</p:notes>
+</file>
+
+<file path=ppt/notesSlides/notesSlide14.xml><?xml version="1.0" encoding="utf-8"?>
+<p:notes xmlns:a="http://schemas.openxmlformats.org/drawingml/2006/main" xmlns:r="http://schemas.openxmlformats.org/officeDocument/2006/relationships" xmlns:p="http://schemas.openxmlformats.org/presentationml/2006/main">
+  <p:cSld>
+    <p:spTree>
+      <p:nvGrpSpPr>
+        <p:cNvPr id="1" name=""/>
+        <p:cNvGrpSpPr/>
+        <p:nvPr/>
+      </p:nvGrpSpPr>
+      <p:grpSpPr>
+        <a:xfrm>
+          <a:off x="0" y="0"/>
+          <a:ext cx="0" cy="0"/>
+          <a:chOff x="0" y="0"/>
+          <a:chExt cx="0" cy="0"/>
+        </a:xfrm>
+      </p:grpSpPr>
+      <p:sp>
+        <p:nvSpPr>
+          <p:cNvPr id="2" name="Місце для зображення 1"/>
+          <p:cNvSpPr>
+            <a:spLocks noGrp="1" noRot="1" noChangeAspect="1"/>
+          </p:cNvSpPr>
+          <p:nvPr>
+            <p:ph type="sldImg"/>
+          </p:nvPr>
+        </p:nvSpPr>
+        <p:spPr/>
+      </p:sp>
+      <p:sp>
+        <p:nvSpPr>
+          <p:cNvPr id="3" name="Місце для нотаток 2"/>
+          <p:cNvSpPr>
+            <a:spLocks noGrp="1"/>
+          </p:cNvSpPr>
+          <p:nvPr>
+            <p:ph type="body" idx="1"/>
+          </p:nvPr>
+        </p:nvSpPr>
+        <p:spPr/>
+        <p:txBody>
+          <a:bodyPr/>
+          <a:lstStyle/>
+          <a:p>
+            <a:pPr marL="0" marR="0" lvl="0" indent="0" algn="l" defTabSz="914400" rtl="0" eaLnBrk="1" fontAlgn="auto" latinLnBrk="0" hangingPunct="1">
+              <a:lnSpc>
+                <a:spcPct val="100000"/>
+              </a:lnSpc>
+              <a:spcBef>
+                <a:spcPts val="0"/>
+              </a:spcBef>
+              <a:spcAft>
+                <a:spcPts val="0"/>
+              </a:spcAft>
+              <a:buClrTx/>
+              <a:buSzTx/>
+              <a:buFontTx/>
+              <a:buNone/>
+              <a:tabLst/>
+              <a:defRPr/>
+            </a:pPr>
+            <a:r>
+              <a:rPr lang="uk-UA" b="0" dirty="0">
+                <a:solidFill>
+                  <a:srgbClr val="D5CED9"/>
+                </a:solidFill>
+                <a:effectLst/>
+                <a:latin typeface="Cascadia Code" panose="020B0609020000020004" pitchFamily="49" charset="0"/>
+              </a:rPr>
+              <a:t>Отже, </a:t>
+            </a:r>
+            <a:r>
+              <a:rPr lang="en-US" b="0" dirty="0">
+                <a:solidFill>
+                  <a:srgbClr val="D5CED9"/>
+                </a:solidFill>
+                <a:effectLst/>
+                <a:latin typeface="Cascadia Code" panose="020B0609020000020004" pitchFamily="49" charset="0"/>
+              </a:rPr>
+              <a:t>Swift - </a:t>
+            </a:r>
+            <a:r>
+              <a:rPr lang="uk-UA" b="0" dirty="0">
+                <a:solidFill>
+                  <a:srgbClr val="D5CED9"/>
+                </a:solidFill>
+                <a:effectLst/>
+                <a:latin typeface="Cascadia Code" panose="020B0609020000020004" pitchFamily="49" charset="0"/>
+              </a:rPr>
+              <a:t>це потужна та інтуїтивно зрозуміла мова програмування, яка стала незамінним інструментом для розробників, що створюють додатки для платформ </a:t>
+            </a:r>
+            <a:r>
+              <a:rPr lang="en-US" b="0" dirty="0">
+                <a:solidFill>
+                  <a:srgbClr val="D5CED9"/>
+                </a:solidFill>
+                <a:effectLst/>
+                <a:latin typeface="Cascadia Code" panose="020B0609020000020004" pitchFamily="49" charset="0"/>
+              </a:rPr>
+              <a:t>Apple. </a:t>
+            </a:r>
+            <a:r>
+              <a:rPr lang="uk-UA" b="0" dirty="0">
+                <a:solidFill>
+                  <a:srgbClr val="D5CED9"/>
+                </a:solidFill>
+                <a:effectLst/>
+                <a:latin typeface="Cascadia Code" panose="020B0609020000020004" pitchFamily="49" charset="0"/>
+              </a:rPr>
+              <a:t>Безпека, швидкість, простота використання, сумісність з </a:t>
+            </a:r>
+            <a:r>
+              <a:rPr lang="en-US" b="0" dirty="0">
+                <a:solidFill>
+                  <a:srgbClr val="D5CED9"/>
+                </a:solidFill>
+                <a:effectLst/>
+                <a:latin typeface="Cascadia Code" panose="020B0609020000020004" pitchFamily="49" charset="0"/>
+              </a:rPr>
+              <a:t>Objective-C </a:t>
+            </a:r>
+            <a:r>
+              <a:rPr lang="uk-UA" b="0" dirty="0">
+                <a:solidFill>
+                  <a:srgbClr val="D5CED9"/>
+                </a:solidFill>
+                <a:effectLst/>
+                <a:latin typeface="Cascadia Code" panose="020B0609020000020004" pitchFamily="49" charset="0"/>
+              </a:rPr>
+              <a:t>та підтримка функціональних концепцій програмування роблять її популярним вибором серед розробників. Очікується, що завдяки відкритому коду та зростаючій спільноті розробників </a:t>
+            </a:r>
+            <a:r>
+              <a:rPr lang="en-US" b="0" dirty="0">
+                <a:solidFill>
+                  <a:srgbClr val="D5CED9"/>
+                </a:solidFill>
+                <a:effectLst/>
+                <a:latin typeface="Cascadia Code" panose="020B0609020000020004" pitchFamily="49" charset="0"/>
+              </a:rPr>
+              <a:t>Swift </a:t>
+            </a:r>
+            <a:r>
+              <a:rPr lang="uk-UA" b="0" dirty="0">
+                <a:solidFill>
+                  <a:srgbClr val="D5CED9"/>
+                </a:solidFill>
+                <a:effectLst/>
+                <a:latin typeface="Cascadia Code" panose="020B0609020000020004" pitchFamily="49" charset="0"/>
+              </a:rPr>
+              <a:t>продовжуватиме розвиватися та вдосконалюватися, що зробить його ще більш універсальним та потужним інструментом у майбутньому.</a:t>
+            </a:r>
+          </a:p>
+        </p:txBody>
+      </p:sp>
+      <p:sp>
+        <p:nvSpPr>
+          <p:cNvPr id="4" name="Місце для номера слайда 3"/>
+          <p:cNvSpPr>
+            <a:spLocks noGrp="1"/>
+          </p:cNvSpPr>
+          <p:nvPr>
+            <p:ph type="sldNum" sz="quarter" idx="5"/>
+          </p:nvPr>
+        </p:nvSpPr>
+        <p:spPr/>
+        <p:txBody>
+          <a:bodyPr/>
+          <a:lstStyle/>
+          <a:p>
+            <a:pPr rtl="0"/>
+            <a:fld id="{F97DC217-DF71-1A49-B3EA-559F1F43B0FF}" type="slidenum">
+              <a:rPr lang="uk-UA" smtClean="0"/>
+              <a:t>14</a:t>
+            </a:fld>
+            <a:endParaRPr lang="uk-UA"/>
+          </a:p>
+        </p:txBody>
+      </p:sp>
+    </p:spTree>
+    <p:extLst>
+      <p:ext uri="{BB962C8B-B14F-4D97-AF65-F5344CB8AC3E}">
+        <p14:creationId xmlns:p14="http://schemas.microsoft.com/office/powerpoint/2010/main" val="3378421579"/>
+      </p:ext>
+    </p:extLst>
+  </p:cSld>
+  <p:clrMapOvr>
+    <a:masterClrMapping/>
+  </p:clrMapOvr>
+</p:notes>
+</file>
+
+<file path=ppt/notesSlides/notesSlide15.xml><?xml version="1.0" encoding="utf-8"?>
+<p:notes xmlns:a="http://schemas.openxmlformats.org/drawingml/2006/main" xmlns:r="http://schemas.openxmlformats.org/officeDocument/2006/relationships" xmlns:p="http://schemas.openxmlformats.org/presentationml/2006/main">
+  <p:cSld>
+    <p:spTree>
+      <p:nvGrpSpPr>
+        <p:cNvPr id="1" name=""/>
+        <p:cNvGrpSpPr/>
+        <p:nvPr/>
+      </p:nvGrpSpPr>
+      <p:grpSpPr>
+        <a:xfrm>
+          <a:off x="0" y="0"/>
+          <a:ext cx="0" cy="0"/>
+          <a:chOff x="0" y="0"/>
+          <a:chExt cx="0" cy="0"/>
+        </a:xfrm>
+      </p:grpSpPr>
+      <p:sp>
+        <p:nvSpPr>
+          <p:cNvPr id="2" name="Місце для зображення 1"/>
+          <p:cNvSpPr>
+            <a:spLocks noGrp="1" noRot="1" noChangeAspect="1"/>
+          </p:cNvSpPr>
+          <p:nvPr>
+            <p:ph type="sldImg"/>
+          </p:nvPr>
+        </p:nvSpPr>
+        <p:spPr/>
+      </p:sp>
+      <p:sp>
+        <p:nvSpPr>
+          <p:cNvPr id="3" name="Місце для нотаток 2"/>
+          <p:cNvSpPr>
+            <a:spLocks noGrp="1"/>
+          </p:cNvSpPr>
+          <p:nvPr>
+            <p:ph type="body" idx="1"/>
+          </p:nvPr>
+        </p:nvSpPr>
+        <p:spPr/>
+        <p:txBody>
+          <a:bodyPr/>
+          <a:lstStyle/>
+          <a:p>
+            <a:endParaRPr lang="uk-UA"/>
+          </a:p>
+        </p:txBody>
+      </p:sp>
+      <p:sp>
+        <p:nvSpPr>
+          <p:cNvPr id="4" name="Місце для номера слайда 3"/>
+          <p:cNvSpPr>
+            <a:spLocks noGrp="1"/>
+          </p:cNvSpPr>
+          <p:nvPr>
+            <p:ph type="sldNum" sz="quarter" idx="5"/>
+          </p:nvPr>
+        </p:nvSpPr>
+        <p:spPr/>
+        <p:txBody>
+          <a:bodyPr/>
+          <a:lstStyle/>
+          <a:p>
+            <a:pPr rtl="0"/>
+            <a:fld id="{F97DC217-DF71-1A49-B3EA-559F1F43B0FF}" type="slidenum">
+              <a:rPr lang="uk-UA" smtClean="0"/>
+              <a:t>15</a:t>
             </a:fld>
             <a:endParaRPr lang="uk-UA"/>
           </a:p>
@@ -15895,107 +17186,7 @@
                 <a:ea typeface="Fira Code" pitchFamily="1" charset="0"/>
                 <a:cs typeface="Fira Code" pitchFamily="1" charset="0"/>
               </a:rPr>
-              <a:t>Управління пам'яттю</a:t>
-            </a:r>
-          </a:p>
-        </p:txBody>
-      </p:sp>
-      <p:sp>
-        <p:nvSpPr>
-          <p:cNvPr id="3" name="Місце для вмісту 2">
-            <a:extLst>
-              <a:ext uri="{FF2B5EF4-FFF2-40B4-BE49-F238E27FC236}">
-                <a16:creationId xmlns:a16="http://schemas.microsoft.com/office/drawing/2014/main" id="{95B371F2-DBA5-415A-82C8-651F587B857A}"/>
-              </a:ext>
-            </a:extLst>
-          </p:cNvPr>
-          <p:cNvSpPr>
-            <a:spLocks noGrp="1"/>
-          </p:cNvSpPr>
-          <p:nvPr>
-            <p:ph type="body" idx="1"/>
-          </p:nvPr>
-        </p:nvSpPr>
-        <p:spPr>
-          <a:xfrm>
-            <a:off x="1167492" y="2653167"/>
-            <a:ext cx="9779183" cy="3436483"/>
-          </a:xfrm>
-        </p:spPr>
-        <p:txBody>
-          <a:bodyPr vert="horz" lIns="91440" tIns="45720" rIns="91440" bIns="45720" rtlCol="0" anchor="t">
-            <a:normAutofit/>
-          </a:bodyPr>
-          <a:lstStyle/>
-          <a:p>
-            <a:pPr marL="342900" indent="-342900" rtl="0">
-              <a:spcBef>
-                <a:spcPts val="0"/>
-              </a:spcBef>
-              <a:buFont typeface="Arial" panose="020B0604020202020204" pitchFamily="34" charset="0"/>
-              <a:buChar char="•"/>
-            </a:pPr>
-            <a:r>
-              <a:rPr lang="uk-UA" sz="2600" dirty="0">
-                <a:latin typeface="Calibri" panose="020F0502020204030204" pitchFamily="34" charset="0"/>
-                <a:cs typeface="Calibri" panose="020F0502020204030204" pitchFamily="34" charset="0"/>
-              </a:rPr>
-              <a:t>Автоматичний підрахунок посилань </a:t>
-            </a:r>
-            <a:r>
-              <a:rPr lang="en-US" sz="2600" dirty="0">
-                <a:latin typeface="Calibri" panose="020F0502020204030204" pitchFamily="34" charset="0"/>
-                <a:cs typeface="Calibri" panose="020F0502020204030204" pitchFamily="34" charset="0"/>
-              </a:rPr>
-              <a:t>– ARC</a:t>
-            </a:r>
-          </a:p>
-          <a:p>
-            <a:pPr marL="342900" indent="-342900" rtl="0">
-              <a:spcBef>
-                <a:spcPts val="0"/>
-              </a:spcBef>
-              <a:buFont typeface="Arial" panose="020B0604020202020204" pitchFamily="34" charset="0"/>
-              <a:buChar char="•"/>
-            </a:pPr>
-            <a:r>
-              <a:rPr lang="uk-UA" sz="2600" dirty="0">
-                <a:latin typeface="Calibri" panose="020F0502020204030204" pitchFamily="34" charset="0"/>
-                <a:cs typeface="Calibri" panose="020F0502020204030204" pitchFamily="34" charset="0"/>
-              </a:rPr>
-              <a:t>Звільнення незайнятої пам’яті</a:t>
-            </a:r>
-          </a:p>
-          <a:p>
-            <a:pPr marL="342900" indent="-342900" rtl="0">
-              <a:spcBef>
-                <a:spcPts val="0"/>
-              </a:spcBef>
-              <a:buFont typeface="Arial" panose="020B0604020202020204" pitchFamily="34" charset="0"/>
-              <a:buChar char="•"/>
-            </a:pPr>
-            <a:r>
-              <a:rPr lang="uk-UA" sz="2600" dirty="0">
-                <a:latin typeface="Calibri" panose="020F0502020204030204" pitchFamily="34" charset="0"/>
-                <a:cs typeface="Calibri" panose="020F0502020204030204" pitchFamily="34" charset="0"/>
-              </a:rPr>
-              <a:t>Відсутність необхідності ручного керування</a:t>
-            </a:r>
-          </a:p>
-          <a:p>
-            <a:pPr marL="342900" indent="-342900" rtl="0">
-              <a:spcBef>
-                <a:spcPts val="0"/>
-              </a:spcBef>
-              <a:buFont typeface="Arial" panose="020B0604020202020204" pitchFamily="34" charset="0"/>
-              <a:buChar char="•"/>
-            </a:pPr>
-            <a:r>
-              <a:rPr lang="uk-UA" sz="2600" dirty="0">
-                <a:latin typeface="Calibri" panose="020F0502020204030204" pitchFamily="34" charset="0"/>
-                <a:cs typeface="Calibri" panose="020F0502020204030204" pitchFamily="34" charset="0"/>
-              </a:rPr>
-              <a:t>Покращення безпеки, як результат</a:t>
+              <a:t>Узагальнення</a:t>
             </a:r>
           </a:p>
         </p:txBody>
@@ -16071,6 +17262,66 @@
           </a:p>
         </p:txBody>
       </p:sp>
+      <p:pic>
+        <p:nvPicPr>
+          <p:cNvPr id="7" name="Рисунок 6">
+            <a:extLst>
+              <a:ext uri="{FF2B5EF4-FFF2-40B4-BE49-F238E27FC236}">
+                <a16:creationId xmlns:a16="http://schemas.microsoft.com/office/drawing/2014/main" id="{35B23B31-A458-4E76-8EF9-389FB09C04A7}"/>
+              </a:ext>
+            </a:extLst>
+          </p:cNvPr>
+          <p:cNvPicPr>
+            <a:picLocks noChangeAspect="1"/>
+          </p:cNvPicPr>
+          <p:nvPr/>
+        </p:nvPicPr>
+        <p:blipFill>
+          <a:blip r:embed="rId3"/>
+          <a:stretch>
+            <a:fillRect/>
+          </a:stretch>
+        </p:blipFill>
+        <p:spPr>
+          <a:xfrm>
+            <a:off x="104775" y="2609850"/>
+            <a:ext cx="5257800" cy="1962150"/>
+          </a:xfrm>
+          <a:prstGeom prst="rect">
+            <a:avLst/>
+          </a:prstGeom>
+        </p:spPr>
+      </p:pic>
+      <p:pic>
+        <p:nvPicPr>
+          <p:cNvPr id="9" name="Рисунок 8">
+            <a:extLst>
+              <a:ext uri="{FF2B5EF4-FFF2-40B4-BE49-F238E27FC236}">
+                <a16:creationId xmlns:a16="http://schemas.microsoft.com/office/drawing/2014/main" id="{08793CDC-3C5D-4F50-ABF4-0968E43C08B4}"/>
+              </a:ext>
+            </a:extLst>
+          </p:cNvPr>
+          <p:cNvPicPr>
+            <a:picLocks noChangeAspect="1"/>
+          </p:cNvPicPr>
+          <p:nvPr/>
+        </p:nvPicPr>
+        <p:blipFill>
+          <a:blip r:embed="rId4"/>
+          <a:stretch>
+            <a:fillRect/>
+          </a:stretch>
+        </p:blipFill>
+        <p:spPr>
+          <a:xfrm>
+            <a:off x="5469255" y="2609850"/>
+            <a:ext cx="6389370" cy="2457450"/>
+          </a:xfrm>
+          <a:prstGeom prst="rect">
+            <a:avLst/>
+          </a:prstGeom>
+        </p:spPr>
+      </p:pic>
     </p:spTree>
     <p:extLst>
       <p:ext uri="{BB962C8B-B14F-4D97-AF65-F5344CB8AC3E}">
@@ -16122,8 +17373,8 @@
         </p:nvSpPr>
         <p:spPr>
           <a:xfrm>
-            <a:off x="649619" y="381000"/>
-            <a:ext cx="10364706" cy="1325563"/>
+            <a:off x="1167492" y="381000"/>
+            <a:ext cx="9779183" cy="1325563"/>
           </a:xfrm>
         </p:spPr>
         <p:txBody>
@@ -16137,100 +17388,7 @@
                 <a:ea typeface="Fira Code" pitchFamily="1" charset="0"/>
                 <a:cs typeface="Fira Code" pitchFamily="1" charset="0"/>
               </a:rPr>
-              <a:t>Функціональне програмування</a:t>
-            </a:r>
-          </a:p>
-        </p:txBody>
-      </p:sp>
-      <p:sp>
-        <p:nvSpPr>
-          <p:cNvPr id="3" name="Місце для вмісту 2">
-            <a:extLst>
-              <a:ext uri="{FF2B5EF4-FFF2-40B4-BE49-F238E27FC236}">
-                <a16:creationId xmlns:a16="http://schemas.microsoft.com/office/drawing/2014/main" id="{95B371F2-DBA5-415A-82C8-651F587B857A}"/>
-              </a:ext>
-            </a:extLst>
-          </p:cNvPr>
-          <p:cNvSpPr>
-            <a:spLocks noGrp="1"/>
-          </p:cNvSpPr>
-          <p:nvPr>
-            <p:ph type="body" idx="1"/>
-          </p:nvPr>
-        </p:nvSpPr>
-        <p:spPr>
-          <a:xfrm>
-            <a:off x="1167492" y="2653167"/>
-            <a:ext cx="9779183" cy="3436483"/>
-          </a:xfrm>
-        </p:spPr>
-        <p:txBody>
-          <a:bodyPr vert="horz" lIns="91440" tIns="45720" rIns="91440" bIns="45720" rtlCol="0" anchor="t">
-            <a:normAutofit/>
-          </a:bodyPr>
-          <a:lstStyle/>
-          <a:p>
-            <a:pPr marL="342900" indent="-342900" rtl="0">
-              <a:spcBef>
-                <a:spcPts val="0"/>
-              </a:spcBef>
-              <a:buFont typeface="Arial" panose="020B0604020202020204" pitchFamily="34" charset="0"/>
-              <a:buChar char="•"/>
-            </a:pPr>
-            <a:r>
-              <a:rPr lang="uk-UA" sz="2600" dirty="0">
-                <a:latin typeface="Calibri" panose="020F0502020204030204" pitchFamily="34" charset="0"/>
-                <a:cs typeface="Calibri" panose="020F0502020204030204" pitchFamily="34" charset="0"/>
-              </a:rPr>
-              <a:t>Замикання, відображення, фільтрування та скорочення</a:t>
-            </a:r>
-          </a:p>
-          <a:p>
-            <a:pPr marL="342900" indent="-342900" rtl="0">
-              <a:spcBef>
-                <a:spcPts val="0"/>
-              </a:spcBef>
-              <a:buFont typeface="Arial" panose="020B0604020202020204" pitchFamily="34" charset="0"/>
-              <a:buChar char="•"/>
-            </a:pPr>
-            <a:r>
-              <a:rPr lang="uk-UA" sz="2600" dirty="0">
-                <a:latin typeface="Calibri" panose="020F0502020204030204" pitchFamily="34" charset="0"/>
-                <a:cs typeface="Calibri" panose="020F0502020204030204" pitchFamily="34" charset="0"/>
-              </a:rPr>
-              <a:t>Більш стислий та зрозумілий код</a:t>
-            </a:r>
-          </a:p>
-          <a:p>
-            <a:pPr marL="342900" indent="-342900" rtl="0">
-              <a:spcBef>
-                <a:spcPts val="0"/>
-              </a:spcBef>
-              <a:buFont typeface="Arial" panose="020B0604020202020204" pitchFamily="34" charset="0"/>
-              <a:buChar char="•"/>
-            </a:pPr>
-            <a:r>
-              <a:rPr lang="uk-UA" sz="2600" dirty="0">
-                <a:latin typeface="Calibri" panose="020F0502020204030204" pitchFamily="34" charset="0"/>
-                <a:cs typeface="Calibri" panose="020F0502020204030204" pitchFamily="34" charset="0"/>
-              </a:rPr>
-              <a:t>Функції як типи даних</a:t>
-            </a:r>
-          </a:p>
-          <a:p>
-            <a:pPr marL="342900" indent="-342900" rtl="0">
-              <a:spcBef>
-                <a:spcPts val="0"/>
-              </a:spcBef>
-              <a:buFont typeface="Arial" panose="020B0604020202020204" pitchFamily="34" charset="0"/>
-              <a:buChar char="•"/>
-            </a:pPr>
-            <a:r>
-              <a:rPr lang="uk-UA" sz="2600" dirty="0">
-                <a:latin typeface="Calibri" panose="020F0502020204030204" pitchFamily="34" charset="0"/>
-                <a:cs typeface="Calibri" panose="020F0502020204030204" pitchFamily="34" charset="0"/>
-              </a:rPr>
-              <a:t>Легка інтеграція з об’єктно-орієнтованим кодом</a:t>
+              <a:t>Закриття</a:t>
             </a:r>
           </a:p>
         </p:txBody>
@@ -16264,7 +17422,7 @@
             <a:pPr rtl="0"/>
             <a:fld id="{2B3FECCB-B4D4-4C4B-87FB-97861EE1F201}" type="datetime1">
               <a:rPr lang="uk-UA" smtClean="0"/>
-              <a:t>19.04.2023</a:t>
+              <a:t>20.04.2023</a:t>
             </a:fld>
             <a:endParaRPr lang="uk-UA"/>
           </a:p>
@@ -16306,10 +17464,40 @@
           </a:p>
         </p:txBody>
       </p:sp>
+      <p:pic>
+        <p:nvPicPr>
+          <p:cNvPr id="5" name="Рисунок 4">
+            <a:extLst>
+              <a:ext uri="{FF2B5EF4-FFF2-40B4-BE49-F238E27FC236}">
+                <a16:creationId xmlns:a16="http://schemas.microsoft.com/office/drawing/2014/main" id="{831F5BA8-0D2B-424E-BB10-A05079B23CF4}"/>
+              </a:ext>
+            </a:extLst>
+          </p:cNvPr>
+          <p:cNvPicPr>
+            <a:picLocks noChangeAspect="1"/>
+          </p:cNvPicPr>
+          <p:nvPr/>
+        </p:nvPicPr>
+        <p:blipFill>
+          <a:blip r:embed="rId3"/>
+          <a:stretch>
+            <a:fillRect/>
+          </a:stretch>
+        </p:blipFill>
+        <p:spPr>
+          <a:xfrm>
+            <a:off x="381000" y="2454275"/>
+            <a:ext cx="9067800" cy="3218068"/>
+          </a:xfrm>
+          <a:prstGeom prst="rect">
+            <a:avLst/>
+          </a:prstGeom>
+        </p:spPr>
+      </p:pic>
     </p:spTree>
     <p:extLst>
       <p:ext uri="{BB962C8B-B14F-4D97-AF65-F5344CB8AC3E}">
-        <p14:creationId xmlns:p14="http://schemas.microsoft.com/office/powerpoint/2010/main" val="1562609647"/>
+        <p14:creationId xmlns:p14="http://schemas.microsoft.com/office/powerpoint/2010/main" val="3255107559"/>
       </p:ext>
     </p:extLst>
   </p:cSld>
@@ -16344,6 +17532,350 @@
           <p:cNvPr id="2" name="Заголовок 1">
             <a:extLst>
               <a:ext uri="{FF2B5EF4-FFF2-40B4-BE49-F238E27FC236}">
+                <a16:creationId xmlns:a16="http://schemas.microsoft.com/office/drawing/2014/main" id="{8C543F67-9C70-4748-8C0C-3A7863422F99}"/>
+              </a:ext>
+            </a:extLst>
+          </p:cNvPr>
+          <p:cNvSpPr>
+            <a:spLocks noGrp="1"/>
+          </p:cNvSpPr>
+          <p:nvPr>
+            <p:ph type="title"/>
+          </p:nvPr>
+        </p:nvSpPr>
+        <p:spPr>
+          <a:xfrm>
+            <a:off x="1167492" y="381000"/>
+            <a:ext cx="9779183" cy="1325563"/>
+          </a:xfrm>
+        </p:spPr>
+        <p:txBody>
+          <a:bodyPr rtlCol="0"/>
+          <a:lstStyle/>
+          <a:p>
+            <a:pPr rtl="0"/>
+            <a:r>
+              <a:rPr lang="uk-UA" dirty="0">
+                <a:latin typeface="Fira Code" pitchFamily="1" charset="0"/>
+                <a:ea typeface="Fira Code" pitchFamily="1" charset="0"/>
+                <a:cs typeface="Fira Code" pitchFamily="1" charset="0"/>
+              </a:rPr>
+              <a:t>Інтероперабельність</a:t>
+            </a:r>
+          </a:p>
+        </p:txBody>
+      </p:sp>
+      <p:sp>
+        <p:nvSpPr>
+          <p:cNvPr id="4" name="Місце для дати 3">
+            <a:extLst>
+              <a:ext uri="{FF2B5EF4-FFF2-40B4-BE49-F238E27FC236}">
+                <a16:creationId xmlns:a16="http://schemas.microsoft.com/office/drawing/2014/main" id="{DB056174-CBC5-7B48-9681-7DDAC423337E}"/>
+              </a:ext>
+            </a:extLst>
+          </p:cNvPr>
+          <p:cNvSpPr>
+            <a:spLocks noGrp="1"/>
+          </p:cNvSpPr>
+          <p:nvPr>
+            <p:ph type="dt" sz="half" idx="10"/>
+          </p:nvPr>
+        </p:nvSpPr>
+        <p:spPr>
+          <a:xfrm>
+            <a:off x="381000" y="6356350"/>
+            <a:ext cx="2743200" cy="365125"/>
+          </a:xfrm>
+        </p:spPr>
+        <p:txBody>
+          <a:bodyPr rtlCol="0"/>
+          <a:lstStyle/>
+          <a:p>
+            <a:pPr rtl="0"/>
+            <a:fld id="{2B3FECCB-B4D4-4C4B-87FB-97861EE1F201}" type="datetime1">
+              <a:rPr lang="uk-UA" smtClean="0"/>
+              <a:t>20.04.2023</a:t>
+            </a:fld>
+            <a:endParaRPr lang="uk-UA" dirty="0"/>
+          </a:p>
+        </p:txBody>
+      </p:sp>
+      <p:sp>
+        <p:nvSpPr>
+          <p:cNvPr id="6" name="Місце для номера слайда 5">
+            <a:extLst>
+              <a:ext uri="{FF2B5EF4-FFF2-40B4-BE49-F238E27FC236}">
+                <a16:creationId xmlns:a16="http://schemas.microsoft.com/office/drawing/2014/main" id="{134C72D2-EFDF-844A-8472-CB49A59B127B}"/>
+              </a:ext>
+            </a:extLst>
+          </p:cNvPr>
+          <p:cNvSpPr>
+            <a:spLocks noGrp="1"/>
+          </p:cNvSpPr>
+          <p:nvPr>
+            <p:ph type="sldNum" sz="quarter" idx="12"/>
+          </p:nvPr>
+        </p:nvSpPr>
+        <p:spPr>
+          <a:xfrm>
+            <a:off x="10206318" y="6356350"/>
+            <a:ext cx="1604682" cy="365125"/>
+          </a:xfrm>
+        </p:spPr>
+        <p:txBody>
+          <a:bodyPr rtlCol="0"/>
+          <a:lstStyle/>
+          <a:p>
+            <a:pPr rtl="0"/>
+            <a:fld id="{294A09A9-5501-47C1-A89A-A340965A2BE2}" type="slidenum">
+              <a:rPr lang="uk-UA" smtClean="0"/>
+              <a:pPr rtl="0"/>
+              <a:t>12</a:t>
+            </a:fld>
+            <a:endParaRPr lang="uk-UA"/>
+          </a:p>
+        </p:txBody>
+      </p:sp>
+      <p:pic>
+        <p:nvPicPr>
+          <p:cNvPr id="7" name="Рисунок 6">
+            <a:extLst>
+              <a:ext uri="{FF2B5EF4-FFF2-40B4-BE49-F238E27FC236}">
+                <a16:creationId xmlns:a16="http://schemas.microsoft.com/office/drawing/2014/main" id="{DFC17976-732B-40C7-9BD3-537143B97854}"/>
+              </a:ext>
+            </a:extLst>
+          </p:cNvPr>
+          <p:cNvPicPr>
+            <a:picLocks noChangeAspect="1"/>
+          </p:cNvPicPr>
+          <p:nvPr/>
+        </p:nvPicPr>
+        <p:blipFill>
+          <a:blip r:embed="rId3"/>
+          <a:stretch>
+            <a:fillRect/>
+          </a:stretch>
+        </p:blipFill>
+        <p:spPr>
+          <a:xfrm>
+            <a:off x="2800350" y="2607345"/>
+            <a:ext cx="4448175" cy="3869655"/>
+          </a:xfrm>
+          <a:prstGeom prst="rect">
+            <a:avLst/>
+          </a:prstGeom>
+        </p:spPr>
+      </p:pic>
+    </p:spTree>
+    <p:extLst>
+      <p:ext uri="{BB962C8B-B14F-4D97-AF65-F5344CB8AC3E}">
+        <p14:creationId xmlns:p14="http://schemas.microsoft.com/office/powerpoint/2010/main" val="2003888012"/>
+      </p:ext>
+    </p:extLst>
+  </p:cSld>
+  <p:clrMapOvr>
+    <a:masterClrMapping/>
+  </p:clrMapOvr>
+  <p:transition>
+    <p:push dir="u"/>
+  </p:transition>
+</p:sld>
+</file>
+
+<file path=ppt/slides/slide13.xml><?xml version="1.0" encoding="utf-8"?>
+<p:sld xmlns:a="http://schemas.openxmlformats.org/drawingml/2006/main" xmlns:r="http://schemas.openxmlformats.org/officeDocument/2006/relationships" xmlns:p="http://schemas.openxmlformats.org/presentationml/2006/main">
+  <p:cSld>
+    <p:spTree>
+      <p:nvGrpSpPr>
+        <p:cNvPr id="1" name=""/>
+        <p:cNvGrpSpPr/>
+        <p:nvPr/>
+      </p:nvGrpSpPr>
+      <p:grpSpPr>
+        <a:xfrm>
+          <a:off x="0" y="0"/>
+          <a:ext cx="0" cy="0"/>
+          <a:chOff x="0" y="0"/>
+          <a:chExt cx="0" cy="0"/>
+        </a:xfrm>
+      </p:grpSpPr>
+      <p:sp>
+        <p:nvSpPr>
+          <p:cNvPr id="2" name="Заголовок 1">
+            <a:extLst>
+              <a:ext uri="{FF2B5EF4-FFF2-40B4-BE49-F238E27FC236}">
+                <a16:creationId xmlns:a16="http://schemas.microsoft.com/office/drawing/2014/main" id="{8C543F67-9C70-4748-8C0C-3A7863422F99}"/>
+              </a:ext>
+            </a:extLst>
+          </p:cNvPr>
+          <p:cNvSpPr>
+            <a:spLocks noGrp="1"/>
+          </p:cNvSpPr>
+          <p:nvPr>
+            <p:ph type="title"/>
+          </p:nvPr>
+        </p:nvSpPr>
+        <p:spPr>
+          <a:xfrm>
+            <a:off x="1167492" y="381000"/>
+            <a:ext cx="9779183" cy="1325563"/>
+          </a:xfrm>
+        </p:spPr>
+        <p:txBody>
+          <a:bodyPr rtlCol="0"/>
+          <a:lstStyle/>
+          <a:p>
+            <a:pPr rtl="0"/>
+            <a:r>
+              <a:rPr lang="uk-UA" dirty="0">
+                <a:latin typeface="Fira Code" pitchFamily="1" charset="0"/>
+                <a:ea typeface="Fira Code" pitchFamily="1" charset="0"/>
+                <a:cs typeface="Fira Code" pitchFamily="1" charset="0"/>
+              </a:rPr>
+              <a:t>Ігровий майданчик</a:t>
+            </a:r>
+          </a:p>
+        </p:txBody>
+      </p:sp>
+      <p:sp>
+        <p:nvSpPr>
+          <p:cNvPr id="4" name="Місце для дати 3">
+            <a:extLst>
+              <a:ext uri="{FF2B5EF4-FFF2-40B4-BE49-F238E27FC236}">
+                <a16:creationId xmlns:a16="http://schemas.microsoft.com/office/drawing/2014/main" id="{DB056174-CBC5-7B48-9681-7DDAC423337E}"/>
+              </a:ext>
+            </a:extLst>
+          </p:cNvPr>
+          <p:cNvSpPr>
+            <a:spLocks noGrp="1"/>
+          </p:cNvSpPr>
+          <p:nvPr>
+            <p:ph type="dt" sz="half" idx="10"/>
+          </p:nvPr>
+        </p:nvSpPr>
+        <p:spPr>
+          <a:xfrm>
+            <a:off x="381000" y="6356350"/>
+            <a:ext cx="2743200" cy="365125"/>
+          </a:xfrm>
+        </p:spPr>
+        <p:txBody>
+          <a:bodyPr rtlCol="0"/>
+          <a:lstStyle/>
+          <a:p>
+            <a:pPr rtl="0"/>
+            <a:fld id="{2B3FECCB-B4D4-4C4B-87FB-97861EE1F201}" type="datetime1">
+              <a:rPr lang="uk-UA" smtClean="0"/>
+              <a:t>20.04.2023</a:t>
+            </a:fld>
+            <a:endParaRPr lang="uk-UA" dirty="0"/>
+          </a:p>
+        </p:txBody>
+      </p:sp>
+      <p:sp>
+        <p:nvSpPr>
+          <p:cNvPr id="6" name="Місце для номера слайда 5">
+            <a:extLst>
+              <a:ext uri="{FF2B5EF4-FFF2-40B4-BE49-F238E27FC236}">
+                <a16:creationId xmlns:a16="http://schemas.microsoft.com/office/drawing/2014/main" id="{134C72D2-EFDF-844A-8472-CB49A59B127B}"/>
+              </a:ext>
+            </a:extLst>
+          </p:cNvPr>
+          <p:cNvSpPr>
+            <a:spLocks noGrp="1"/>
+          </p:cNvSpPr>
+          <p:nvPr>
+            <p:ph type="sldNum" sz="quarter" idx="12"/>
+          </p:nvPr>
+        </p:nvSpPr>
+        <p:spPr>
+          <a:xfrm>
+            <a:off x="10206318" y="6356350"/>
+            <a:ext cx="1604682" cy="365125"/>
+          </a:xfrm>
+        </p:spPr>
+        <p:txBody>
+          <a:bodyPr rtlCol="0"/>
+          <a:lstStyle/>
+          <a:p>
+            <a:pPr rtl="0"/>
+            <a:fld id="{294A09A9-5501-47C1-A89A-A340965A2BE2}" type="slidenum">
+              <a:rPr lang="uk-UA" smtClean="0"/>
+              <a:pPr rtl="0"/>
+              <a:t>13</a:t>
+            </a:fld>
+            <a:endParaRPr lang="uk-UA"/>
+          </a:p>
+        </p:txBody>
+      </p:sp>
+      <p:pic>
+        <p:nvPicPr>
+          <p:cNvPr id="5" name="Рисунок 4">
+            <a:extLst>
+              <a:ext uri="{FF2B5EF4-FFF2-40B4-BE49-F238E27FC236}">
+                <a16:creationId xmlns:a16="http://schemas.microsoft.com/office/drawing/2014/main" id="{D1EE4F74-CF98-45FC-A08F-AE882E2584DF}"/>
+              </a:ext>
+            </a:extLst>
+          </p:cNvPr>
+          <p:cNvPicPr>
+            <a:picLocks noChangeAspect="1"/>
+          </p:cNvPicPr>
+          <p:nvPr/>
+        </p:nvPicPr>
+        <p:blipFill>
+          <a:blip r:embed="rId3"/>
+          <a:stretch>
+            <a:fillRect/>
+          </a:stretch>
+        </p:blipFill>
+        <p:spPr>
+          <a:xfrm>
+            <a:off x="1147762" y="2507534"/>
+            <a:ext cx="7496175" cy="3770331"/>
+          </a:xfrm>
+          <a:prstGeom prst="rect">
+            <a:avLst/>
+          </a:prstGeom>
+        </p:spPr>
+      </p:pic>
+    </p:spTree>
+    <p:extLst>
+      <p:ext uri="{BB962C8B-B14F-4D97-AF65-F5344CB8AC3E}">
+        <p14:creationId xmlns:p14="http://schemas.microsoft.com/office/powerpoint/2010/main" val="3468594771"/>
+      </p:ext>
+    </p:extLst>
+  </p:cSld>
+  <p:clrMapOvr>
+    <a:masterClrMapping/>
+  </p:clrMapOvr>
+  <p:transition>
+    <p:push dir="u"/>
+  </p:transition>
+</p:sld>
+</file>
+
+<file path=ppt/slides/slide14.xml><?xml version="1.0" encoding="utf-8"?>
+<p:sld xmlns:a="http://schemas.openxmlformats.org/drawingml/2006/main" xmlns:r="http://schemas.openxmlformats.org/officeDocument/2006/relationships" xmlns:p="http://schemas.openxmlformats.org/presentationml/2006/main">
+  <p:cSld>
+    <p:spTree>
+      <p:nvGrpSpPr>
+        <p:cNvPr id="1" name=""/>
+        <p:cNvGrpSpPr/>
+        <p:nvPr/>
+      </p:nvGrpSpPr>
+      <p:grpSpPr>
+        <a:xfrm>
+          <a:off x="0" y="0"/>
+          <a:ext cx="0" cy="0"/>
+          <a:chOff x="0" y="0"/>
+          <a:chExt cx="0" cy="0"/>
+        </a:xfrm>
+      </p:grpSpPr>
+      <p:sp>
+        <p:nvSpPr>
+          <p:cNvPr id="2" name="Заголовок 1">
+            <a:extLst>
+              <a:ext uri="{FF2B5EF4-FFF2-40B4-BE49-F238E27FC236}">
                 <a16:creationId xmlns:a16="http://schemas.microsoft.com/office/drawing/2014/main" id="{8460295B-54B9-4937-90E3-BAB9CE69E30B}"/>
               </a:ext>
             </a:extLst>
@@ -16393,7 +17925,7 @@
 </p:sld>
 </file>
 
-<file path=ppt/slides/slide13.xml><?xml version="1.0" encoding="utf-8"?>
+<file path=ppt/slides/slide15.xml><?xml version="1.0" encoding="utf-8"?>
 <p:sld xmlns:a="http://schemas.openxmlformats.org/drawingml/2006/main" xmlns:r="http://schemas.openxmlformats.org/officeDocument/2006/relationships" xmlns:p="http://schemas.openxmlformats.org/presentationml/2006/main">
   <p:cSld>
     <p:spTree>
@@ -16555,7 +18087,13 @@
               <a:rPr lang="uk-UA" sz="2600" dirty="0">
                 <a:latin typeface="Calibri" panose="020F0502020204030204" pitchFamily="34" charset="0"/>
                 <a:cs typeface="Calibri" panose="020F0502020204030204" pitchFamily="34" charset="0"/>
-                <a:hlinkClick r:id="rId3" action="ppaction://hlinksldjump"/>
+                <a:hlinkClick r:id="rId3" action="ppaction://hlinksldjump">
+                  <a:extLst>
+                    <a:ext uri="{A12FA001-AC4F-418D-AE19-62706E023703}">
+                      <ahyp:hlinkClr xmlns:ahyp="http://schemas.microsoft.com/office/drawing/2018/hyperlinkcolor" val="tx"/>
+                    </a:ext>
+                  </a:extLst>
+                </a:hlinkClick>
               </a:rPr>
               <a:t>Вступ</a:t>
             </a:r>
@@ -16571,11 +18109,34 @@
             </a:pPr>
             <a:r>
               <a:rPr lang="uk-UA" sz="2600" dirty="0">
+                <a:solidFill>
+                  <a:srgbClr val="0563C1"/>
+                </a:solidFill>
                 <a:latin typeface="Calibri" panose="020F0502020204030204" pitchFamily="34" charset="0"/>
                 <a:cs typeface="Calibri" panose="020F0502020204030204" pitchFamily="34" charset="0"/>
-                <a:hlinkClick r:id="rId4" action="ppaction://hlinksldjump"/>
+                <a:hlinkClick r:id="rId4" action="ppaction://hlinksldjump">
+                  <a:extLst>
+                    <a:ext uri="{A12FA001-AC4F-418D-AE19-62706E023703}">
+                      <ahyp:hlinkClr xmlns:ahyp="http://schemas.microsoft.com/office/drawing/2018/hyperlinkcolor" val="tx"/>
+                    </a:ext>
+                  </a:extLst>
+                </a:hlinkClick>
               </a:rPr>
-              <a:t>Легкість у вивченні</a:t>
+              <a:t>Безпека та </a:t>
+            </a:r>
+            <a:r>
+              <a:rPr lang="uk-UA" sz="2600" dirty="0">
+                <a:latin typeface="Calibri" panose="020F0502020204030204" pitchFamily="34" charset="0"/>
+                <a:cs typeface="Calibri" panose="020F0502020204030204" pitchFamily="34" charset="0"/>
+                <a:hlinkClick r:id="rId4" action="ppaction://hlinksldjump">
+                  <a:extLst>
+                    <a:ext uri="{A12FA001-AC4F-418D-AE19-62706E023703}">
+                      <ahyp:hlinkClr xmlns:ahyp="http://schemas.microsoft.com/office/drawing/2018/hyperlinkcolor" val="tx"/>
+                    </a:ext>
+                  </a:extLst>
+                </a:hlinkClick>
+              </a:rPr>
+              <a:t>швидкість</a:t>
             </a:r>
             <a:endParaRPr lang="uk-UA" sz="2600" dirty="0">
               <a:latin typeface="Calibri" panose="020F0502020204030204" pitchFamily="34" charset="0"/>
@@ -16591,9 +18152,15 @@
               <a:rPr lang="uk-UA" sz="2600" dirty="0">
                 <a:latin typeface="Calibri" panose="020F0502020204030204" pitchFamily="34" charset="0"/>
                 <a:cs typeface="Calibri" panose="020F0502020204030204" pitchFamily="34" charset="0"/>
-                <a:hlinkClick r:id="rId5" action="ppaction://hlinksldjump"/>
+                <a:hlinkClick r:id="rId5" action="ppaction://hlinksldjump">
+                  <a:extLst>
+                    <a:ext uri="{A12FA001-AC4F-418D-AE19-62706E023703}">
+                      <ahyp:hlinkClr xmlns:ahyp="http://schemas.microsoft.com/office/drawing/2018/hyperlinkcolor" val="tx"/>
+                    </a:ext>
+                  </a:extLst>
+                </a:hlinkClick>
               </a:rPr>
-              <a:t>Інтерактивність</a:t>
+              <a:t>Легкість у вивченні</a:t>
             </a:r>
             <a:endParaRPr lang="uk-UA" sz="2600" dirty="0">
               <a:latin typeface="Calibri" panose="020F0502020204030204" pitchFamily="34" charset="0"/>
@@ -16609,9 +18176,15 @@
               <a:rPr lang="uk-UA" sz="2600" dirty="0">
                 <a:latin typeface="Calibri" panose="020F0502020204030204" pitchFamily="34" charset="0"/>
                 <a:cs typeface="Calibri" panose="020F0502020204030204" pitchFamily="34" charset="0"/>
-                <a:hlinkClick r:id="rId6" action="ppaction://hlinksldjump"/>
+                <a:hlinkClick r:id="rId6" action="ppaction://hlinksldjump">
+                  <a:extLst>
+                    <a:ext uri="{A12FA001-AC4F-418D-AE19-62706E023703}">
+                      <ahyp:hlinkClr xmlns:ahyp="http://schemas.microsoft.com/office/drawing/2018/hyperlinkcolor" val="tx"/>
+                    </a:ext>
+                  </a:extLst>
+                </a:hlinkClick>
               </a:rPr>
-              <a:t>Відкритий код</a:t>
+              <a:t>Об’єктно-орієнтованість</a:t>
             </a:r>
             <a:endParaRPr lang="uk-UA" sz="2600" dirty="0">
               <a:latin typeface="Calibri" panose="020F0502020204030204" pitchFamily="34" charset="0"/>
@@ -16627,9 +18200,15 @@
               <a:rPr lang="uk-UA" sz="2600" dirty="0">
                 <a:latin typeface="Calibri" panose="020F0502020204030204" pitchFamily="34" charset="0"/>
                 <a:cs typeface="Calibri" panose="020F0502020204030204" pitchFamily="34" charset="0"/>
-                <a:hlinkClick r:id="rId7" action="ppaction://hlinksldjump"/>
+                <a:hlinkClick r:id="rId7" action="ppaction://hlinksldjump">
+                  <a:extLst>
+                    <a:ext uri="{A12FA001-AC4F-418D-AE19-62706E023703}">
+                      <ahyp:hlinkClr xmlns:ahyp="http://schemas.microsoft.com/office/drawing/2018/hyperlinkcolor" val="tx"/>
+                    </a:ext>
+                  </a:extLst>
+                </a:hlinkClick>
               </a:rPr>
-              <a:t>Безпека та швидкість</a:t>
+              <a:t>Функціональне програмування</a:t>
             </a:r>
             <a:endParaRPr lang="uk-UA" sz="2600" dirty="0">
               <a:latin typeface="Calibri" panose="020F0502020204030204" pitchFamily="34" charset="0"/>
@@ -16645,9 +18224,15 @@
               <a:rPr lang="uk-UA" sz="2600" dirty="0">
                 <a:latin typeface="Calibri" panose="020F0502020204030204" pitchFamily="34" charset="0"/>
                 <a:cs typeface="Calibri" panose="020F0502020204030204" pitchFamily="34" charset="0"/>
-                <a:hlinkClick r:id="rId8" action="ppaction://hlinksldjump"/>
+                <a:hlinkClick r:id="rId8" action="ppaction://hlinksldjump">
+                  <a:extLst>
+                    <a:ext uri="{A12FA001-AC4F-418D-AE19-62706E023703}">
+                      <ahyp:hlinkClr xmlns:ahyp="http://schemas.microsoft.com/office/drawing/2018/hyperlinkcolor" val="tx"/>
+                    </a:ext>
+                  </a:extLst>
+                </a:hlinkClick>
               </a:rPr>
-              <a:t>Багатозадачність</a:t>
+              <a:t>Опціонали</a:t>
             </a:r>
             <a:endParaRPr lang="uk-UA" sz="2600" dirty="0">
               <a:latin typeface="Calibri" panose="020F0502020204030204" pitchFamily="34" charset="0"/>
@@ -16663,9 +18248,15 @@
               <a:rPr lang="uk-UA" sz="2600" dirty="0">
                 <a:latin typeface="Calibri" panose="020F0502020204030204" pitchFamily="34" charset="0"/>
                 <a:cs typeface="Calibri" panose="020F0502020204030204" pitchFamily="34" charset="0"/>
-                <a:hlinkClick r:id="rId9" action="ppaction://hlinksldjump"/>
+                <a:hlinkClick r:id="rId9" action="ppaction://hlinksldjump">
+                  <a:extLst>
+                    <a:ext uri="{A12FA001-AC4F-418D-AE19-62706E023703}">
+                      <ahyp:hlinkClr xmlns:ahyp="http://schemas.microsoft.com/office/drawing/2018/hyperlinkcolor" val="tx"/>
+                    </a:ext>
+                  </a:extLst>
+                </a:hlinkClick>
               </a:rPr>
-              <a:t>Інтероперабельність</a:t>
+              <a:t>Приведення типів</a:t>
             </a:r>
             <a:endParaRPr lang="uk-UA" sz="2600" dirty="0">
               <a:latin typeface="Calibri" panose="020F0502020204030204" pitchFamily="34" charset="0"/>
@@ -16681,9 +18272,15 @@
               <a:rPr lang="uk-UA" sz="2600" dirty="0">
                 <a:latin typeface="Calibri" panose="020F0502020204030204" pitchFamily="34" charset="0"/>
                 <a:cs typeface="Calibri" panose="020F0502020204030204" pitchFamily="34" charset="0"/>
-                <a:hlinkClick r:id="rId10" action="ppaction://hlinksldjump"/>
+                <a:hlinkClick r:id="rId10" action="ppaction://hlinksldjump">
+                  <a:extLst>
+                    <a:ext uri="{A12FA001-AC4F-418D-AE19-62706E023703}">
+                      <ahyp:hlinkClr xmlns:ahyp="http://schemas.microsoft.com/office/drawing/2018/hyperlinkcolor" val="tx"/>
+                    </a:ext>
+                  </a:extLst>
+                </a:hlinkClick>
               </a:rPr>
-              <a:t>Управління пам’яттю</a:t>
+              <a:t>Узагальнення</a:t>
             </a:r>
             <a:endParaRPr lang="uk-UA" sz="2600" dirty="0">
               <a:latin typeface="Calibri" panose="020F0502020204030204" pitchFamily="34" charset="0"/>
@@ -16699,9 +18296,15 @@
               <a:rPr lang="uk-UA" sz="2600" dirty="0">
                 <a:latin typeface="Calibri" panose="020F0502020204030204" pitchFamily="34" charset="0"/>
                 <a:cs typeface="Calibri" panose="020F0502020204030204" pitchFamily="34" charset="0"/>
-                <a:hlinkClick r:id="rId11" action="ppaction://hlinksldjump"/>
+                <a:hlinkClick r:id="rId11" action="ppaction://hlinksldjump">
+                  <a:extLst>
+                    <a:ext uri="{A12FA001-AC4F-418D-AE19-62706E023703}">
+                      <ahyp:hlinkClr xmlns:ahyp="http://schemas.microsoft.com/office/drawing/2018/hyperlinkcolor" val="tx"/>
+                    </a:ext>
+                  </a:extLst>
+                </a:hlinkClick>
               </a:rPr>
-              <a:t>Функціональне програмування</a:t>
+              <a:t>Закриття</a:t>
             </a:r>
             <a:endParaRPr lang="uk-UA" sz="2600" dirty="0">
               <a:latin typeface="Calibri" panose="020F0502020204030204" pitchFamily="34" charset="0"/>
@@ -16717,7 +18320,61 @@
               <a:rPr lang="uk-UA" sz="2600" dirty="0">
                 <a:latin typeface="Calibri" panose="020F0502020204030204" pitchFamily="34" charset="0"/>
                 <a:cs typeface="Calibri" panose="020F0502020204030204" pitchFamily="34" charset="0"/>
-                <a:hlinkClick r:id="rId12" action="ppaction://hlinksldjump"/>
+                <a:hlinkClick r:id="rId12" action="ppaction://hlinksldjump">
+                  <a:extLst>
+                    <a:ext uri="{A12FA001-AC4F-418D-AE19-62706E023703}">
+                      <ahyp:hlinkClr xmlns:ahyp="http://schemas.microsoft.com/office/drawing/2018/hyperlinkcolor" val="tx"/>
+                    </a:ext>
+                  </a:extLst>
+                </a:hlinkClick>
+              </a:rPr>
+              <a:t>Інтероперабельність</a:t>
+            </a:r>
+            <a:endParaRPr lang="uk-UA" sz="2600" dirty="0">
+              <a:latin typeface="Calibri" panose="020F0502020204030204" pitchFamily="34" charset="0"/>
+              <a:cs typeface="Calibri" panose="020F0502020204030204" pitchFamily="34" charset="0"/>
+            </a:endParaRPr>
+          </a:p>
+          <a:p>
+            <a:pPr marL="571500" indent="-571500" rtl="0">
+              <a:buFont typeface="+mj-lt"/>
+              <a:buAutoNum type="romanUcPeriod"/>
+            </a:pPr>
+            <a:r>
+              <a:rPr lang="uk-UA" sz="2600" dirty="0">
+                <a:latin typeface="Calibri" panose="020F0502020204030204" pitchFamily="34" charset="0"/>
+                <a:cs typeface="Calibri" panose="020F0502020204030204" pitchFamily="34" charset="0"/>
+                <a:hlinkClick r:id="rId13" action="ppaction://hlinksldjump">
+                  <a:extLst>
+                    <a:ext uri="{A12FA001-AC4F-418D-AE19-62706E023703}">
+                      <ahyp:hlinkClr xmlns:ahyp="http://schemas.microsoft.com/office/drawing/2018/hyperlinkcolor" val="tx"/>
+                    </a:ext>
+                  </a:extLst>
+                </a:hlinkClick>
+              </a:rPr>
+              <a:t>Ігровий майданчик</a:t>
+            </a:r>
+            <a:endParaRPr lang="uk-UA" sz="2600" dirty="0">
+              <a:latin typeface="Calibri" panose="020F0502020204030204" pitchFamily="34" charset="0"/>
+              <a:cs typeface="Calibri" panose="020F0502020204030204" pitchFamily="34" charset="0"/>
+            </a:endParaRPr>
+          </a:p>
+          <a:p>
+            <a:pPr marL="571500" indent="-571500" rtl="0">
+              <a:buFont typeface="+mj-lt"/>
+              <a:buAutoNum type="romanUcPeriod"/>
+            </a:pPr>
+            <a:r>
+              <a:rPr lang="uk-UA" sz="2600" dirty="0">
+                <a:latin typeface="Calibri" panose="020F0502020204030204" pitchFamily="34" charset="0"/>
+                <a:cs typeface="Calibri" panose="020F0502020204030204" pitchFamily="34" charset="0"/>
+                <a:hlinkClick r:id="rId14" action="ppaction://hlinksldjump">
+                  <a:extLst>
+                    <a:ext uri="{A12FA001-AC4F-418D-AE19-62706E023703}">
+                      <ahyp:hlinkClr xmlns:ahyp="http://schemas.microsoft.com/office/drawing/2018/hyperlinkcolor" val="tx"/>
+                    </a:ext>
+                  </a:extLst>
+                </a:hlinkClick>
               </a:rPr>
               <a:t>Висновки</a:t>
             </a:r>
@@ -16872,134 +18529,6 @@
       </p:sp>
       <p:sp>
         <p:nvSpPr>
-          <p:cNvPr id="3" name="Місце для вмісту 2">
-            <a:extLst>
-              <a:ext uri="{FF2B5EF4-FFF2-40B4-BE49-F238E27FC236}">
-                <a16:creationId xmlns:a16="http://schemas.microsoft.com/office/drawing/2014/main" id="{95B371F2-DBA5-415A-82C8-651F587B857A}"/>
-              </a:ext>
-            </a:extLst>
-          </p:cNvPr>
-          <p:cNvSpPr>
-            <a:spLocks noGrp="1"/>
-          </p:cNvSpPr>
-          <p:nvPr>
-            <p:ph type="body" idx="1"/>
-          </p:nvPr>
-        </p:nvSpPr>
-        <p:spPr>
-          <a:xfrm>
-            <a:off x="1167492" y="2653167"/>
-            <a:ext cx="9779183" cy="3436483"/>
-          </a:xfrm>
-        </p:spPr>
-        <p:txBody>
-          <a:bodyPr vert="horz" lIns="91440" tIns="45720" rIns="91440" bIns="45720" rtlCol="0" anchor="t">
-            <a:normAutofit/>
-          </a:bodyPr>
-          <a:lstStyle/>
-          <a:p>
-            <a:pPr marL="342900" indent="-342900" rtl="0">
-              <a:spcBef>
-                <a:spcPts val="0"/>
-              </a:spcBef>
-              <a:buFont typeface="Arial" panose="020B0604020202020204" pitchFamily="34" charset="0"/>
-              <a:buChar char="•"/>
-            </a:pPr>
-            <a:r>
-              <a:rPr lang="uk-UA" sz="2600" dirty="0">
-                <a:latin typeface="Calibri" panose="020F0502020204030204" pitchFamily="34" charset="0"/>
-                <a:cs typeface="Calibri" panose="020F0502020204030204" pitchFamily="34" charset="0"/>
-              </a:rPr>
-              <a:t>Від </a:t>
-            </a:r>
-            <a:r>
-              <a:rPr lang="en-US" sz="2600" dirty="0">
-                <a:latin typeface="Calibri" panose="020F0502020204030204" pitchFamily="34" charset="0"/>
-                <a:cs typeface="Calibri" panose="020F0502020204030204" pitchFamily="34" charset="0"/>
-              </a:rPr>
-              <a:t>Apple </a:t>
-            </a:r>
-            <a:r>
-              <a:rPr lang="uk-UA" sz="2600" dirty="0">
-                <a:latin typeface="Calibri" panose="020F0502020204030204" pitchFamily="34" charset="0"/>
-                <a:cs typeface="Calibri" panose="020F0502020204030204" pitchFamily="34" charset="0"/>
-              </a:rPr>
-              <a:t>для </a:t>
-            </a:r>
-            <a:r>
-              <a:rPr lang="en-US" sz="2600" dirty="0">
-                <a:latin typeface="Calibri" panose="020F0502020204030204" pitchFamily="34" charset="0"/>
-                <a:cs typeface="Calibri" panose="020F0502020204030204" pitchFamily="34" charset="0"/>
-              </a:rPr>
-              <a:t>Apple, </a:t>
-            </a:r>
-            <a:r>
-              <a:rPr lang="uk-UA" sz="2600" dirty="0">
-                <a:latin typeface="Calibri" panose="020F0502020204030204" pitchFamily="34" charset="0"/>
-                <a:cs typeface="Calibri" panose="020F0502020204030204" pitchFamily="34" charset="0"/>
-              </a:rPr>
-              <a:t>але не тільки</a:t>
-            </a:r>
-          </a:p>
-          <a:p>
-            <a:pPr marL="342900" indent="-342900" rtl="0">
-              <a:spcBef>
-                <a:spcPts val="0"/>
-              </a:spcBef>
-              <a:buFont typeface="Arial" panose="020B0604020202020204" pitchFamily="34" charset="0"/>
-              <a:buChar char="•"/>
-            </a:pPr>
-            <a:r>
-              <a:rPr lang="uk-UA" sz="2600" dirty="0">
-                <a:latin typeface="Calibri" panose="020F0502020204030204" pitchFamily="34" charset="0"/>
-                <a:cs typeface="Calibri" panose="020F0502020204030204" pitchFamily="34" charset="0"/>
-              </a:rPr>
-              <a:t>Представлена у 2014 як заміна </a:t>
-            </a:r>
-            <a:r>
-              <a:rPr lang="en-US" sz="2600" dirty="0">
-                <a:latin typeface="Calibri" panose="020F0502020204030204" pitchFamily="34" charset="0"/>
-                <a:cs typeface="Calibri" panose="020F0502020204030204" pitchFamily="34" charset="0"/>
-              </a:rPr>
-              <a:t>Objective-C</a:t>
-            </a:r>
-          </a:p>
-          <a:p>
-            <a:pPr marL="342900" indent="-342900" rtl="0">
-              <a:spcBef>
-                <a:spcPts val="0"/>
-              </a:spcBef>
-              <a:buFont typeface="Arial" panose="020B0604020202020204" pitchFamily="34" charset="0"/>
-              <a:buChar char="•"/>
-            </a:pPr>
-            <a:r>
-              <a:rPr lang="uk-UA" sz="2600" dirty="0">
-                <a:latin typeface="Calibri" panose="020F0502020204030204" pitchFamily="34" charset="0"/>
-                <a:cs typeface="Calibri" panose="020F0502020204030204" pitchFamily="34" charset="0"/>
-              </a:rPr>
-              <a:t>Потужна та легка</a:t>
-            </a:r>
-          </a:p>
-          <a:p>
-            <a:pPr marL="342900" indent="-342900" rtl="0">
-              <a:spcBef>
-                <a:spcPts val="0"/>
-              </a:spcBef>
-              <a:buFont typeface="Arial" panose="020B0604020202020204" pitchFamily="34" charset="0"/>
-              <a:buChar char="•"/>
-            </a:pPr>
-            <a:r>
-              <a:rPr lang="uk-UA" sz="2600" dirty="0">
-                <a:latin typeface="Calibri" panose="020F0502020204030204" pitchFamily="34" charset="0"/>
-                <a:cs typeface="Calibri" panose="020F0502020204030204" pitchFamily="34" charset="0"/>
-              </a:rPr>
-              <a:t>Популярна серед розробників</a:t>
-            </a:r>
-          </a:p>
-        </p:txBody>
-      </p:sp>
-      <p:sp>
-        <p:nvSpPr>
           <p:cNvPr id="4" name="Місце для дати 3">
             <a:extLst>
               <a:ext uri="{FF2B5EF4-FFF2-40B4-BE49-F238E27FC236}">
@@ -17069,6 +18598,373 @@
           </a:p>
         </p:txBody>
       </p:sp>
+      <p:pic>
+        <p:nvPicPr>
+          <p:cNvPr id="1026" name="Picture 2" descr="Apple Logo and symbol, meaning, history, PNG, brand">
+            <a:extLst>
+              <a:ext uri="{FF2B5EF4-FFF2-40B4-BE49-F238E27FC236}">
+                <a16:creationId xmlns:a16="http://schemas.microsoft.com/office/drawing/2014/main" id="{EADD5E06-1F45-4690-AB71-AAABD1CED94B}"/>
+              </a:ext>
+            </a:extLst>
+          </p:cNvPr>
+          <p:cNvPicPr>
+            <a:picLocks noChangeAspect="1" noChangeArrowheads="1"/>
+          </p:cNvPicPr>
+          <p:nvPr/>
+        </p:nvPicPr>
+        <p:blipFill>
+          <a:blip r:embed="rId3">
+            <a:extLst>
+              <a:ext uri="{28A0092B-C50C-407E-A947-70E740481C1C}">
+                <a14:useLocalDpi xmlns:a14="http://schemas.microsoft.com/office/drawing/2010/main" val="0"/>
+              </a:ext>
+            </a:extLst>
+          </a:blip>
+          <a:srcRect/>
+          <a:stretch>
+            <a:fillRect/>
+          </a:stretch>
+        </p:blipFill>
+        <p:spPr bwMode="auto">
+          <a:xfrm>
+            <a:off x="-658553" y="2553552"/>
+            <a:ext cx="4280747" cy="2407920"/>
+          </a:xfrm>
+          <a:prstGeom prst="rect">
+            <a:avLst/>
+          </a:prstGeom>
+          <a:noFill/>
+          <a:extLst>
+            <a:ext uri="{909E8E84-426E-40DD-AFC4-6F175D3DCCD1}">
+              <a14:hiddenFill xmlns:a14="http://schemas.microsoft.com/office/drawing/2010/main">
+                <a:solidFill>
+                  <a:srgbClr val="FFFFFF"/>
+                </a:solidFill>
+              </a14:hiddenFill>
+            </a:ext>
+          </a:extLst>
+        </p:spPr>
+      </p:pic>
+      <p:pic>
+        <p:nvPicPr>
+          <p:cNvPr id="1028" name="Picture 4" descr="Swift, logo, social, social media icon - Free download">
+            <a:extLst>
+              <a:ext uri="{FF2B5EF4-FFF2-40B4-BE49-F238E27FC236}">
+                <a16:creationId xmlns:a16="http://schemas.microsoft.com/office/drawing/2014/main" id="{55FF1CFC-B627-4C35-951A-286E0476F245}"/>
+              </a:ext>
+            </a:extLst>
+          </p:cNvPr>
+          <p:cNvPicPr>
+            <a:picLocks noChangeAspect="1" noChangeArrowheads="1"/>
+          </p:cNvPicPr>
+          <p:nvPr/>
+        </p:nvPicPr>
+        <p:blipFill>
+          <a:blip r:embed="rId4">
+            <a:extLst>
+              <a:ext uri="{28A0092B-C50C-407E-A947-70E740481C1C}">
+                <a14:useLocalDpi xmlns:a14="http://schemas.microsoft.com/office/drawing/2010/main" val="0"/>
+              </a:ext>
+            </a:extLst>
+          </a:blip>
+          <a:srcRect/>
+          <a:stretch>
+            <a:fillRect/>
+          </a:stretch>
+        </p:blipFill>
+        <p:spPr bwMode="auto">
+          <a:xfrm>
+            <a:off x="7415560" y="2239854"/>
+            <a:ext cx="2849880" cy="2849880"/>
+          </a:xfrm>
+          <a:prstGeom prst="rect">
+            <a:avLst/>
+          </a:prstGeom>
+          <a:noFill/>
+          <a:extLst>
+            <a:ext uri="{909E8E84-426E-40DD-AFC4-6F175D3DCCD1}">
+              <a14:hiddenFill xmlns:a14="http://schemas.microsoft.com/office/drawing/2010/main">
+                <a:solidFill>
+                  <a:srgbClr val="FFFFFF"/>
+                </a:solidFill>
+              </a14:hiddenFill>
+            </a:ext>
+          </a:extLst>
+        </p:spPr>
+      </p:pic>
+      <p:cxnSp>
+        <p:nvCxnSpPr>
+          <p:cNvPr id="9" name="Пряма зі стрілкою 8">
+            <a:extLst>
+              <a:ext uri="{FF2B5EF4-FFF2-40B4-BE49-F238E27FC236}">
+                <a16:creationId xmlns:a16="http://schemas.microsoft.com/office/drawing/2014/main" id="{520E94B3-6033-4693-9329-98E53F88ADB4}"/>
+              </a:ext>
+            </a:extLst>
+          </p:cNvPr>
+          <p:cNvCxnSpPr>
+            <a:cxnSpLocks/>
+          </p:cNvCxnSpPr>
+          <p:nvPr/>
+        </p:nvCxnSpPr>
+        <p:spPr>
+          <a:xfrm flipV="1">
+            <a:off x="2838450" y="3940938"/>
+            <a:ext cx="4257675" cy="49026"/>
+          </a:xfrm>
+          <a:prstGeom prst="straightConnector1">
+            <a:avLst/>
+          </a:prstGeom>
+          <a:ln>
+            <a:tailEnd type="triangle"/>
+          </a:ln>
+        </p:spPr>
+        <p:style>
+          <a:lnRef idx="3">
+            <a:schemeClr val="accent2"/>
+          </a:lnRef>
+          <a:fillRef idx="0">
+            <a:schemeClr val="accent2"/>
+          </a:fillRef>
+          <a:effectRef idx="2">
+            <a:schemeClr val="accent2"/>
+          </a:effectRef>
+          <a:fontRef idx="minor">
+            <a:schemeClr val="tx1"/>
+          </a:fontRef>
+        </p:style>
+      </p:cxnSp>
+      <p:sp>
+        <p:nvSpPr>
+          <p:cNvPr id="14" name="TextBox 13">
+            <a:extLst>
+              <a:ext uri="{FF2B5EF4-FFF2-40B4-BE49-F238E27FC236}">
+                <a16:creationId xmlns:a16="http://schemas.microsoft.com/office/drawing/2014/main" id="{0C53D897-67B6-459E-9F21-4404C039E97D}"/>
+              </a:ext>
+            </a:extLst>
+          </p:cNvPr>
+          <p:cNvSpPr txBox="1"/>
+          <p:nvPr/>
+        </p:nvSpPr>
+        <p:spPr>
+          <a:xfrm>
+            <a:off x="4312515" y="3433961"/>
+            <a:ext cx="927851" cy="461665"/>
+          </a:xfrm>
+          <a:prstGeom prst="rect">
+            <a:avLst/>
+          </a:prstGeom>
+          <a:noFill/>
+        </p:spPr>
+        <p:txBody>
+          <a:bodyPr wrap="square" rtlCol="0">
+            <a:spAutoFit/>
+          </a:bodyPr>
+          <a:lstStyle/>
+          <a:p>
+            <a:r>
+              <a:rPr lang="en-US" sz="2400" dirty="0">
+                <a:solidFill>
+                  <a:schemeClr val="bg1"/>
+                </a:solidFill>
+              </a:rPr>
+              <a:t>2014</a:t>
+            </a:r>
+            <a:endParaRPr lang="uk-UA" sz="2400" dirty="0">
+              <a:solidFill>
+                <a:schemeClr val="bg1"/>
+              </a:solidFill>
+            </a:endParaRPr>
+          </a:p>
+        </p:txBody>
+      </p:sp>
+      <p:pic>
+        <p:nvPicPr>
+          <p:cNvPr id="1030" name="Picture 6">
+            <a:extLst>
+              <a:ext uri="{FF2B5EF4-FFF2-40B4-BE49-F238E27FC236}">
+                <a16:creationId xmlns:a16="http://schemas.microsoft.com/office/drawing/2014/main" id="{1B5A27B7-5236-4037-8E7F-940C9C2E4CE4}"/>
+              </a:ext>
+            </a:extLst>
+          </p:cNvPr>
+          <p:cNvPicPr>
+            <a:picLocks noChangeAspect="1" noChangeArrowheads="1"/>
+          </p:cNvPicPr>
+          <p:nvPr/>
+        </p:nvPicPr>
+        <p:blipFill>
+          <a:blip r:embed="rId5">
+            <a:extLst>
+              <a:ext uri="{28A0092B-C50C-407E-A947-70E740481C1C}">
+                <a14:useLocalDpi xmlns:a14="http://schemas.microsoft.com/office/drawing/2010/main" val="0"/>
+              </a:ext>
+            </a:extLst>
+          </a:blip>
+          <a:srcRect/>
+          <a:stretch>
+            <a:fillRect/>
+          </a:stretch>
+        </p:blipFill>
+        <p:spPr bwMode="auto">
+          <a:xfrm>
+            <a:off x="1928541" y="5252908"/>
+            <a:ext cx="1325564" cy="1325564"/>
+          </a:xfrm>
+          <a:prstGeom prst="rect">
+            <a:avLst/>
+          </a:prstGeom>
+          <a:noFill/>
+          <a:extLst>
+            <a:ext uri="{909E8E84-426E-40DD-AFC4-6F175D3DCCD1}">
+              <a14:hiddenFill xmlns:a14="http://schemas.microsoft.com/office/drawing/2010/main">
+                <a:solidFill>
+                  <a:srgbClr val="FFFFFF"/>
+                </a:solidFill>
+              </a14:hiddenFill>
+            </a:ext>
+          </a:extLst>
+        </p:spPr>
+      </p:pic>
+      <p:pic>
+        <p:nvPicPr>
+          <p:cNvPr id="1032" name="Picture 8">
+            <a:extLst>
+              <a:ext uri="{FF2B5EF4-FFF2-40B4-BE49-F238E27FC236}">
+                <a16:creationId xmlns:a16="http://schemas.microsoft.com/office/drawing/2014/main" id="{F3DE7EB1-69CB-452F-85E0-883FCB26488A}"/>
+              </a:ext>
+            </a:extLst>
+          </p:cNvPr>
+          <p:cNvPicPr>
+            <a:picLocks noChangeAspect="1" noChangeArrowheads="1"/>
+          </p:cNvPicPr>
+          <p:nvPr/>
+        </p:nvPicPr>
+        <p:blipFill>
+          <a:blip r:embed="rId6">
+            <a:extLst>
+              <a:ext uri="{28A0092B-C50C-407E-A947-70E740481C1C}">
+                <a14:useLocalDpi xmlns:a14="http://schemas.microsoft.com/office/drawing/2010/main" val="0"/>
+              </a:ext>
+            </a:extLst>
+          </a:blip>
+          <a:srcRect/>
+          <a:stretch>
+            <a:fillRect/>
+          </a:stretch>
+        </p:blipFill>
+        <p:spPr bwMode="auto">
+          <a:xfrm>
+            <a:off x="3396263" y="5104475"/>
+            <a:ext cx="1325565" cy="1325565"/>
+          </a:xfrm>
+          <a:prstGeom prst="rect">
+            <a:avLst/>
+          </a:prstGeom>
+          <a:noFill/>
+          <a:extLst>
+            <a:ext uri="{909E8E84-426E-40DD-AFC4-6F175D3DCCD1}">
+              <a14:hiddenFill xmlns:a14="http://schemas.microsoft.com/office/drawing/2010/main">
+                <a:solidFill>
+                  <a:srgbClr val="FFFFFF"/>
+                </a:solidFill>
+              </a14:hiddenFill>
+            </a:ext>
+          </a:extLst>
+        </p:spPr>
+      </p:pic>
+      <p:pic>
+        <p:nvPicPr>
+          <p:cNvPr id="1034" name="Picture 10">
+            <a:extLst>
+              <a:ext uri="{FF2B5EF4-FFF2-40B4-BE49-F238E27FC236}">
+                <a16:creationId xmlns:a16="http://schemas.microsoft.com/office/drawing/2014/main" id="{5A1DEADA-7E7F-4091-835F-060F2AAD3D8B}"/>
+              </a:ext>
+            </a:extLst>
+          </p:cNvPr>
+          <p:cNvPicPr>
+            <a:picLocks noChangeAspect="1" noChangeArrowheads="1"/>
+          </p:cNvPicPr>
+          <p:nvPr/>
+        </p:nvPicPr>
+        <p:blipFill>
+          <a:blip r:embed="rId7">
+            <a:extLst>
+              <a:ext uri="{28A0092B-C50C-407E-A947-70E740481C1C}">
+                <a14:useLocalDpi xmlns:a14="http://schemas.microsoft.com/office/drawing/2010/main" val="0"/>
+              </a:ext>
+            </a:extLst>
+          </a:blip>
+          <a:srcRect/>
+          <a:stretch>
+            <a:fillRect/>
+          </a:stretch>
+        </p:blipFill>
+        <p:spPr bwMode="auto">
+          <a:xfrm>
+            <a:off x="4891000" y="4950280"/>
+            <a:ext cx="1480157" cy="1817072"/>
+          </a:xfrm>
+          <a:prstGeom prst="rect">
+            <a:avLst/>
+          </a:prstGeom>
+          <a:noFill/>
+          <a:extLst>
+            <a:ext uri="{909E8E84-426E-40DD-AFC4-6F175D3DCCD1}">
+              <a14:hiddenFill xmlns:a14="http://schemas.microsoft.com/office/drawing/2010/main">
+                <a:solidFill>
+                  <a:srgbClr val="FFFFFF"/>
+                </a:solidFill>
+              </a14:hiddenFill>
+            </a:ext>
+          </a:extLst>
+        </p:spPr>
+      </p:pic>
+      <p:pic>
+        <p:nvPicPr>
+          <p:cNvPr id="1042" name="Picture 18">
+            <a:extLst>
+              <a:ext uri="{FF2B5EF4-FFF2-40B4-BE49-F238E27FC236}">
+                <a16:creationId xmlns:a16="http://schemas.microsoft.com/office/drawing/2014/main" id="{6DEE574A-2EA8-4B7F-8324-21B554D11E5C}"/>
+              </a:ext>
+            </a:extLst>
+          </p:cNvPr>
+          <p:cNvPicPr>
+            <a:picLocks noChangeAspect="1" noChangeArrowheads="1"/>
+          </p:cNvPicPr>
+          <p:nvPr/>
+        </p:nvPicPr>
+        <p:blipFill>
+          <a:blip r:embed="rId8">
+            <a:extLst>
+              <a:ext uri="{28A0092B-C50C-407E-A947-70E740481C1C}">
+                <a14:useLocalDpi xmlns:a14="http://schemas.microsoft.com/office/drawing/2010/main" val="0"/>
+              </a:ext>
+            </a:extLst>
+          </a:blip>
+          <a:srcRect/>
+          <a:stretch>
+            <a:fillRect/>
+          </a:stretch>
+        </p:blipFill>
+        <p:spPr bwMode="auto">
+          <a:xfrm>
+            <a:off x="6693079" y="5139282"/>
+            <a:ext cx="1863910" cy="1290758"/>
+          </a:xfrm>
+          <a:prstGeom prst="rect">
+            <a:avLst/>
+          </a:prstGeom>
+          <a:noFill/>
+          <a:extLst>
+            <a:ext uri="{909E8E84-426E-40DD-AFC4-6F175D3DCCD1}">
+              <a14:hiddenFill xmlns:a14="http://schemas.microsoft.com/office/drawing/2010/main">
+                <a:solidFill>
+                  <a:srgbClr val="FFFFFF"/>
+                </a:solidFill>
+              </a14:hiddenFill>
+            </a:ext>
+          </a:extLst>
+        </p:spPr>
+      </p:pic>
     </p:spTree>
     <p:extLst>
       <p:ext uri="{BB962C8B-B14F-4D97-AF65-F5344CB8AC3E}">
@@ -17135,114 +19031,8 @@
                 <a:ea typeface="Fira Code" pitchFamily="1" charset="0"/>
                 <a:cs typeface="Fira Code" pitchFamily="1" charset="0"/>
               </a:rPr>
-              <a:t>Легкість у вивченні</a:t>
-            </a:r>
-          </a:p>
-        </p:txBody>
-      </p:sp>
-      <p:sp>
-        <p:nvSpPr>
-          <p:cNvPr id="3" name="Місце для вмісту 2">
-            <a:extLst>
-              <a:ext uri="{FF2B5EF4-FFF2-40B4-BE49-F238E27FC236}">
-                <a16:creationId xmlns:a16="http://schemas.microsoft.com/office/drawing/2014/main" id="{95B371F2-DBA5-415A-82C8-651F587B857A}"/>
-              </a:ext>
-            </a:extLst>
-          </p:cNvPr>
-          <p:cNvSpPr>
-            <a:spLocks noGrp="1"/>
-          </p:cNvSpPr>
-          <p:nvPr>
-            <p:ph type="body" idx="1"/>
-          </p:nvPr>
-        </p:nvSpPr>
-        <p:spPr>
-          <a:xfrm>
-            <a:off x="1167492" y="2653167"/>
-            <a:ext cx="9779183" cy="3436483"/>
-          </a:xfrm>
-        </p:spPr>
-        <p:txBody>
-          <a:bodyPr vert="horz" lIns="91440" tIns="45720" rIns="91440" bIns="45720" rtlCol="0" anchor="t">
-            <a:normAutofit/>
-          </a:bodyPr>
-          <a:lstStyle/>
-          <a:p>
-            <a:pPr marL="342900" indent="-342900" rtl="0">
-              <a:spcBef>
-                <a:spcPts val="0"/>
-              </a:spcBef>
-              <a:buFont typeface="Arial" panose="020B0604020202020204" pitchFamily="34" charset="0"/>
-              <a:buChar char="•"/>
-            </a:pPr>
-            <a:r>
-              <a:rPr lang="uk-UA" sz="2600" dirty="0">
-                <a:latin typeface="Calibri" panose="020F0502020204030204" pitchFamily="34" charset="0"/>
-                <a:cs typeface="Calibri" panose="020F0502020204030204" pitchFamily="34" charset="0"/>
-              </a:rPr>
-              <a:t>Проста у сприйнятті</a:t>
-            </a:r>
-          </a:p>
-          <a:p>
-            <a:pPr marL="342900" indent="-342900" rtl="0">
-              <a:spcBef>
-                <a:spcPts val="0"/>
-              </a:spcBef>
-              <a:buFont typeface="Arial" panose="020B0604020202020204" pitchFamily="34" charset="0"/>
-              <a:buChar char="•"/>
-            </a:pPr>
-            <a:r>
-              <a:rPr lang="uk-UA" sz="2600" dirty="0">
-                <a:latin typeface="Calibri" panose="020F0502020204030204" pitchFamily="34" charset="0"/>
-                <a:cs typeface="Calibri" panose="020F0502020204030204" pitchFamily="34" charset="0"/>
-              </a:rPr>
-              <a:t>Чіткий і лаконічний синтаксис</a:t>
-            </a:r>
-          </a:p>
-          <a:p>
-            <a:pPr marL="342900" indent="-342900" rtl="0">
-              <a:spcBef>
-                <a:spcPts val="0"/>
-              </a:spcBef>
-              <a:buFont typeface="Arial" panose="020B0604020202020204" pitchFamily="34" charset="0"/>
-              <a:buChar char="•"/>
-            </a:pPr>
-            <a:r>
-              <a:rPr lang="uk-UA" sz="2600" dirty="0">
-                <a:latin typeface="Calibri" panose="020F0502020204030204" pitchFamily="34" charset="0"/>
-                <a:cs typeface="Calibri" panose="020F0502020204030204" pitchFamily="34" charset="0"/>
-              </a:rPr>
-              <a:t>Більше доступна</a:t>
-            </a:r>
-          </a:p>
-          <a:p>
-            <a:pPr marL="342900" indent="-342900" rtl="0">
-              <a:spcBef>
-                <a:spcPts val="0"/>
-              </a:spcBef>
-              <a:buFont typeface="Arial" panose="020B0604020202020204" pitchFamily="34" charset="0"/>
-              <a:buChar char="•"/>
-            </a:pPr>
-            <a:r>
-              <a:rPr lang="uk-UA" sz="2600" dirty="0">
-                <a:latin typeface="Calibri" panose="020F0502020204030204" pitchFamily="34" charset="0"/>
-                <a:cs typeface="Calibri" panose="020F0502020204030204" pitchFamily="34" charset="0"/>
-              </a:rPr>
-              <a:t>Наявне ігрове середовище для тестування у реальному часі</a:t>
-            </a:r>
-          </a:p>
-          <a:p>
-            <a:pPr marL="342900" indent="-342900" rtl="0">
-              <a:spcBef>
-                <a:spcPts val="0"/>
-              </a:spcBef>
-              <a:buFont typeface="Arial" panose="020B0604020202020204" pitchFamily="34" charset="0"/>
-              <a:buChar char="•"/>
-            </a:pPr>
-            <a:endParaRPr lang="uk-UA" sz="2600" dirty="0">
-              <a:latin typeface="Calibri" panose="020F0502020204030204" pitchFamily="34" charset="0"/>
-              <a:cs typeface="Calibri" panose="020F0502020204030204" pitchFamily="34" charset="0"/>
-            </a:endParaRPr>
+              <a:t>Безпека та швидкість</a:t>
+            </a:r>
           </a:p>
         </p:txBody>
       </p:sp>
@@ -17317,6 +19107,34 @@
           </a:p>
         </p:txBody>
       </p:sp>
+      <p:graphicFrame>
+        <p:nvGraphicFramePr>
+          <p:cNvPr id="14" name="Діаграма 13">
+            <a:extLst>
+              <a:ext uri="{FF2B5EF4-FFF2-40B4-BE49-F238E27FC236}">
+                <a16:creationId xmlns:a16="http://schemas.microsoft.com/office/drawing/2014/main" id="{0D3FCCE5-82BB-4CEC-A1CB-ED5C572A5313}"/>
+              </a:ext>
+            </a:extLst>
+          </p:cNvPr>
+          <p:cNvGraphicFramePr/>
+          <p:nvPr>
+            <p:extLst>
+              <p:ext uri="{D42A27DB-BD31-4B8C-83A1-F6EECF244321}">
+                <p14:modId xmlns:p14="http://schemas.microsoft.com/office/powerpoint/2010/main" val="3878080482"/>
+              </p:ext>
+            </p:extLst>
+          </p:nvPr>
+        </p:nvGraphicFramePr>
+        <p:xfrm>
+          <a:off x="76199" y="2371724"/>
+          <a:ext cx="10534651" cy="4105276"/>
+        </p:xfrm>
+        <a:graphic>
+          <a:graphicData uri="http://schemas.openxmlformats.org/drawingml/2006/chart">
+            <c:chart xmlns:c="http://schemas.openxmlformats.org/drawingml/2006/chart" xmlns:r="http://schemas.openxmlformats.org/officeDocument/2006/relationships" r:id="rId3"/>
+          </a:graphicData>
+        </a:graphic>
+      </p:graphicFrame>
     </p:spTree>
     <p:extLst>
       <p:ext uri="{BB962C8B-B14F-4D97-AF65-F5344CB8AC3E}">
@@ -17383,118 +19201,7 @@
                 <a:ea typeface="Fira Code" pitchFamily="1" charset="0"/>
                 <a:cs typeface="Fira Code" pitchFamily="1" charset="0"/>
               </a:rPr>
-              <a:t>Інтерактивність</a:t>
-            </a:r>
-          </a:p>
-        </p:txBody>
-      </p:sp>
-      <p:sp>
-        <p:nvSpPr>
-          <p:cNvPr id="3" name="Місце для вмісту 2">
-            <a:extLst>
-              <a:ext uri="{FF2B5EF4-FFF2-40B4-BE49-F238E27FC236}">
-                <a16:creationId xmlns:a16="http://schemas.microsoft.com/office/drawing/2014/main" id="{95B371F2-DBA5-415A-82C8-651F587B857A}"/>
-              </a:ext>
-            </a:extLst>
-          </p:cNvPr>
-          <p:cNvSpPr>
-            <a:spLocks noGrp="1"/>
-          </p:cNvSpPr>
-          <p:nvPr>
-            <p:ph type="body" idx="1"/>
-          </p:nvPr>
-        </p:nvSpPr>
-        <p:spPr>
-          <a:xfrm>
-            <a:off x="1167492" y="2653167"/>
-            <a:ext cx="9779183" cy="3436483"/>
-          </a:xfrm>
-        </p:spPr>
-        <p:txBody>
-          <a:bodyPr vert="horz" lIns="91440" tIns="45720" rIns="91440" bIns="45720" rtlCol="0" anchor="t">
-            <a:normAutofit/>
-          </a:bodyPr>
-          <a:lstStyle/>
-          <a:p>
-            <a:pPr marL="342900" indent="-342900" rtl="0">
-              <a:spcBef>
-                <a:spcPts val="0"/>
-              </a:spcBef>
-              <a:buFont typeface="Arial" panose="020B0604020202020204" pitchFamily="34" charset="0"/>
-              <a:buChar char="•"/>
-            </a:pPr>
-            <a:r>
-              <a:rPr lang="uk-UA" sz="2600" dirty="0">
-                <a:latin typeface="Calibri" panose="020F0502020204030204" pitchFamily="34" charset="0"/>
-                <a:cs typeface="Calibri" panose="020F0502020204030204" pitchFamily="34" charset="0"/>
-              </a:rPr>
-              <a:t>Наявний цикл </a:t>
-            </a:r>
-            <a:r>
-              <a:rPr lang="en-US" sz="2600" dirty="0">
-                <a:latin typeface="Calibri" panose="020F0502020204030204" pitchFamily="34" charset="0"/>
-                <a:cs typeface="Calibri" panose="020F0502020204030204" pitchFamily="34" charset="0"/>
-              </a:rPr>
-              <a:t>REPL – Read-Eval-Print Loop</a:t>
-            </a:r>
-          </a:p>
-          <a:p>
-            <a:pPr marL="342900" indent="-342900" rtl="0">
-              <a:spcBef>
-                <a:spcPts val="0"/>
-              </a:spcBef>
-              <a:buFont typeface="Arial" panose="020B0604020202020204" pitchFamily="34" charset="0"/>
-              <a:buChar char="•"/>
-            </a:pPr>
-            <a:r>
-              <a:rPr lang="uk-UA" sz="2600" dirty="0">
-                <a:latin typeface="Calibri" panose="020F0502020204030204" pitchFamily="34" charset="0"/>
-                <a:cs typeface="Calibri" panose="020F0502020204030204" pitchFamily="34" charset="0"/>
-              </a:rPr>
-              <a:t>Експерименти у реальному часі</a:t>
-            </a:r>
-          </a:p>
-          <a:p>
-            <a:pPr marL="342900" indent="-342900" rtl="0">
-              <a:spcBef>
-                <a:spcPts val="0"/>
-              </a:spcBef>
-              <a:buFont typeface="Arial" panose="020B0604020202020204" pitchFamily="34" charset="0"/>
-              <a:buChar char="•"/>
-            </a:pPr>
-            <a:r>
-              <a:rPr lang="uk-UA" sz="2600" dirty="0">
-                <a:latin typeface="Calibri" panose="020F0502020204030204" pitchFamily="34" charset="0"/>
-                <a:cs typeface="Calibri" panose="020F0502020204030204" pitchFamily="34" charset="0"/>
-              </a:rPr>
-              <a:t>Полегшення вивчення та </a:t>
-            </a:r>
-            <a:r>
-              <a:rPr lang="uk-UA" sz="2600" dirty="0" err="1">
-                <a:latin typeface="Calibri" panose="020F0502020204030204" pitchFamily="34" charset="0"/>
-                <a:cs typeface="Calibri" panose="020F0502020204030204" pitchFamily="34" charset="0"/>
-              </a:rPr>
-              <a:t>відлагодження</a:t>
-            </a:r>
-            <a:endParaRPr lang="uk-UA" sz="2600" dirty="0">
-              <a:latin typeface="Calibri" panose="020F0502020204030204" pitchFamily="34" charset="0"/>
-              <a:cs typeface="Calibri" panose="020F0502020204030204" pitchFamily="34" charset="0"/>
-            </a:endParaRPr>
-          </a:p>
-          <a:p>
-            <a:pPr marL="342900" indent="-342900" rtl="0">
-              <a:spcBef>
-                <a:spcPts val="0"/>
-              </a:spcBef>
-              <a:buFont typeface="Arial" panose="020B0604020202020204" pitchFamily="34" charset="0"/>
-              <a:buChar char="•"/>
-            </a:pPr>
-            <a:r>
-              <a:rPr lang="uk-UA" sz="2600" dirty="0">
-                <a:latin typeface="Calibri" panose="020F0502020204030204" pitchFamily="34" charset="0"/>
-                <a:cs typeface="Calibri" panose="020F0502020204030204" pitchFamily="34" charset="0"/>
-              </a:rPr>
-              <a:t>Покращення швидкості перевірки</a:t>
+              <a:t>Легкість у вивченні</a:t>
             </a:r>
           </a:p>
         </p:txBody>
@@ -17570,6 +19277,96 @@
           </a:p>
         </p:txBody>
       </p:sp>
+      <p:pic>
+        <p:nvPicPr>
+          <p:cNvPr id="13" name="Рисунок 12">
+            <a:extLst>
+              <a:ext uri="{FF2B5EF4-FFF2-40B4-BE49-F238E27FC236}">
+                <a16:creationId xmlns:a16="http://schemas.microsoft.com/office/drawing/2014/main" id="{3EFA6C1F-9093-4E66-A9B6-F40736624C8B}"/>
+              </a:ext>
+            </a:extLst>
+          </p:cNvPr>
+          <p:cNvPicPr>
+            <a:picLocks noChangeAspect="1"/>
+          </p:cNvPicPr>
+          <p:nvPr/>
+        </p:nvPicPr>
+        <p:blipFill>
+          <a:blip r:embed="rId3"/>
+          <a:stretch>
+            <a:fillRect/>
+          </a:stretch>
+        </p:blipFill>
+        <p:spPr>
+          <a:xfrm>
+            <a:off x="647700" y="2639990"/>
+            <a:ext cx="4543425" cy="1578019"/>
+          </a:xfrm>
+          <a:prstGeom prst="rect">
+            <a:avLst/>
+          </a:prstGeom>
+        </p:spPr>
+      </p:pic>
+      <p:pic>
+        <p:nvPicPr>
+          <p:cNvPr id="15" name="Рисунок 14">
+            <a:extLst>
+              <a:ext uri="{FF2B5EF4-FFF2-40B4-BE49-F238E27FC236}">
+                <a16:creationId xmlns:a16="http://schemas.microsoft.com/office/drawing/2014/main" id="{6EB5B50C-6409-47B5-8D63-5B7848D6D8A6}"/>
+              </a:ext>
+            </a:extLst>
+          </p:cNvPr>
+          <p:cNvPicPr>
+            <a:picLocks noChangeAspect="1"/>
+          </p:cNvPicPr>
+          <p:nvPr/>
+        </p:nvPicPr>
+        <p:blipFill>
+          <a:blip r:embed="rId4"/>
+          <a:stretch>
+            <a:fillRect/>
+          </a:stretch>
+        </p:blipFill>
+        <p:spPr>
+          <a:xfrm>
+            <a:off x="6057083" y="2639990"/>
+            <a:ext cx="4029584" cy="1578019"/>
+          </a:xfrm>
+          <a:prstGeom prst="rect">
+            <a:avLst/>
+          </a:prstGeom>
+        </p:spPr>
+      </p:pic>
+      <p:pic>
+        <p:nvPicPr>
+          <p:cNvPr id="17" name="Рисунок 16">
+            <a:extLst>
+              <a:ext uri="{FF2B5EF4-FFF2-40B4-BE49-F238E27FC236}">
+                <a16:creationId xmlns:a16="http://schemas.microsoft.com/office/drawing/2014/main" id="{13A044C1-93DB-4D8E-8D9E-8384081D2BFB}"/>
+              </a:ext>
+            </a:extLst>
+          </p:cNvPr>
+          <p:cNvPicPr>
+            <a:picLocks noChangeAspect="1"/>
+          </p:cNvPicPr>
+          <p:nvPr/>
+        </p:nvPicPr>
+        <p:blipFill>
+          <a:blip r:embed="rId5"/>
+          <a:stretch>
+            <a:fillRect/>
+          </a:stretch>
+        </p:blipFill>
+        <p:spPr>
+          <a:xfrm>
+            <a:off x="3305175" y="4498368"/>
+            <a:ext cx="4914900" cy="1577622"/>
+          </a:xfrm>
+          <a:prstGeom prst="rect">
+            <a:avLst/>
+          </a:prstGeom>
+        </p:spPr>
+      </p:pic>
     </p:spTree>
     <p:extLst>
       <p:ext uri="{BB962C8B-B14F-4D97-AF65-F5344CB8AC3E}">
@@ -17636,121 +19433,7 @@
                 <a:ea typeface="Fira Code" pitchFamily="1" charset="0"/>
                 <a:cs typeface="Fira Code" pitchFamily="1" charset="0"/>
               </a:rPr>
-              <a:t>Відкритий вихідний код</a:t>
-            </a:r>
-          </a:p>
-        </p:txBody>
-      </p:sp>
-      <p:sp>
-        <p:nvSpPr>
-          <p:cNvPr id="3" name="Місце для вмісту 2">
-            <a:extLst>
-              <a:ext uri="{FF2B5EF4-FFF2-40B4-BE49-F238E27FC236}">
-                <a16:creationId xmlns:a16="http://schemas.microsoft.com/office/drawing/2014/main" id="{95B371F2-DBA5-415A-82C8-651F587B857A}"/>
-              </a:ext>
-            </a:extLst>
-          </p:cNvPr>
-          <p:cNvSpPr>
-            <a:spLocks noGrp="1"/>
-          </p:cNvSpPr>
-          <p:nvPr>
-            <p:ph type="body" idx="1"/>
-          </p:nvPr>
-        </p:nvSpPr>
-        <p:spPr>
-          <a:xfrm>
-            <a:off x="1167492" y="2653167"/>
-            <a:ext cx="9779183" cy="3436483"/>
-          </a:xfrm>
-        </p:spPr>
-        <p:txBody>
-          <a:bodyPr vert="horz" lIns="91440" tIns="45720" rIns="91440" bIns="45720" rtlCol="0" anchor="t">
-            <a:normAutofit/>
-          </a:bodyPr>
-          <a:lstStyle/>
-          <a:p>
-            <a:pPr marL="342900" indent="-342900" rtl="0">
-              <a:spcBef>
-                <a:spcPts val="0"/>
-              </a:spcBef>
-              <a:buFont typeface="Arial" panose="020B0604020202020204" pitchFamily="34" charset="0"/>
-              <a:buChar char="•"/>
-            </a:pPr>
-            <a:r>
-              <a:rPr lang="en-US" sz="2600" dirty="0">
-                <a:latin typeface="Calibri" panose="020F0502020204030204" pitchFamily="34" charset="0"/>
-                <a:cs typeface="Calibri" panose="020F0502020204030204" pitchFamily="34" charset="0"/>
-              </a:rPr>
-              <a:t>Swift </a:t>
-            </a:r>
-            <a:r>
-              <a:rPr lang="uk-UA" sz="2600" dirty="0">
-                <a:latin typeface="Calibri" panose="020F0502020204030204" pitchFamily="34" charset="0"/>
-                <a:cs typeface="Calibri" panose="020F0502020204030204" pitchFamily="34" charset="0"/>
-              </a:rPr>
-              <a:t>є</a:t>
-            </a:r>
-            <a:r>
-              <a:rPr lang="en-US" sz="2600" dirty="0">
-                <a:latin typeface="Calibri" panose="020F0502020204030204" pitchFamily="34" charset="0"/>
-                <a:cs typeface="Calibri" panose="020F0502020204030204" pitchFamily="34" charset="0"/>
-              </a:rPr>
-              <a:t> Open-Source </a:t>
-            </a:r>
-            <a:r>
-              <a:rPr lang="uk-UA" sz="2600" dirty="0">
-                <a:latin typeface="Calibri" panose="020F0502020204030204" pitchFamily="34" charset="0"/>
-                <a:cs typeface="Calibri" panose="020F0502020204030204" pitchFamily="34" charset="0"/>
-              </a:rPr>
-              <a:t>мовою</a:t>
-            </a:r>
-          </a:p>
-          <a:p>
-            <a:pPr marL="342900" indent="-342900" rtl="0">
-              <a:spcBef>
-                <a:spcPts val="0"/>
-              </a:spcBef>
-              <a:buFont typeface="Arial" panose="020B0604020202020204" pitchFamily="34" charset="0"/>
-              <a:buChar char="•"/>
-            </a:pPr>
-            <a:r>
-              <a:rPr lang="uk-UA" sz="2600" dirty="0">
-                <a:latin typeface="Calibri" panose="020F0502020204030204" pitchFamily="34" charset="0"/>
-                <a:cs typeface="Calibri" panose="020F0502020204030204" pitchFamily="34" charset="0"/>
-              </a:rPr>
-              <a:t>Велика спільнота розробників</a:t>
-            </a:r>
-          </a:p>
-          <a:p>
-            <a:pPr marL="342900" indent="-342900" rtl="0">
-              <a:spcBef>
-                <a:spcPts val="0"/>
-              </a:spcBef>
-              <a:buFont typeface="Arial" panose="020B0604020202020204" pitchFamily="34" charset="0"/>
-              <a:buChar char="•"/>
-            </a:pPr>
-            <a:r>
-              <a:rPr lang="uk-UA" sz="2600" dirty="0">
-                <a:latin typeface="Calibri" panose="020F0502020204030204" pitchFamily="34" charset="0"/>
-                <a:cs typeface="Calibri" panose="020F0502020204030204" pitchFamily="34" charset="0"/>
-              </a:rPr>
-              <a:t>Постійне вдосконалення мови</a:t>
-            </a:r>
-          </a:p>
-          <a:p>
-            <a:pPr marL="342900" indent="-342900" rtl="0">
-              <a:spcBef>
-                <a:spcPts val="0"/>
-              </a:spcBef>
-              <a:buFont typeface="Arial" panose="020B0604020202020204" pitchFamily="34" charset="0"/>
-              <a:buChar char="•"/>
-            </a:pPr>
-            <a:r>
-              <a:rPr lang="uk-UA" sz="2600" dirty="0">
-                <a:latin typeface="Calibri" panose="020F0502020204030204" pitchFamily="34" charset="0"/>
-                <a:cs typeface="Calibri" panose="020F0502020204030204" pitchFamily="34" charset="0"/>
-              </a:rPr>
-              <a:t>Покращення прозорості та швидке вдосконалення</a:t>
+              <a:t>Об'єктно-орієнтованість</a:t>
             </a:r>
           </a:p>
         </p:txBody>
@@ -17784,7 +19467,7 @@
             <a:pPr rtl="0"/>
             <a:fld id="{2B3FECCB-B4D4-4C4B-87FB-97861EE1F201}" type="datetime1">
               <a:rPr lang="uk-UA" smtClean="0"/>
-              <a:t>19.04.2023</a:t>
+              <a:t>20.04.2023</a:t>
             </a:fld>
             <a:endParaRPr lang="uk-UA"/>
           </a:p>
@@ -17823,6 +19506,296 @@
               <a:t>6</a:t>
             </a:fld>
             <a:endParaRPr lang="uk-UA"/>
+          </a:p>
+        </p:txBody>
+      </p:sp>
+      <p:pic>
+        <p:nvPicPr>
+          <p:cNvPr id="2066" name="Picture 18" descr="Types Of Car Chassis Explained | From Ladder To Monocoque!">
+            <a:extLst>
+              <a:ext uri="{FF2B5EF4-FFF2-40B4-BE49-F238E27FC236}">
+                <a16:creationId xmlns:a16="http://schemas.microsoft.com/office/drawing/2014/main" id="{0B567F90-CD9F-4D6E-8EFC-DEC842F16A83}"/>
+              </a:ext>
+            </a:extLst>
+          </p:cNvPr>
+          <p:cNvPicPr>
+            <a:picLocks noChangeAspect="1" noChangeArrowheads="1"/>
+          </p:cNvPicPr>
+          <p:nvPr/>
+        </p:nvPicPr>
+        <p:blipFill>
+          <a:blip r:embed="rId3">
+            <a:extLst>
+              <a:ext uri="{28A0092B-C50C-407E-A947-70E740481C1C}">
+                <a14:useLocalDpi xmlns:a14="http://schemas.microsoft.com/office/drawing/2010/main" val="0"/>
+              </a:ext>
+            </a:extLst>
+          </a:blip>
+          <a:srcRect/>
+          <a:stretch>
+            <a:fillRect/>
+          </a:stretch>
+        </p:blipFill>
+        <p:spPr bwMode="auto">
+          <a:xfrm>
+            <a:off x="276224" y="2549525"/>
+            <a:ext cx="4720317" cy="3146878"/>
+          </a:xfrm>
+          <a:prstGeom prst="rect">
+            <a:avLst/>
+          </a:prstGeom>
+          <a:noFill/>
+          <a:extLst>
+            <a:ext uri="{909E8E84-426E-40DD-AFC4-6F175D3DCCD1}">
+              <a14:hiddenFill xmlns:a14="http://schemas.microsoft.com/office/drawing/2010/main">
+                <a:solidFill>
+                  <a:srgbClr val="FFFFFF"/>
+                </a:solidFill>
+              </a14:hiddenFill>
+            </a:ext>
+          </a:extLst>
+        </p:spPr>
+      </p:pic>
+      <p:pic>
+        <p:nvPicPr>
+          <p:cNvPr id="2068" name="Picture 20" descr="Here Are The Coolest New Cars For 2020">
+            <a:extLst>
+              <a:ext uri="{FF2B5EF4-FFF2-40B4-BE49-F238E27FC236}">
+                <a16:creationId xmlns:a16="http://schemas.microsoft.com/office/drawing/2014/main" id="{25974C73-3D76-4573-9771-FA7C8600BA85}"/>
+              </a:ext>
+            </a:extLst>
+          </p:cNvPr>
+          <p:cNvPicPr>
+            <a:picLocks noChangeAspect="1" noChangeArrowheads="1"/>
+          </p:cNvPicPr>
+          <p:nvPr/>
+        </p:nvPicPr>
+        <p:blipFill>
+          <a:blip r:embed="rId4">
+            <a:extLst>
+              <a:ext uri="{28A0092B-C50C-407E-A947-70E740481C1C}">
+                <a14:useLocalDpi xmlns:a14="http://schemas.microsoft.com/office/drawing/2010/main" val="0"/>
+              </a:ext>
+            </a:extLst>
+          </a:blip>
+          <a:srcRect/>
+          <a:stretch>
+            <a:fillRect/>
+          </a:stretch>
+        </p:blipFill>
+        <p:spPr bwMode="auto">
+          <a:xfrm>
+            <a:off x="6057083" y="2538412"/>
+            <a:ext cx="5308601" cy="2986088"/>
+          </a:xfrm>
+          <a:prstGeom prst="rect">
+            <a:avLst/>
+          </a:prstGeom>
+          <a:noFill/>
+          <a:extLst>
+            <a:ext uri="{909E8E84-426E-40DD-AFC4-6F175D3DCCD1}">
+              <a14:hiddenFill xmlns:a14="http://schemas.microsoft.com/office/drawing/2010/main">
+                <a:solidFill>
+                  <a:srgbClr val="FFFFFF"/>
+                </a:solidFill>
+              </a14:hiddenFill>
+            </a:ext>
+          </a:extLst>
+        </p:spPr>
+      </p:pic>
+      <p:cxnSp>
+        <p:nvCxnSpPr>
+          <p:cNvPr id="9" name="Пряма зі стрілкою 8">
+            <a:extLst>
+              <a:ext uri="{FF2B5EF4-FFF2-40B4-BE49-F238E27FC236}">
+                <a16:creationId xmlns:a16="http://schemas.microsoft.com/office/drawing/2014/main" id="{D39E919B-4E87-45EB-9683-F40598F9D695}"/>
+              </a:ext>
+            </a:extLst>
+          </p:cNvPr>
+          <p:cNvCxnSpPr>
+            <a:cxnSpLocks/>
+            <a:endCxn id="2068" idx="1"/>
+          </p:cNvCxnSpPr>
+          <p:nvPr/>
+        </p:nvCxnSpPr>
+        <p:spPr>
+          <a:xfrm flipV="1">
+            <a:off x="5060495" y="4031456"/>
+            <a:ext cx="996588" cy="283369"/>
+          </a:xfrm>
+          <a:prstGeom prst="straightConnector1">
+            <a:avLst/>
+          </a:prstGeom>
+          <a:ln>
+            <a:tailEnd type="triangle"/>
+          </a:ln>
+        </p:spPr>
+        <p:style>
+          <a:lnRef idx="3">
+            <a:schemeClr val="accent2"/>
+          </a:lnRef>
+          <a:fillRef idx="0">
+            <a:schemeClr val="accent2"/>
+          </a:fillRef>
+          <a:effectRef idx="2">
+            <a:schemeClr val="accent2"/>
+          </a:effectRef>
+          <a:fontRef idx="minor">
+            <a:schemeClr val="tx1"/>
+          </a:fontRef>
+        </p:style>
+      </p:cxnSp>
+      <p:sp>
+        <p:nvSpPr>
+          <p:cNvPr id="12" name="TextBox 11">
+            <a:extLst>
+              <a:ext uri="{FF2B5EF4-FFF2-40B4-BE49-F238E27FC236}">
+                <a16:creationId xmlns:a16="http://schemas.microsoft.com/office/drawing/2014/main" id="{0D4ADDFB-5DAC-43B1-A012-4625FE518A7F}"/>
+              </a:ext>
+            </a:extLst>
+          </p:cNvPr>
+          <p:cNvSpPr txBox="1"/>
+          <p:nvPr/>
+        </p:nvSpPr>
+        <p:spPr>
+          <a:xfrm>
+            <a:off x="1590675" y="5711162"/>
+            <a:ext cx="859531" cy="630429"/>
+          </a:xfrm>
+          <a:prstGeom prst="rect">
+            <a:avLst/>
+          </a:prstGeom>
+          <a:noFill/>
+        </p:spPr>
+        <p:txBody>
+          <a:bodyPr wrap="none" rtlCol="0">
+            <a:spAutoFit/>
+          </a:bodyPr>
+          <a:lstStyle/>
+          <a:p>
+            <a:pPr marR="0" lvl="0" algn="l" defTabSz="914400" rtl="0" eaLnBrk="1" fontAlgn="auto" latinLnBrk="0" hangingPunct="1">
+              <a:lnSpc>
+                <a:spcPct val="150000"/>
+              </a:lnSpc>
+              <a:spcBef>
+                <a:spcPts val="0"/>
+              </a:spcBef>
+              <a:spcAft>
+                <a:spcPts val="0"/>
+              </a:spcAft>
+              <a:buClrTx/>
+              <a:buSzTx/>
+              <a:tabLst/>
+              <a:defRPr/>
+            </a:pPr>
+            <a:r>
+              <a:rPr kumimoji="0" lang="en-US" sz="2600" b="0" i="0" u="none" strike="noStrike" kern="1200" cap="none" spc="0" normalizeH="0" baseline="0" noProof="0" dirty="0">
+                <a:ln>
+                  <a:noFill/>
+                </a:ln>
+                <a:solidFill>
+                  <a:srgbClr val="FFFFFF"/>
+                </a:solidFill>
+                <a:effectLst/>
+                <a:uLnTx/>
+                <a:uFillTx/>
+                <a:latin typeface="Calibri" panose="020F0502020204030204" pitchFamily="34" charset="0"/>
+                <a:ea typeface="+mn-ea"/>
+                <a:cs typeface="Calibri" panose="020F0502020204030204" pitchFamily="34" charset="0"/>
+              </a:rPr>
+              <a:t>Class</a:t>
+            </a:r>
+            <a:endParaRPr kumimoji="0" lang="uk-UA" sz="2600" b="0" i="0" u="none" strike="noStrike" kern="1200" cap="none" spc="0" normalizeH="0" baseline="0" noProof="0" dirty="0">
+              <a:ln>
+                <a:noFill/>
+              </a:ln>
+              <a:solidFill>
+                <a:srgbClr val="FFFFFF"/>
+              </a:solidFill>
+              <a:effectLst/>
+              <a:uLnTx/>
+              <a:uFillTx/>
+              <a:latin typeface="Calibri" panose="020F0502020204030204" pitchFamily="34" charset="0"/>
+              <a:ea typeface="+mn-ea"/>
+              <a:cs typeface="Calibri" panose="020F0502020204030204" pitchFamily="34" charset="0"/>
+            </a:endParaRPr>
+          </a:p>
+        </p:txBody>
+      </p:sp>
+      <p:sp>
+        <p:nvSpPr>
+          <p:cNvPr id="23" name="TextBox 22">
+            <a:extLst>
+              <a:ext uri="{FF2B5EF4-FFF2-40B4-BE49-F238E27FC236}">
+                <a16:creationId xmlns:a16="http://schemas.microsoft.com/office/drawing/2014/main" id="{61BA7748-5FF5-410F-ACE1-497C83FFBB99}"/>
+              </a:ext>
+            </a:extLst>
+          </p:cNvPr>
+          <p:cNvSpPr txBox="1"/>
+          <p:nvPr/>
+        </p:nvSpPr>
+        <p:spPr>
+          <a:xfrm>
+            <a:off x="6765695" y="5524500"/>
+            <a:ext cx="1079142" cy="630429"/>
+          </a:xfrm>
+          <a:prstGeom prst="rect">
+            <a:avLst/>
+          </a:prstGeom>
+          <a:noFill/>
+        </p:spPr>
+        <p:txBody>
+          <a:bodyPr wrap="none" rtlCol="0">
+            <a:spAutoFit/>
+          </a:bodyPr>
+          <a:lstStyle/>
+          <a:p>
+            <a:pPr marR="0" lvl="0" algn="l" defTabSz="914400" rtl="0" eaLnBrk="1" fontAlgn="auto" latinLnBrk="0" hangingPunct="1">
+              <a:lnSpc>
+                <a:spcPct val="150000"/>
+              </a:lnSpc>
+              <a:spcBef>
+                <a:spcPts val="0"/>
+              </a:spcBef>
+              <a:spcAft>
+                <a:spcPts val="0"/>
+              </a:spcAft>
+              <a:buClrTx/>
+              <a:buSzTx/>
+              <a:tabLst/>
+              <a:defRPr/>
+            </a:pPr>
+            <a:r>
+              <a:rPr kumimoji="0" lang="en-US" sz="2600" b="0" i="0" u="none" strike="noStrike" kern="1200" cap="none" spc="0" normalizeH="0" baseline="0" noProof="0" dirty="0">
+                <a:ln>
+                  <a:noFill/>
+                </a:ln>
+                <a:solidFill>
+                  <a:srgbClr val="FFFFFF"/>
+                </a:solidFill>
+                <a:effectLst/>
+                <a:uLnTx/>
+                <a:uFillTx/>
+                <a:latin typeface="Calibri" panose="020F0502020204030204" pitchFamily="34" charset="0"/>
+                <a:ea typeface="+mn-ea"/>
+                <a:cs typeface="Calibri" panose="020F0502020204030204" pitchFamily="34" charset="0"/>
+              </a:rPr>
+              <a:t>Object</a:t>
+            </a:r>
+            <a:endParaRPr kumimoji="0" lang="uk-UA" sz="2600" b="0" i="0" u="none" strike="noStrike" kern="1200" cap="none" spc="0" normalizeH="0" baseline="0" noProof="0" dirty="0">
+              <a:ln>
+                <a:noFill/>
+              </a:ln>
+              <a:solidFill>
+                <a:srgbClr val="FFFFFF"/>
+              </a:solidFill>
+              <a:effectLst/>
+              <a:uLnTx/>
+              <a:uFillTx/>
+              <a:latin typeface="Calibri" panose="020F0502020204030204" pitchFamily="34" charset="0"/>
+              <a:ea typeface="+mn-ea"/>
+              <a:cs typeface="Calibri" panose="020F0502020204030204" pitchFamily="34" charset="0"/>
+            </a:endParaRPr>
           </a:p>
         </p:txBody>
       </p:sp>
@@ -17877,8 +19850,8 @@
         </p:nvSpPr>
         <p:spPr>
           <a:xfrm>
-            <a:off x="1167492" y="381000"/>
-            <a:ext cx="9779183" cy="1325563"/>
+            <a:off x="666750" y="438150"/>
+            <a:ext cx="10557783" cy="1325563"/>
           </a:xfrm>
         </p:spPr>
         <p:txBody>
@@ -17892,111 +19865,7 @@
                 <a:ea typeface="Fira Code" pitchFamily="1" charset="0"/>
                 <a:cs typeface="Fira Code" pitchFamily="1" charset="0"/>
               </a:rPr>
-              <a:t>Безпека та швидкість</a:t>
-            </a:r>
-          </a:p>
-        </p:txBody>
-      </p:sp>
-      <p:sp>
-        <p:nvSpPr>
-          <p:cNvPr id="3" name="Місце для вмісту 2">
-            <a:extLst>
-              <a:ext uri="{FF2B5EF4-FFF2-40B4-BE49-F238E27FC236}">
-                <a16:creationId xmlns:a16="http://schemas.microsoft.com/office/drawing/2014/main" id="{95B371F2-DBA5-415A-82C8-651F587B857A}"/>
-              </a:ext>
-            </a:extLst>
-          </p:cNvPr>
-          <p:cNvSpPr>
-            <a:spLocks noGrp="1"/>
-          </p:cNvSpPr>
-          <p:nvPr>
-            <p:ph type="body" idx="1"/>
-          </p:nvPr>
-        </p:nvSpPr>
-        <p:spPr>
-          <a:xfrm>
-            <a:off x="1167492" y="2653167"/>
-            <a:ext cx="9779183" cy="3436483"/>
-          </a:xfrm>
-        </p:spPr>
-        <p:txBody>
-          <a:bodyPr vert="horz" lIns="91440" tIns="45720" rIns="91440" bIns="45720" rtlCol="0" anchor="t">
-            <a:normAutofit/>
-          </a:bodyPr>
-          <a:lstStyle/>
-          <a:p>
-            <a:pPr marL="342900" indent="-342900" rtl="0">
-              <a:spcBef>
-                <a:spcPts val="0"/>
-              </a:spcBef>
-              <a:buFont typeface="Arial" panose="020B0604020202020204" pitchFamily="34" charset="0"/>
-              <a:buChar char="•"/>
-            </a:pPr>
-            <a:r>
-              <a:rPr lang="uk-UA" sz="2600" dirty="0">
-                <a:latin typeface="Calibri" panose="020F0502020204030204" pitchFamily="34" charset="0"/>
-                <a:cs typeface="Calibri" panose="020F0502020204030204" pitchFamily="34" charset="0"/>
-              </a:rPr>
-              <a:t>Більш надійний та ефективний код</a:t>
-            </a:r>
-          </a:p>
-          <a:p>
-            <a:pPr marL="342900" indent="-342900" rtl="0">
-              <a:spcBef>
-                <a:spcPts val="0"/>
-              </a:spcBef>
-              <a:buFont typeface="Arial" panose="020B0604020202020204" pitchFamily="34" charset="0"/>
-              <a:buChar char="•"/>
-            </a:pPr>
-            <a:r>
-              <a:rPr lang="uk-UA" sz="2600" dirty="0">
-                <a:latin typeface="Calibri" panose="020F0502020204030204" pitchFamily="34" charset="0"/>
-                <a:cs typeface="Calibri" panose="020F0502020204030204" pitchFamily="34" charset="0"/>
-              </a:rPr>
-              <a:t>Сучасні концепції</a:t>
-            </a:r>
-          </a:p>
-          <a:p>
-            <a:pPr marL="342900" indent="-342900" rtl="0">
-              <a:spcBef>
-                <a:spcPts val="0"/>
-              </a:spcBef>
-              <a:buFont typeface="Arial" panose="020B0604020202020204" pitchFamily="34" charset="0"/>
-              <a:buChar char="•"/>
-            </a:pPr>
-            <a:r>
-              <a:rPr lang="uk-UA" sz="2600" dirty="0">
-                <a:latin typeface="Calibri" panose="020F0502020204030204" pitchFamily="34" charset="0"/>
-                <a:cs typeface="Calibri" panose="020F0502020204030204" pitchFamily="34" charset="0"/>
-              </a:rPr>
-              <a:t>Вбудована система </a:t>
-            </a:r>
-            <a:r>
-              <a:rPr lang="uk-UA" sz="2600" dirty="0" err="1">
-                <a:latin typeface="Calibri" panose="020F0502020204030204" pitchFamily="34" charset="0"/>
-                <a:cs typeface="Calibri" panose="020F0502020204030204" pitchFamily="34" charset="0"/>
-              </a:rPr>
-              <a:t>відлагоджування</a:t>
-            </a:r>
-            <a:endParaRPr lang="uk-UA" sz="2600" dirty="0">
-              <a:latin typeface="Calibri" panose="020F0502020204030204" pitchFamily="34" charset="0"/>
-              <a:cs typeface="Calibri" panose="020F0502020204030204" pitchFamily="34" charset="0"/>
-            </a:endParaRPr>
-          </a:p>
-          <a:p>
-            <a:pPr marL="342900" indent="-342900" rtl="0">
-              <a:spcBef>
-                <a:spcPts val="0"/>
-              </a:spcBef>
-              <a:buFont typeface="Arial" panose="020B0604020202020204" pitchFamily="34" charset="0"/>
-              <a:buChar char="•"/>
-            </a:pPr>
-            <a:r>
-              <a:rPr lang="uk-UA" sz="2600" dirty="0">
-                <a:latin typeface="Calibri" panose="020F0502020204030204" pitchFamily="34" charset="0"/>
-                <a:cs typeface="Calibri" panose="020F0502020204030204" pitchFamily="34" charset="0"/>
-              </a:rPr>
-              <a:t>Висока швидкодія</a:t>
+              <a:t>Функціональне програмування</a:t>
             </a:r>
           </a:p>
         </p:txBody>
@@ -18072,6 +19941,36 @@
           </a:p>
         </p:txBody>
       </p:sp>
+      <p:pic>
+        <p:nvPicPr>
+          <p:cNvPr id="11" name="Рисунок 10">
+            <a:extLst>
+              <a:ext uri="{FF2B5EF4-FFF2-40B4-BE49-F238E27FC236}">
+                <a16:creationId xmlns:a16="http://schemas.microsoft.com/office/drawing/2014/main" id="{5C44FF3F-C9B7-4BA5-A165-213A255181FA}"/>
+              </a:ext>
+            </a:extLst>
+          </p:cNvPr>
+          <p:cNvPicPr>
+            <a:picLocks noChangeAspect="1"/>
+          </p:cNvPicPr>
+          <p:nvPr/>
+        </p:nvPicPr>
+        <p:blipFill>
+          <a:blip r:embed="rId3"/>
+          <a:stretch>
+            <a:fillRect/>
+          </a:stretch>
+        </p:blipFill>
+        <p:spPr>
+          <a:xfrm>
+            <a:off x="381000" y="2412920"/>
+            <a:ext cx="7848600" cy="3534558"/>
+          </a:xfrm>
+          <a:prstGeom prst="rect">
+            <a:avLst/>
+          </a:prstGeom>
+        </p:spPr>
+      </p:pic>
     </p:spTree>
     <p:extLst>
       <p:ext uri="{BB962C8B-B14F-4D97-AF65-F5344CB8AC3E}">
@@ -18138,112 +20037,8 @@
                 <a:ea typeface="Fira Code" pitchFamily="1" charset="0"/>
                 <a:cs typeface="Fira Code" pitchFamily="1" charset="0"/>
               </a:rPr>
-              <a:t>Багатозадачність</a:t>
-            </a:r>
-          </a:p>
-        </p:txBody>
-      </p:sp>
-      <p:sp>
-        <p:nvSpPr>
-          <p:cNvPr id="3" name="Місце для вмісту 2">
-            <a:extLst>
-              <a:ext uri="{FF2B5EF4-FFF2-40B4-BE49-F238E27FC236}">
-                <a16:creationId xmlns:a16="http://schemas.microsoft.com/office/drawing/2014/main" id="{95B371F2-DBA5-415A-82C8-651F587B857A}"/>
-              </a:ext>
-            </a:extLst>
-          </p:cNvPr>
-          <p:cNvSpPr>
-            <a:spLocks noGrp="1"/>
-          </p:cNvSpPr>
-          <p:nvPr>
-            <p:ph type="body" idx="1"/>
-          </p:nvPr>
-        </p:nvSpPr>
-        <p:spPr>
-          <a:xfrm>
-            <a:off x="1167492" y="2653167"/>
-            <a:ext cx="9779183" cy="3436483"/>
-          </a:xfrm>
-        </p:spPr>
-        <p:txBody>
-          <a:bodyPr vert="horz" lIns="91440" tIns="45720" rIns="91440" bIns="45720" rtlCol="0" anchor="t">
-            <a:normAutofit/>
-          </a:bodyPr>
-          <a:lstStyle/>
-          <a:p>
-            <a:pPr marL="342900" indent="-342900" rtl="0">
-              <a:spcBef>
-                <a:spcPts val="0"/>
-              </a:spcBef>
-              <a:buFont typeface="Arial" panose="020B0604020202020204" pitchFamily="34" charset="0"/>
-              <a:buChar char="•"/>
-            </a:pPr>
-            <a:r>
-              <a:rPr lang="uk-UA" sz="2600" dirty="0">
-                <a:latin typeface="Calibri" panose="020F0502020204030204" pitchFamily="34" charset="0"/>
-                <a:cs typeface="Calibri" panose="020F0502020204030204" pitchFamily="34" charset="0"/>
-              </a:rPr>
-              <a:t>Вбудована багатозадачність</a:t>
-            </a:r>
-          </a:p>
-          <a:p>
-            <a:pPr marL="342900" indent="-342900" rtl="0">
-              <a:spcBef>
-                <a:spcPts val="0"/>
-              </a:spcBef>
-              <a:buFont typeface="Arial" panose="020B0604020202020204" pitchFamily="34" charset="0"/>
-              <a:buChar char="•"/>
-            </a:pPr>
-            <a:r>
-              <a:rPr lang="uk-UA" sz="2600" dirty="0">
-                <a:latin typeface="Calibri" panose="020F0502020204030204" pitchFamily="34" charset="0"/>
-                <a:cs typeface="Calibri" panose="020F0502020204030204" pitchFamily="34" charset="0"/>
-              </a:rPr>
-              <a:t>Гнучкий код, як наслідок</a:t>
-            </a:r>
-          </a:p>
-          <a:p>
-            <a:pPr marL="342900" indent="-342900" rtl="0">
-              <a:spcBef>
-                <a:spcPts val="0"/>
-              </a:spcBef>
-              <a:buFont typeface="Arial" panose="020B0604020202020204" pitchFamily="34" charset="0"/>
-              <a:buChar char="•"/>
-            </a:pPr>
-            <a:r>
-              <a:rPr lang="uk-UA" sz="2600" dirty="0">
-                <a:latin typeface="Calibri" panose="020F0502020204030204" pitchFamily="34" charset="0"/>
-                <a:cs typeface="Calibri" panose="020F0502020204030204" pitchFamily="34" charset="0"/>
-              </a:rPr>
-              <a:t>Підтримка асинхронного програмування</a:t>
-            </a:r>
-          </a:p>
-          <a:p>
-            <a:pPr marL="342900" indent="-342900" rtl="0">
-              <a:spcBef>
-                <a:spcPts val="0"/>
-              </a:spcBef>
-              <a:buFont typeface="Arial" panose="020B0604020202020204" pitchFamily="34" charset="0"/>
-              <a:buChar char="•"/>
-            </a:pPr>
-            <a:r>
-              <a:rPr lang="uk-UA" sz="2600" dirty="0">
-                <a:latin typeface="Calibri" panose="020F0502020204030204" pitchFamily="34" charset="0"/>
-                <a:cs typeface="Calibri" panose="020F0502020204030204" pitchFamily="34" charset="0"/>
-              </a:rPr>
-              <a:t>Підтримка </a:t>
-            </a:r>
-            <a:r>
-              <a:rPr lang="en-US" sz="2600" dirty="0">
-                <a:latin typeface="Calibri" panose="020F0502020204030204" pitchFamily="34" charset="0"/>
-                <a:cs typeface="Calibri" panose="020F0502020204030204" pitchFamily="34" charset="0"/>
-              </a:rPr>
-              <a:t>GCD - Grand Central Dispatch </a:t>
-            </a:r>
-            <a:endParaRPr lang="uk-UA" sz="2600" dirty="0">
-              <a:latin typeface="Calibri" panose="020F0502020204030204" pitchFamily="34" charset="0"/>
-              <a:cs typeface="Calibri" panose="020F0502020204030204" pitchFamily="34" charset="0"/>
-            </a:endParaRPr>
+              <a:t>Опціонали</a:t>
+            </a:r>
           </a:p>
         </p:txBody>
       </p:sp>
@@ -18318,6 +20113,36 @@
           </a:p>
         </p:txBody>
       </p:sp>
+      <p:pic>
+        <p:nvPicPr>
+          <p:cNvPr id="9" name="Рисунок 8">
+            <a:extLst>
+              <a:ext uri="{FF2B5EF4-FFF2-40B4-BE49-F238E27FC236}">
+                <a16:creationId xmlns:a16="http://schemas.microsoft.com/office/drawing/2014/main" id="{1FAFF0BC-9902-443B-B4A9-89CCC005ACBE}"/>
+              </a:ext>
+            </a:extLst>
+          </p:cNvPr>
+          <p:cNvPicPr>
+            <a:picLocks noChangeAspect="1"/>
+          </p:cNvPicPr>
+          <p:nvPr/>
+        </p:nvPicPr>
+        <p:blipFill>
+          <a:blip r:embed="rId3"/>
+          <a:stretch>
+            <a:fillRect/>
+          </a:stretch>
+        </p:blipFill>
+        <p:spPr>
+          <a:xfrm>
+            <a:off x="1924050" y="2419767"/>
+            <a:ext cx="5695950" cy="3936583"/>
+          </a:xfrm>
+          <a:prstGeom prst="rect">
+            <a:avLst/>
+          </a:prstGeom>
+        </p:spPr>
+      </p:pic>
     </p:spTree>
     <p:extLst>
       <p:ext uri="{BB962C8B-B14F-4D97-AF65-F5344CB8AC3E}">
@@ -18384,125 +20209,7 @@
                 <a:ea typeface="Fira Code" pitchFamily="1" charset="0"/>
                 <a:cs typeface="Fira Code" pitchFamily="1" charset="0"/>
               </a:rPr>
-              <a:t>Інтероперабельність</a:t>
-            </a:r>
-          </a:p>
-        </p:txBody>
-      </p:sp>
-      <p:sp>
-        <p:nvSpPr>
-          <p:cNvPr id="3" name="Місце для вмісту 2">
-            <a:extLst>
-              <a:ext uri="{FF2B5EF4-FFF2-40B4-BE49-F238E27FC236}">
-                <a16:creationId xmlns:a16="http://schemas.microsoft.com/office/drawing/2014/main" id="{95B371F2-DBA5-415A-82C8-651F587B857A}"/>
-              </a:ext>
-            </a:extLst>
-          </p:cNvPr>
-          <p:cNvSpPr>
-            <a:spLocks noGrp="1"/>
-          </p:cNvSpPr>
-          <p:nvPr>
-            <p:ph type="body" idx="1"/>
-          </p:nvPr>
-        </p:nvSpPr>
-        <p:spPr>
-          <a:xfrm>
-            <a:off x="1167492" y="2653167"/>
-            <a:ext cx="9779183" cy="3436483"/>
-          </a:xfrm>
-        </p:spPr>
-        <p:txBody>
-          <a:bodyPr vert="horz" lIns="91440" tIns="45720" rIns="91440" bIns="45720" rtlCol="0" anchor="t">
-            <a:normAutofit/>
-          </a:bodyPr>
-          <a:lstStyle/>
-          <a:p>
-            <a:pPr marL="342900" indent="-342900" rtl="0">
-              <a:spcBef>
-                <a:spcPts val="0"/>
-              </a:spcBef>
-              <a:buFont typeface="Arial" panose="020B0604020202020204" pitchFamily="34" charset="0"/>
-              <a:buChar char="•"/>
-            </a:pPr>
-            <a:r>
-              <a:rPr lang="uk-UA" sz="2600" dirty="0">
-                <a:latin typeface="Calibri" panose="020F0502020204030204" pitchFamily="34" charset="0"/>
-                <a:cs typeface="Calibri" panose="020F0502020204030204" pitchFamily="34" charset="0"/>
-              </a:rPr>
-              <a:t>Сумісність з </a:t>
-            </a:r>
-            <a:r>
-              <a:rPr lang="en-US" sz="2600" dirty="0">
-                <a:latin typeface="Calibri" panose="020F0502020204030204" pitchFamily="34" charset="0"/>
-                <a:cs typeface="Calibri" panose="020F0502020204030204" pitchFamily="34" charset="0"/>
-              </a:rPr>
-              <a:t>Objective-C</a:t>
-            </a:r>
-          </a:p>
-          <a:p>
-            <a:pPr marL="342900" indent="-342900" rtl="0">
-              <a:spcBef>
-                <a:spcPts val="0"/>
-              </a:spcBef>
-              <a:buFont typeface="Arial" panose="020B0604020202020204" pitchFamily="34" charset="0"/>
-              <a:buChar char="•"/>
-            </a:pPr>
-            <a:r>
-              <a:rPr lang="uk-UA" sz="2600" dirty="0">
-                <a:latin typeface="Calibri" panose="020F0502020204030204" pitchFamily="34" charset="0"/>
-                <a:cs typeface="Calibri" panose="020F0502020204030204" pitchFamily="34" charset="0"/>
-              </a:rPr>
-              <a:t>Використання обидвох мов у </a:t>
-            </a:r>
-            <a:r>
-              <a:rPr lang="uk-UA" sz="2600" dirty="0" err="1">
-                <a:latin typeface="Calibri" panose="020F0502020204030204" pitchFamily="34" charset="0"/>
-                <a:cs typeface="Calibri" panose="020F0502020204030204" pitchFamily="34" charset="0"/>
-              </a:rPr>
-              <a:t>проєктах</a:t>
-            </a:r>
-            <a:endParaRPr lang="uk-UA" sz="2600" dirty="0">
-              <a:latin typeface="Calibri" panose="020F0502020204030204" pitchFamily="34" charset="0"/>
-              <a:cs typeface="Calibri" panose="020F0502020204030204" pitchFamily="34" charset="0"/>
-            </a:endParaRPr>
-          </a:p>
-          <a:p>
-            <a:pPr marL="342900" indent="-342900" rtl="0">
-              <a:spcBef>
-                <a:spcPts val="0"/>
-              </a:spcBef>
-              <a:buFont typeface="Arial" panose="020B0604020202020204" pitchFamily="34" charset="0"/>
-              <a:buChar char="•"/>
-            </a:pPr>
-            <a:r>
-              <a:rPr lang="uk-UA" sz="2600" dirty="0">
-                <a:latin typeface="Calibri" panose="020F0502020204030204" pitchFamily="34" charset="0"/>
-                <a:cs typeface="Calibri" panose="020F0502020204030204" pitchFamily="34" charset="0"/>
-              </a:rPr>
-              <a:t>Підтримка бібліотек </a:t>
-            </a:r>
-            <a:r>
-              <a:rPr lang="en-US" sz="2600" dirty="0">
-                <a:latin typeface="Calibri" panose="020F0502020204030204" pitchFamily="34" charset="0"/>
-                <a:cs typeface="Calibri" panose="020F0502020204030204" pitchFamily="34" charset="0"/>
-              </a:rPr>
-              <a:t>Objective-C</a:t>
-            </a:r>
-          </a:p>
-          <a:p>
-            <a:pPr marL="342900" indent="-342900" rtl="0">
-              <a:spcBef>
-                <a:spcPts val="0"/>
-              </a:spcBef>
-              <a:buFont typeface="Arial" panose="020B0604020202020204" pitchFamily="34" charset="0"/>
-              <a:buChar char="•"/>
-            </a:pPr>
-            <a:r>
-              <a:rPr lang="uk-UA" sz="2600" dirty="0">
-                <a:latin typeface="Calibri" panose="020F0502020204030204" pitchFamily="34" charset="0"/>
-                <a:cs typeface="Calibri" panose="020F0502020204030204" pitchFamily="34" charset="0"/>
-              </a:rPr>
-              <a:t>Підтримка С та С++ коду й бібліотек</a:t>
+              <a:t>Приведення типів</a:t>
             </a:r>
           </a:p>
         </p:txBody>
@@ -18578,6 +20285,36 @@
           </a:p>
         </p:txBody>
       </p:sp>
+      <p:pic>
+        <p:nvPicPr>
+          <p:cNvPr id="11" name="Рисунок 10">
+            <a:extLst>
+              <a:ext uri="{FF2B5EF4-FFF2-40B4-BE49-F238E27FC236}">
+                <a16:creationId xmlns:a16="http://schemas.microsoft.com/office/drawing/2014/main" id="{F4196B30-EA26-4CDA-BC47-EBE278A5CCAC}"/>
+              </a:ext>
+            </a:extLst>
+          </p:cNvPr>
+          <p:cNvPicPr>
+            <a:picLocks noChangeAspect="1"/>
+          </p:cNvPicPr>
+          <p:nvPr/>
+        </p:nvPicPr>
+        <p:blipFill>
+          <a:blip r:embed="rId3"/>
+          <a:stretch>
+            <a:fillRect/>
+          </a:stretch>
+        </p:blipFill>
+        <p:spPr>
+          <a:xfrm>
+            <a:off x="381000" y="2959038"/>
+            <a:ext cx="10239375" cy="2757270"/>
+          </a:xfrm>
+          <a:prstGeom prst="rect">
+            <a:avLst/>
+          </a:prstGeom>
+        </p:spPr>
+      </p:pic>
     </p:spTree>
     <p:extLst>
       <p:ext uri="{BB962C8B-B14F-4D97-AF65-F5344CB8AC3E}">
@@ -19405,15 +21142,6 @@
 </file>
 
 <file path=customXml/item2.xml><?xml version="1.0" encoding="utf-8"?>
-<?mso-contentType ?>
-<FormTemplates xmlns="http://schemas.microsoft.com/sharepoint/v3/contenttype/forms">
-  <Display>DocumentLibraryForm</Display>
-  <Edit>DocumentLibraryForm</Edit>
-  <New>DocumentLibraryForm</New>
-</FormTemplates>
-</file>
-
-<file path=customXml/item3.xml><?xml version="1.0" encoding="utf-8"?>
 <ct:contentTypeSchema xmlns:ct="http://schemas.microsoft.com/office/2006/metadata/contentType" xmlns:ma="http://schemas.microsoft.com/office/2006/metadata/properties/metaAttributes" ct:_="" ma:_="" ma:contentTypeName="Document" ma:contentTypeID="0x01010079F111ED35F8CC479449609E8A0923A6" ma:contentTypeVersion="21" ma:contentTypeDescription="Create a new document." ma:contentTypeScope="" ma:versionID="64dfb1555687e0874b4304b796b5b0c7">
   <xsd:schema xmlns:xsd="http://www.w3.org/2001/XMLSchema" xmlns:xs="http://www.w3.org/2001/XMLSchema" xmlns:p="http://schemas.microsoft.com/office/2006/metadata/properties" xmlns:ns1="http://schemas.microsoft.com/sharepoint/v3" xmlns:ns2="71af3243-3dd4-4a8d-8c0d-dd76da1f02a5" xmlns:ns3="16c05727-aa75-4e4a-9b5f-8a80a1165891" xmlns:ns4="230e9df3-be65-4c73-a93b-d1236ebd677e" targetNamespace="http://schemas.microsoft.com/office/2006/metadata/properties" ma:root="true" ma:fieldsID="e6e4c555b5e194d05b7203de9c4567b3" ns1:_="" ns2:_="" ns3:_="" ns4:_="">
     <xsd:import namespace="http://schemas.microsoft.com/sharepoint/v3"/>
@@ -19695,6 +21423,15 @@
 </ct:contentTypeSchema>
 </file>
 
+<file path=customXml/item3.xml><?xml version="1.0" encoding="utf-8"?>
+<?mso-contentType ?>
+<FormTemplates xmlns="http://schemas.microsoft.com/sharepoint/v3/contenttype/forms">
+  <Display>DocumentLibraryForm</Display>
+  <Edit>DocumentLibraryForm</Edit>
+  <New>DocumentLibraryForm</New>
+</FormTemplates>
+</file>
+
 <file path=customXml/itemProps1.xml><?xml version="1.0" encoding="utf-8"?>
 <ds:datastoreItem xmlns:ds="http://schemas.openxmlformats.org/officeDocument/2006/customXml" ds:itemID="{4D5BAB77-79E1-4739-AA51-10C9079186D6}">
   <ds:schemaRefs>
@@ -19708,14 +21445,6 @@
 </file>
 
 <file path=customXml/itemProps2.xml><?xml version="1.0" encoding="utf-8"?>
-<ds:datastoreItem xmlns:ds="http://schemas.openxmlformats.org/officeDocument/2006/customXml" ds:itemID="{85334180-0405-413B-834A-44FA9E05ADB7}">
-  <ds:schemaRefs>
-    <ds:schemaRef ds:uri="http://schemas.microsoft.com/sharepoint/v3/contenttype/forms"/>
-  </ds:schemaRefs>
-</ds:datastoreItem>
-</file>
-
-<file path=customXml/itemProps3.xml><?xml version="1.0" encoding="utf-8"?>
 <ds:datastoreItem xmlns:ds="http://schemas.openxmlformats.org/officeDocument/2006/customXml" ds:itemID="{4A615295-94F6-4CE2-A1B1-6B7E1DAA5AD6}">
   <ds:schemaRefs>
     <ds:schemaRef ds:uri="http://schemas.microsoft.com/office/2006/metadata/contentType"/>
@@ -19736,6 +21465,14 @@
 </ds:datastoreItem>
 </file>
 
+<file path=customXml/itemProps3.xml><?xml version="1.0" encoding="utf-8"?>
+<ds:datastoreItem xmlns:ds="http://schemas.openxmlformats.org/officeDocument/2006/customXml" ds:itemID="{85334180-0405-413B-834A-44FA9E05ADB7}">
+  <ds:schemaRefs>
+    <ds:schemaRef ds:uri="http://schemas.microsoft.com/sharepoint/v3/contenttype/forms"/>
+  </ds:schemaRefs>
+</ds:datastoreItem>
+</file>
+
 <file path=docMetadata/LabelInfo.xml><?xml version="1.0" encoding="utf-8"?>
 <clbl:labelList xmlns:clbl="http://schemas.microsoft.com/office/2020/mipLabelMetadata">
   <clbl:label id="{f42aa342-8706-4288-bd11-ebb85995028c}" enabled="1" method="Standard" siteId="{72f988bf-86f1-41af-91ab-2d7cd011db47}" removed="0"/>

</xml_diff>

<commit_message>
Thursday, April 20, 2023, 1:23:50 AM Eastern European Summer Time
</commit_message>
<xml_diff>
--- a/year1-term2/SS/ct1/presentation.pptx
+++ b/year1-term2/SS/ct1/presentation.pptx
@@ -1203,7 +1203,7 @@
             <a:pPr rtl="0"/>
             <a:fld id="{32E7F8A8-D86C-42F1-9B11-EA147C604B36}" type="datetime1">
               <a:rPr lang="uk-UA" smtClean="0"/>
-              <a:t>19.04.2023</a:t>
+              <a:t>20.04.2023</a:t>
             </a:fld>
             <a:endParaRPr lang="uk-UA"/>
           </a:p>
@@ -1385,7 +1385,7 @@
             <a:pPr rtl="0"/>
             <a:fld id="{4D18E05A-B548-4CC6-A371-C61575643AD7}" type="datetime1">
               <a:rPr lang="uk-UA" noProof="0" smtClean="0"/>
-              <a:t>19.04.2023</a:t>
+              <a:t>20.04.2023</a:t>
             </a:fld>
             <a:endParaRPr lang="uk-UA" noProof="0"/>
           </a:p>
@@ -4968,7 +4968,7 @@
   <p:clrMapOvr>
     <a:masterClrMapping/>
   </p:clrMapOvr>
-  <p:transition>
+  <p:transition spd="slow">
     <p:push dir="u"/>
   </p:transition>
 </p:sldLayout>
@@ -5409,7 +5409,7 @@
               <a:rPr lang="uk-UA" noProof="0" smtClean="0">
                 <a:latin typeface="Arial" panose="020B0604020202020204" pitchFamily="34" charset="0"/>
               </a:rPr>
-              <a:t>19.04.2023</a:t>
+              <a:t>20.04.2023</a:t>
             </a:fld>
             <a:endParaRPr lang="uk-UA" noProof="0">
               <a:latin typeface="Arial" panose="020B0604020202020204" pitchFamily="34" charset="0"/>
@@ -5530,7 +5530,7 @@
   <p:clrMapOvr>
     <a:masterClrMapping/>
   </p:clrMapOvr>
-  <p:transition>
+  <p:transition spd="slow">
     <p:push dir="u"/>
   </p:transition>
 </p:sldLayout>
@@ -6324,7 +6324,7 @@
               <a:rPr lang="uk-UA" noProof="0" smtClean="0">
                 <a:latin typeface="Arial" panose="020B0604020202020204" pitchFamily="34" charset="0"/>
               </a:rPr>
-              <a:t>19.04.2023</a:t>
+              <a:t>20.04.2023</a:t>
             </a:fld>
             <a:endParaRPr lang="uk-UA" noProof="0">
               <a:latin typeface="Arial" panose="020B0604020202020204" pitchFamily="34" charset="0"/>
@@ -6745,7 +6745,7 @@
   <p:clrMapOvr>
     <a:masterClrMapping/>
   </p:clrMapOvr>
-  <p:transition>
+  <p:transition spd="slow">
     <p:push dir="u"/>
   </p:transition>
 </p:sldLayout>
@@ -7539,7 +7539,7 @@
               <a:rPr lang="uk-UA" noProof="0" smtClean="0">
                 <a:latin typeface="Arial" panose="020B0604020202020204" pitchFamily="34" charset="0"/>
               </a:rPr>
-              <a:t>19.04.2023</a:t>
+              <a:t>20.04.2023</a:t>
             </a:fld>
             <a:endParaRPr lang="uk-UA" noProof="0">
               <a:latin typeface="Arial" panose="020B0604020202020204" pitchFamily="34" charset="0"/>
@@ -8160,7 +8160,7 @@
   <p:clrMapOvr>
     <a:masterClrMapping/>
   </p:clrMapOvr>
-  <p:transition>
+  <p:transition spd="slow">
     <p:push dir="u"/>
   </p:transition>
 </p:sldLayout>
@@ -8893,7 +8893,7 @@
   <p:clrMapOvr>
     <a:masterClrMapping/>
   </p:clrMapOvr>
-  <p:transition>
+  <p:transition spd="slow">
     <p:push dir="u"/>
   </p:transition>
 </p:sldLayout>
@@ -9687,7 +9687,7 @@
               <a:rPr lang="uk-UA" noProof="0" smtClean="0">
                 <a:latin typeface="Arial" panose="020B0604020202020204" pitchFamily="34" charset="0"/>
               </a:rPr>
-              <a:t>19.04.2023</a:t>
+              <a:t>20.04.2023</a:t>
             </a:fld>
             <a:endParaRPr lang="uk-UA" noProof="0">
               <a:latin typeface="Arial" panose="020B0604020202020204" pitchFamily="34" charset="0"/>
@@ -9808,7 +9808,7 @@
   <p:clrMapOvr>
     <a:masterClrMapping/>
   </p:clrMapOvr>
-  <p:transition>
+  <p:transition spd="slow">
     <p:push dir="u"/>
   </p:transition>
 </p:sldLayout>
@@ -10433,7 +10433,7 @@
               <a:rPr lang="uk-UA" noProof="0" smtClean="0">
                 <a:latin typeface="Arial" panose="020B0604020202020204" pitchFamily="34" charset="0"/>
               </a:rPr>
-              <a:t>19.04.2023</a:t>
+              <a:t>20.04.2023</a:t>
             </a:fld>
             <a:endParaRPr lang="uk-UA" noProof="0">
               <a:latin typeface="Arial" panose="020B0604020202020204" pitchFamily="34" charset="0"/>
@@ -10543,7 +10543,7 @@
   <p:clrMapOvr>
     <a:masterClrMapping/>
   </p:clrMapOvr>
-  <p:transition>
+  <p:transition spd="slow">
     <p:push dir="u"/>
   </p:transition>
 </p:sldLayout>
@@ -11291,7 +11291,7 @@
   <p:clrMapOvr>
     <a:masterClrMapping/>
   </p:clrMapOvr>
-  <p:transition>
+  <p:transition spd="slow">
     <p:push dir="u"/>
   </p:transition>
 </p:sldLayout>
@@ -11706,7 +11706,7 @@
               <a:rPr lang="uk-UA" noProof="0" smtClean="0">
                 <a:latin typeface="Arial" panose="020B0604020202020204" pitchFamily="34" charset="0"/>
               </a:rPr>
-              <a:t>19.04.2023</a:t>
+              <a:t>20.04.2023</a:t>
             </a:fld>
             <a:endParaRPr lang="uk-UA" noProof="0">
               <a:latin typeface="Arial" panose="020B0604020202020204" pitchFamily="34" charset="0"/>
@@ -11827,7 +11827,7 @@
   <p:clrMapOvr>
     <a:masterClrMapping/>
   </p:clrMapOvr>
-  <p:transition>
+  <p:transition spd="slow">
     <p:push dir="u"/>
   </p:transition>
 </p:sldLayout>
@@ -12323,7 +12323,7 @@
               <a:rPr lang="uk-UA" noProof="0" smtClean="0">
                 <a:latin typeface="Arial" panose="020B0604020202020204" pitchFamily="34" charset="0"/>
               </a:rPr>
-              <a:t>19.04.2023</a:t>
+              <a:t>20.04.2023</a:t>
             </a:fld>
             <a:endParaRPr lang="uk-UA" noProof="0">
               <a:latin typeface="Arial" panose="020B0604020202020204" pitchFamily="34" charset="0"/>
@@ -12444,7 +12444,7 @@
   <p:clrMapOvr>
     <a:masterClrMapping/>
   </p:clrMapOvr>
-  <p:transition>
+  <p:transition spd="slow">
     <p:push dir="u"/>
   </p:transition>
 </p:sldLayout>
@@ -12814,7 +12814,7 @@
               <a:rPr lang="uk-UA" noProof="0" smtClean="0">
                 <a:latin typeface="Arial" panose="020B0604020202020204" pitchFamily="34" charset="0"/>
               </a:rPr>
-              <a:t>19.04.2023</a:t>
+              <a:t>20.04.2023</a:t>
             </a:fld>
             <a:endParaRPr lang="uk-UA" noProof="0">
               <a:latin typeface="Arial" panose="020B0604020202020204" pitchFamily="34" charset="0"/>
@@ -12919,7 +12919,7 @@
   <p:clrMapOvr>
     <a:masterClrMapping/>
   </p:clrMapOvr>
-  <p:transition>
+  <p:transition spd="slow">
     <p:push dir="u"/>
   </p:transition>
 </p:sldLayout>
@@ -13694,7 +13694,7 @@
               <a:rPr lang="uk-UA" noProof="0" smtClean="0">
                 <a:latin typeface="Arial" panose="020B0604020202020204" pitchFamily="34" charset="0"/>
               </a:rPr>
-              <a:t>19.04.2023</a:t>
+              <a:t>20.04.2023</a:t>
             </a:fld>
             <a:endParaRPr lang="uk-UA" noProof="0">
               <a:latin typeface="Arial" panose="020B0604020202020204" pitchFamily="34" charset="0"/>
@@ -14652,7 +14652,7 @@
   <p:clrMapOvr>
     <a:masterClrMapping/>
   </p:clrMapOvr>
-  <p:transition>
+  <p:transition spd="slow">
     <p:push dir="u"/>
   </p:transition>
 </p:sldLayout>
@@ -15987,7 +15987,7 @@
               <a:rPr lang="uk-UA" noProof="0" smtClean="0">
                 <a:latin typeface="Arial" panose="020B0604020202020204" pitchFamily="34" charset="0"/>
               </a:rPr>
-              <a:t>19.04.2023</a:t>
+              <a:t>20.04.2023</a:t>
             </a:fld>
             <a:endParaRPr lang="uk-UA" noProof="0">
               <a:latin typeface="Arial" panose="020B0604020202020204" pitchFamily="34" charset="0"/>
@@ -16092,7 +16092,7 @@
   <p:clrMapOvr>
     <a:masterClrMapping/>
   </p:clrMapOvr>
-  <p:transition>
+  <p:transition spd="slow">
     <p:push dir="u"/>
   </p:transition>
 </p:sldLayout>
@@ -16272,7 +16272,7 @@
                 <a:latin typeface="Arial" panose="020B0604020202020204" pitchFamily="34" charset="0"/>
                 <a:cs typeface="Arial" panose="020B0604020202020204" pitchFamily="34" charset="0"/>
               </a:rPr>
-              <a:t>19.04.2023</a:t>
+              <a:t>20.04.2023</a:t>
             </a:fld>
             <a:endParaRPr lang="uk-UA" noProof="0">
               <a:latin typeface="Arial" panose="020B0604020202020204" pitchFamily="34" charset="0"/>
@@ -16409,7 +16409,7 @@
     <p:sldLayoutId id="2147483665" r:id="rId12"/>
     <p:sldLayoutId id="2147483666" r:id="rId13"/>
   </p:sldLayoutIdLst>
-  <p:transition>
+  <p:transition spd="slow">
     <p:push dir="u"/>
   </p:transition>
   <p:hf hdr="0"/>
@@ -16898,7 +16898,7 @@
     <a:masterClrMapping/>
   </p:clrMapOvr>
   <p:transition spd="slow">
-    <p:push/>
+    <p:push dir="u"/>
   </p:transition>
   <p:timing>
     <p:tnLst>
@@ -17220,7 +17220,7 @@
             <a:pPr rtl="0"/>
             <a:fld id="{2B3FECCB-B4D4-4C4B-87FB-97861EE1F201}" type="datetime1">
               <a:rPr lang="uk-UA" smtClean="0"/>
-              <a:t>19.04.2023</a:t>
+              <a:t>20.04.2023</a:t>
             </a:fld>
             <a:endParaRPr lang="uk-UA"/>
           </a:p>
@@ -17332,7 +17332,7 @@
   <p:clrMapOvr>
     <a:masterClrMapping/>
   </p:clrMapOvr>
-  <p:transition>
+  <p:transition spd="slow">
     <p:push dir="u"/>
   </p:transition>
 </p:sld>
@@ -17504,7 +17504,7 @@
   <p:clrMapOvr>
     <a:masterClrMapping/>
   </p:clrMapOvr>
-  <p:transition>
+  <p:transition spd="slow">
     <p:push dir="u"/>
   </p:transition>
 </p:sld>
@@ -17676,7 +17676,7 @@
   <p:clrMapOvr>
     <a:masterClrMapping/>
   </p:clrMapOvr>
-  <p:transition>
+  <p:transition spd="slow">
     <p:push dir="u"/>
   </p:transition>
 </p:sld>
@@ -17848,7 +17848,7 @@
   <p:clrMapOvr>
     <a:masterClrMapping/>
   </p:clrMapOvr>
-  <p:transition>
+  <p:transition spd="slow">
     <p:push dir="u"/>
   </p:transition>
 </p:sld>
@@ -17919,7 +17919,7 @@
   <p:clrMapOvr>
     <a:masterClrMapping/>
   </p:clrMapOvr>
-  <p:transition>
+  <p:transition spd="slow">
     <p:push dir="u"/>
   </p:transition>
 </p:sld>
@@ -17990,7 +17990,7 @@
   <p:clrMapOvr>
     <a:masterClrMapping/>
   </p:clrMapOvr>
-  <p:transition>
+  <p:transition spd="slow">
     <p:push dir="u"/>
   </p:transition>
 </p:sld>
@@ -18414,7 +18414,7 @@
             <a:pPr rtl="0"/>
             <a:fld id="{3B858B8C-D206-4863-8601-4D8E5135AABC}" type="datetime1">
               <a:rPr lang="uk-UA" smtClean="0"/>
-              <a:t>19.04.2023</a:t>
+              <a:t>20.04.2023</a:t>
             </a:fld>
             <a:endParaRPr lang="uk-UA"/>
           </a:p>
@@ -18466,7 +18466,7 @@
   <p:clrMapOvr>
     <a:masterClrMapping/>
   </p:clrMapOvr>
-  <p:transition>
+  <p:transition spd="slow">
     <p:push dir="u"/>
   </p:transition>
 </p:sld>
@@ -18556,7 +18556,7 @@
             <a:pPr rtl="0"/>
             <a:fld id="{2B3FECCB-B4D4-4C4B-87FB-97861EE1F201}" type="datetime1">
               <a:rPr lang="uk-UA" smtClean="0"/>
-              <a:t>19.04.2023</a:t>
+              <a:t>20.04.2023</a:t>
             </a:fld>
             <a:endParaRPr lang="uk-UA"/>
           </a:p>
@@ -18975,7 +18975,7 @@
   <p:clrMapOvr>
     <a:masterClrMapping/>
   </p:clrMapOvr>
-  <p:transition>
+  <p:transition spd="slow">
     <p:push dir="u"/>
   </p:transition>
 </p:sld>
@@ -19065,7 +19065,7 @@
             <a:pPr rtl="0"/>
             <a:fld id="{2B3FECCB-B4D4-4C4B-87FB-97861EE1F201}" type="datetime1">
               <a:rPr lang="uk-UA" smtClean="0"/>
-              <a:t>19.04.2023</a:t>
+              <a:t>20.04.2023</a:t>
             </a:fld>
             <a:endParaRPr lang="uk-UA"/>
           </a:p>
@@ -19145,7 +19145,7 @@
   <p:clrMapOvr>
     <a:masterClrMapping/>
   </p:clrMapOvr>
-  <p:transition>
+  <p:transition spd="slow">
     <p:push dir="u"/>
   </p:transition>
 </p:sld>
@@ -19235,7 +19235,7 @@
             <a:pPr rtl="0"/>
             <a:fld id="{2B3FECCB-B4D4-4C4B-87FB-97861EE1F201}" type="datetime1">
               <a:rPr lang="uk-UA" smtClean="0"/>
-              <a:t>19.04.2023</a:t>
+              <a:t>20.04.2023</a:t>
             </a:fld>
             <a:endParaRPr lang="uk-UA"/>
           </a:p>
@@ -19377,7 +19377,7 @@
   <p:clrMapOvr>
     <a:masterClrMapping/>
   </p:clrMapOvr>
-  <p:transition>
+  <p:transition spd="slow">
     <p:push dir="u"/>
   </p:transition>
 </p:sld>
@@ -19809,7 +19809,7 @@
   <p:clrMapOvr>
     <a:masterClrMapping/>
   </p:clrMapOvr>
-  <p:transition>
+  <p:transition spd="slow">
     <p:push dir="u"/>
   </p:transition>
 </p:sld>
@@ -19899,7 +19899,7 @@
             <a:pPr rtl="0"/>
             <a:fld id="{2B3FECCB-B4D4-4C4B-87FB-97861EE1F201}" type="datetime1">
               <a:rPr lang="uk-UA" smtClean="0"/>
-              <a:t>19.04.2023</a:t>
+              <a:t>20.04.2023</a:t>
             </a:fld>
             <a:endParaRPr lang="uk-UA"/>
           </a:p>
@@ -19981,7 +19981,7 @@
   <p:clrMapOvr>
     <a:masterClrMapping/>
   </p:clrMapOvr>
-  <p:transition>
+  <p:transition spd="slow">
     <p:push dir="u"/>
   </p:transition>
 </p:sld>
@@ -20071,7 +20071,7 @@
             <a:pPr rtl="0"/>
             <a:fld id="{2B3FECCB-B4D4-4C4B-87FB-97861EE1F201}" type="datetime1">
               <a:rPr lang="uk-UA" smtClean="0"/>
-              <a:t>19.04.2023</a:t>
+              <a:t>20.04.2023</a:t>
             </a:fld>
             <a:endParaRPr lang="uk-UA"/>
           </a:p>
@@ -20153,7 +20153,7 @@
   <p:clrMapOvr>
     <a:masterClrMapping/>
   </p:clrMapOvr>
-  <p:transition>
+  <p:transition spd="slow">
     <p:push dir="u"/>
   </p:transition>
 </p:sld>
@@ -20243,7 +20243,7 @@
             <a:pPr rtl="0"/>
             <a:fld id="{2B3FECCB-B4D4-4C4B-87FB-97861EE1F201}" type="datetime1">
               <a:rPr lang="uk-UA" smtClean="0"/>
-              <a:t>19.04.2023</a:t>
+              <a:t>20.04.2023</a:t>
             </a:fld>
             <a:endParaRPr lang="uk-UA"/>
           </a:p>
@@ -20325,7 +20325,7 @@
   <p:clrMapOvr>
     <a:masterClrMapping/>
   </p:clrMapOvr>
-  <p:transition>
+  <p:transition spd="slow">
     <p:push dir="u"/>
   </p:transition>
 </p:sld>
@@ -21123,25 +21123,6 @@
 </file>
 
 <file path=customXml/item1.xml><?xml version="1.0" encoding="utf-8"?>
-<p:properties xmlns:p="http://schemas.microsoft.com/office/2006/metadata/properties" xmlns:xsi="http://www.w3.org/2001/XMLSchema-instance" xmlns:pc="http://schemas.microsoft.com/office/infopath/2007/PartnerControls">
-  <documentManagement>
-    <_ip_UnifiedCompliancePolicyUIAction xmlns="http://schemas.microsoft.com/sharepoint/v3" xsi:nil="true"/>
-    <Image xmlns="71af3243-3dd4-4a8d-8c0d-dd76da1f02a5">
-      <Url xsi:nil="true"/>
-      <Description xsi:nil="true"/>
-    </Image>
-    <Status xmlns="71af3243-3dd4-4a8d-8c0d-dd76da1f02a5">Not started</Status>
-    <_ip_UnifiedCompliancePolicyProperties xmlns="http://schemas.microsoft.com/sharepoint/v3" xsi:nil="true"/>
-    <ImageTagsTaxHTField xmlns="71af3243-3dd4-4a8d-8c0d-dd76da1f02a5">
-      <Terms xmlns="http://schemas.microsoft.com/office/infopath/2007/PartnerControls"/>
-    </ImageTagsTaxHTField>
-    <TaxCatchAll xmlns="230e9df3-be65-4c73-a93b-d1236ebd677e"/>
-    <MediaServiceKeyPoints xmlns="71af3243-3dd4-4a8d-8c0d-dd76da1f02a5" xsi:nil="true"/>
-  </documentManagement>
-</p:properties>
-</file>
-
-<file path=customXml/item2.xml><?xml version="1.0" encoding="utf-8"?>
 <ct:contentTypeSchema xmlns:ct="http://schemas.microsoft.com/office/2006/metadata/contentType" xmlns:ma="http://schemas.microsoft.com/office/2006/metadata/properties/metaAttributes" ct:_="" ma:_="" ma:contentTypeName="Document" ma:contentTypeID="0x01010079F111ED35F8CC479449609E8A0923A6" ma:contentTypeVersion="21" ma:contentTypeDescription="Create a new document." ma:contentTypeScope="" ma:versionID="64dfb1555687e0874b4304b796b5b0c7">
   <xsd:schema xmlns:xsd="http://www.w3.org/2001/XMLSchema" xmlns:xs="http://www.w3.org/2001/XMLSchema" xmlns:p="http://schemas.microsoft.com/office/2006/metadata/properties" xmlns:ns1="http://schemas.microsoft.com/sharepoint/v3" xmlns:ns2="71af3243-3dd4-4a8d-8c0d-dd76da1f02a5" xmlns:ns3="16c05727-aa75-4e4a-9b5f-8a80a1165891" xmlns:ns4="230e9df3-be65-4c73-a93b-d1236ebd677e" targetNamespace="http://schemas.microsoft.com/office/2006/metadata/properties" ma:root="true" ma:fieldsID="e6e4c555b5e194d05b7203de9c4567b3" ns1:_="" ns2:_="" ns3:_="" ns4:_="">
     <xsd:import namespace="http://schemas.microsoft.com/sharepoint/v3"/>
@@ -21423,6 +21404,25 @@
 </ct:contentTypeSchema>
 </file>
 
+<file path=customXml/item2.xml><?xml version="1.0" encoding="utf-8"?>
+<p:properties xmlns:p="http://schemas.microsoft.com/office/2006/metadata/properties" xmlns:xsi="http://www.w3.org/2001/XMLSchema-instance" xmlns:pc="http://schemas.microsoft.com/office/infopath/2007/PartnerControls">
+  <documentManagement>
+    <_ip_UnifiedCompliancePolicyUIAction xmlns="http://schemas.microsoft.com/sharepoint/v3" xsi:nil="true"/>
+    <Image xmlns="71af3243-3dd4-4a8d-8c0d-dd76da1f02a5">
+      <Url xsi:nil="true"/>
+      <Description xsi:nil="true"/>
+    </Image>
+    <Status xmlns="71af3243-3dd4-4a8d-8c0d-dd76da1f02a5">Not started</Status>
+    <_ip_UnifiedCompliancePolicyProperties xmlns="http://schemas.microsoft.com/sharepoint/v3" xsi:nil="true"/>
+    <ImageTagsTaxHTField xmlns="71af3243-3dd4-4a8d-8c0d-dd76da1f02a5">
+      <Terms xmlns="http://schemas.microsoft.com/office/infopath/2007/PartnerControls"/>
+    </ImageTagsTaxHTField>
+    <TaxCatchAll xmlns="230e9df3-be65-4c73-a93b-d1236ebd677e"/>
+    <MediaServiceKeyPoints xmlns="71af3243-3dd4-4a8d-8c0d-dd76da1f02a5" xsi:nil="true"/>
+  </documentManagement>
+</p:properties>
+</file>
+
 <file path=customXml/item3.xml><?xml version="1.0" encoding="utf-8"?>
 <?mso-contentType ?>
 <FormTemplates xmlns="http://schemas.microsoft.com/sharepoint/v3/contenttype/forms">
@@ -21433,18 +21433,6 @@
 </file>
 
 <file path=customXml/itemProps1.xml><?xml version="1.0" encoding="utf-8"?>
-<ds:datastoreItem xmlns:ds="http://schemas.openxmlformats.org/officeDocument/2006/customXml" ds:itemID="{4D5BAB77-79E1-4739-AA51-10C9079186D6}">
-  <ds:schemaRefs>
-    <ds:schemaRef ds:uri="http://schemas.microsoft.com/office/2006/metadata/properties"/>
-    <ds:schemaRef ds:uri="http://schemas.microsoft.com/office/infopath/2007/PartnerControls"/>
-    <ds:schemaRef ds:uri="http://schemas.microsoft.com/sharepoint/v3"/>
-    <ds:schemaRef ds:uri="71af3243-3dd4-4a8d-8c0d-dd76da1f02a5"/>
-    <ds:schemaRef ds:uri="230e9df3-be65-4c73-a93b-d1236ebd677e"/>
-  </ds:schemaRefs>
-</ds:datastoreItem>
-</file>
-
-<file path=customXml/itemProps2.xml><?xml version="1.0" encoding="utf-8"?>
 <ds:datastoreItem xmlns:ds="http://schemas.openxmlformats.org/officeDocument/2006/customXml" ds:itemID="{4A615295-94F6-4CE2-A1B1-6B7E1DAA5AD6}">
   <ds:schemaRefs>
     <ds:schemaRef ds:uri="http://schemas.microsoft.com/office/2006/metadata/contentType"/>
@@ -21465,6 +21453,18 @@
 </ds:datastoreItem>
 </file>
 
+<file path=customXml/itemProps2.xml><?xml version="1.0" encoding="utf-8"?>
+<ds:datastoreItem xmlns:ds="http://schemas.openxmlformats.org/officeDocument/2006/customXml" ds:itemID="{4D5BAB77-79E1-4739-AA51-10C9079186D6}">
+  <ds:schemaRefs>
+    <ds:schemaRef ds:uri="http://schemas.microsoft.com/office/2006/metadata/properties"/>
+    <ds:schemaRef ds:uri="http://schemas.microsoft.com/office/infopath/2007/PartnerControls"/>
+    <ds:schemaRef ds:uri="http://schemas.microsoft.com/sharepoint/v3"/>
+    <ds:schemaRef ds:uri="71af3243-3dd4-4a8d-8c0d-dd76da1f02a5"/>
+    <ds:schemaRef ds:uri="230e9df3-be65-4c73-a93b-d1236ebd677e"/>
+  </ds:schemaRefs>
+</ds:datastoreItem>
+</file>
+
 <file path=customXml/itemProps3.xml><?xml version="1.0" encoding="utf-8"?>
 <ds:datastoreItem xmlns:ds="http://schemas.openxmlformats.org/officeDocument/2006/customXml" ds:itemID="{85334180-0405-413B-834A-44FA9E05ADB7}">
   <ds:schemaRefs>

</xml_diff>